<commit_message>
added new figures in ppt file
</commit_message>
<xml_diff>
--- a/IDEAS/Resources/Images/IDEAS-logo-development.pptx
+++ b/IDEAS/Resources/Images/IDEAS-logo-development.pptx
@@ -6,7 +6,8 @@
   </p:sldMasterIdLst>
   <p:sldIdLst>
     <p:sldId id="271" r:id="rId2"/>
-    <p:sldId id="269" r:id="rId3"/>
+    <p:sldId id="272" r:id="rId3"/>
+    <p:sldId id="269" r:id="rId4"/>
   </p:sldIdLst>
   <p:sldSz cx="12192000" cy="6858000"/>
   <p:notesSz cx="6858000" cy="9144000"/>
@@ -262,7 +263,7 @@
           <a:p>
             <a:fld id="{B400D273-4759-4E81-A135-0867F242F447}" type="datetimeFigureOut">
               <a:rPr lang="nl-BE" smtClean="0"/>
-              <a:t>1/08/2025</a:t>
+              <a:t>14/08/2025</a:t>
             </a:fld>
             <a:endParaRPr lang="nl-BE"/>
           </a:p>
@@ -316,7 +317,7 @@
           <a:p>
             <a:fld id="{6256C0CB-71DE-4A37-B918-03D6305DEA00}" type="slidenum">
               <a:rPr lang="nl-BE" smtClean="0"/>
-              <a:t>‹nr.›</a:t>
+              <a:t>‹#›</a:t>
             </a:fld>
             <a:endParaRPr lang="nl-BE"/>
           </a:p>
@@ -462,7 +463,7 @@
           <a:p>
             <a:fld id="{B400D273-4759-4E81-A135-0867F242F447}" type="datetimeFigureOut">
               <a:rPr lang="nl-BE" smtClean="0"/>
-              <a:t>1/08/2025</a:t>
+              <a:t>14/08/2025</a:t>
             </a:fld>
             <a:endParaRPr lang="nl-BE"/>
           </a:p>
@@ -516,7 +517,7 @@
           <a:p>
             <a:fld id="{6256C0CB-71DE-4A37-B918-03D6305DEA00}" type="slidenum">
               <a:rPr lang="nl-BE" smtClean="0"/>
-              <a:t>‹nr.›</a:t>
+              <a:t>‹#›</a:t>
             </a:fld>
             <a:endParaRPr lang="nl-BE"/>
           </a:p>
@@ -672,7 +673,7 @@
           <a:p>
             <a:fld id="{B400D273-4759-4E81-A135-0867F242F447}" type="datetimeFigureOut">
               <a:rPr lang="nl-BE" smtClean="0"/>
-              <a:t>1/08/2025</a:t>
+              <a:t>14/08/2025</a:t>
             </a:fld>
             <a:endParaRPr lang="nl-BE"/>
           </a:p>
@@ -726,7 +727,7 @@
           <a:p>
             <a:fld id="{6256C0CB-71DE-4A37-B918-03D6305DEA00}" type="slidenum">
               <a:rPr lang="nl-BE" smtClean="0"/>
-              <a:t>‹nr.›</a:t>
+              <a:t>‹#›</a:t>
             </a:fld>
             <a:endParaRPr lang="nl-BE"/>
           </a:p>
@@ -872,7 +873,7 @@
           <a:p>
             <a:fld id="{B400D273-4759-4E81-A135-0867F242F447}" type="datetimeFigureOut">
               <a:rPr lang="nl-BE" smtClean="0"/>
-              <a:t>1/08/2025</a:t>
+              <a:t>14/08/2025</a:t>
             </a:fld>
             <a:endParaRPr lang="nl-BE"/>
           </a:p>
@@ -926,7 +927,7 @@
           <a:p>
             <a:fld id="{6256C0CB-71DE-4A37-B918-03D6305DEA00}" type="slidenum">
               <a:rPr lang="nl-BE" smtClean="0"/>
-              <a:t>‹nr.›</a:t>
+              <a:t>‹#›</a:t>
             </a:fld>
             <a:endParaRPr lang="nl-BE"/>
           </a:p>
@@ -1148,7 +1149,7 @@
           <a:p>
             <a:fld id="{B400D273-4759-4E81-A135-0867F242F447}" type="datetimeFigureOut">
               <a:rPr lang="nl-BE" smtClean="0"/>
-              <a:t>1/08/2025</a:t>
+              <a:t>14/08/2025</a:t>
             </a:fld>
             <a:endParaRPr lang="nl-BE"/>
           </a:p>
@@ -1202,7 +1203,7 @@
           <a:p>
             <a:fld id="{6256C0CB-71DE-4A37-B918-03D6305DEA00}" type="slidenum">
               <a:rPr lang="nl-BE" smtClean="0"/>
-              <a:t>‹nr.›</a:t>
+              <a:t>‹#›</a:t>
             </a:fld>
             <a:endParaRPr lang="nl-BE"/>
           </a:p>
@@ -1416,7 +1417,7 @@
           <a:p>
             <a:fld id="{B400D273-4759-4E81-A135-0867F242F447}" type="datetimeFigureOut">
               <a:rPr lang="nl-BE" smtClean="0"/>
-              <a:t>1/08/2025</a:t>
+              <a:t>14/08/2025</a:t>
             </a:fld>
             <a:endParaRPr lang="nl-BE"/>
           </a:p>
@@ -1470,7 +1471,7 @@
           <a:p>
             <a:fld id="{6256C0CB-71DE-4A37-B918-03D6305DEA00}" type="slidenum">
               <a:rPr lang="nl-BE" smtClean="0"/>
-              <a:t>‹nr.›</a:t>
+              <a:t>‹#›</a:t>
             </a:fld>
             <a:endParaRPr lang="nl-BE"/>
           </a:p>
@@ -1831,7 +1832,7 @@
           <a:p>
             <a:fld id="{B400D273-4759-4E81-A135-0867F242F447}" type="datetimeFigureOut">
               <a:rPr lang="nl-BE" smtClean="0"/>
-              <a:t>1/08/2025</a:t>
+              <a:t>14/08/2025</a:t>
             </a:fld>
             <a:endParaRPr lang="nl-BE"/>
           </a:p>
@@ -1885,7 +1886,7 @@
           <a:p>
             <a:fld id="{6256C0CB-71DE-4A37-B918-03D6305DEA00}" type="slidenum">
               <a:rPr lang="nl-BE" smtClean="0"/>
-              <a:t>‹nr.›</a:t>
+              <a:t>‹#›</a:t>
             </a:fld>
             <a:endParaRPr lang="nl-BE"/>
           </a:p>
@@ -1973,7 +1974,7 @@
           <a:p>
             <a:fld id="{B400D273-4759-4E81-A135-0867F242F447}" type="datetimeFigureOut">
               <a:rPr lang="nl-BE" smtClean="0"/>
-              <a:t>1/08/2025</a:t>
+              <a:t>14/08/2025</a:t>
             </a:fld>
             <a:endParaRPr lang="nl-BE"/>
           </a:p>
@@ -2027,7 +2028,7 @@
           <a:p>
             <a:fld id="{6256C0CB-71DE-4A37-B918-03D6305DEA00}" type="slidenum">
               <a:rPr lang="nl-BE" smtClean="0"/>
-              <a:t>‹nr.›</a:t>
+              <a:t>‹#›</a:t>
             </a:fld>
             <a:endParaRPr lang="nl-BE"/>
           </a:p>
@@ -2086,7 +2087,7 @@
           <a:p>
             <a:fld id="{B400D273-4759-4E81-A135-0867F242F447}" type="datetimeFigureOut">
               <a:rPr lang="nl-BE" smtClean="0"/>
-              <a:t>1/08/2025</a:t>
+              <a:t>14/08/2025</a:t>
             </a:fld>
             <a:endParaRPr lang="nl-BE"/>
           </a:p>
@@ -2140,7 +2141,7 @@
           <a:p>
             <a:fld id="{6256C0CB-71DE-4A37-B918-03D6305DEA00}" type="slidenum">
               <a:rPr lang="nl-BE" smtClean="0"/>
-              <a:t>‹nr.›</a:t>
+              <a:t>‹#›</a:t>
             </a:fld>
             <a:endParaRPr lang="nl-BE"/>
           </a:p>
@@ -2399,7 +2400,7 @@
           <a:p>
             <a:fld id="{B400D273-4759-4E81-A135-0867F242F447}" type="datetimeFigureOut">
               <a:rPr lang="nl-BE" smtClean="0"/>
-              <a:t>1/08/2025</a:t>
+              <a:t>14/08/2025</a:t>
             </a:fld>
             <a:endParaRPr lang="nl-BE"/>
           </a:p>
@@ -2453,7 +2454,7 @@
           <a:p>
             <a:fld id="{6256C0CB-71DE-4A37-B918-03D6305DEA00}" type="slidenum">
               <a:rPr lang="nl-BE" smtClean="0"/>
-              <a:t>‹nr.›</a:t>
+              <a:t>‹#›</a:t>
             </a:fld>
             <a:endParaRPr lang="nl-BE"/>
           </a:p>
@@ -2688,7 +2689,7 @@
           <a:p>
             <a:fld id="{B400D273-4759-4E81-A135-0867F242F447}" type="datetimeFigureOut">
               <a:rPr lang="nl-BE" smtClean="0"/>
-              <a:t>1/08/2025</a:t>
+              <a:t>14/08/2025</a:t>
             </a:fld>
             <a:endParaRPr lang="nl-BE"/>
           </a:p>
@@ -2742,7 +2743,7 @@
           <a:p>
             <a:fld id="{6256C0CB-71DE-4A37-B918-03D6305DEA00}" type="slidenum">
               <a:rPr lang="nl-BE" smtClean="0"/>
-              <a:t>‹nr.›</a:t>
+              <a:t>‹#›</a:t>
             </a:fld>
             <a:endParaRPr lang="nl-BE"/>
           </a:p>
@@ -2931,7 +2932,7 @@
           <a:p>
             <a:fld id="{B400D273-4759-4E81-A135-0867F242F447}" type="datetimeFigureOut">
               <a:rPr lang="nl-BE" smtClean="0"/>
-              <a:t>1/08/2025</a:t>
+              <a:t>14/08/2025</a:t>
             </a:fld>
             <a:endParaRPr lang="nl-BE"/>
           </a:p>
@@ -3021,7 +3022,7 @@
           <a:p>
             <a:fld id="{6256C0CB-71DE-4A37-B918-03D6305DEA00}" type="slidenum">
               <a:rPr lang="nl-BE" smtClean="0"/>
-              <a:t>‹nr.›</a:t>
+              <a:t>‹#›</a:t>
             </a:fld>
             <a:endParaRPr lang="nl-BE"/>
           </a:p>
@@ -3384,7 +3385,7 @@
           <a:p>
             <a:r>
               <a:rPr lang="en-GB" b="1" dirty="0"/>
-              <a:t>Full logo</a:t>
+              <a:t>Full logo – Light mode</a:t>
             </a:r>
           </a:p>
         </p:txBody>
@@ -4794,6 +4795,1482 @@
 <file path=ppt/slides/slide2.xml><?xml version="1.0" encoding="utf-8"?>
 <p:sld xmlns:a="http://schemas.openxmlformats.org/drawingml/2006/main" xmlns:r="http://schemas.openxmlformats.org/officeDocument/2006/relationships" xmlns:p="http://schemas.openxmlformats.org/presentationml/2006/main">
   <p:cSld>
+    <p:bg>
+      <p:bgPr>
+        <a:solidFill>
+          <a:schemeClr val="tx1"/>
+        </a:solidFill>
+        <a:effectLst/>
+      </p:bgPr>
+    </p:bg>
+    <p:spTree>
+      <p:nvGrpSpPr>
+        <p:cNvPr id="1" name="">
+          <a:extLst>
+            <a:ext uri="{FF2B5EF4-FFF2-40B4-BE49-F238E27FC236}">
+              <a16:creationId xmlns:a16="http://schemas.microsoft.com/office/drawing/2014/main" id="{B79CDE8B-C9A0-2C30-8A76-F9174165EABD}"/>
+            </a:ext>
+          </a:extLst>
+        </p:cNvPr>
+        <p:cNvGrpSpPr/>
+        <p:nvPr/>
+      </p:nvGrpSpPr>
+      <p:grpSpPr>
+        <a:xfrm>
+          <a:off x="0" y="0"/>
+          <a:ext cx="0" cy="0"/>
+          <a:chOff x="0" y="0"/>
+          <a:chExt cx="0" cy="0"/>
+        </a:xfrm>
+      </p:grpSpPr>
+      <p:sp>
+        <p:nvSpPr>
+          <p:cNvPr id="36" name="Tekstvak 35">
+            <a:extLst>
+              <a:ext uri="{FF2B5EF4-FFF2-40B4-BE49-F238E27FC236}">
+                <a16:creationId xmlns:a16="http://schemas.microsoft.com/office/drawing/2014/main" id="{E9029DC3-E3D7-B63E-E218-EAEA728ED7D1}"/>
+              </a:ext>
+            </a:extLst>
+          </p:cNvPr>
+          <p:cNvSpPr txBox="1"/>
+          <p:nvPr/>
+        </p:nvSpPr>
+        <p:spPr>
+          <a:xfrm>
+            <a:off x="613457" y="578734"/>
+            <a:ext cx="2654913" cy="369332"/>
+          </a:xfrm>
+          <a:prstGeom prst="rect">
+            <a:avLst/>
+          </a:prstGeom>
+          <a:noFill/>
+        </p:spPr>
+        <p:txBody>
+          <a:bodyPr wrap="square" rtlCol="0">
+            <a:spAutoFit/>
+          </a:bodyPr>
+          <a:lstStyle/>
+          <a:p>
+            <a:r>
+              <a:rPr lang="en-GB" b="1" dirty="0">
+                <a:solidFill>
+                  <a:schemeClr val="bg1"/>
+                </a:solidFill>
+              </a:rPr>
+              <a:t>Full logo – Dark mode</a:t>
+            </a:r>
+          </a:p>
+        </p:txBody>
+      </p:sp>
+      <p:grpSp>
+        <p:nvGrpSpPr>
+          <p:cNvPr id="82" name="Groep 81">
+            <a:extLst>
+              <a:ext uri="{FF2B5EF4-FFF2-40B4-BE49-F238E27FC236}">
+                <a16:creationId xmlns:a16="http://schemas.microsoft.com/office/drawing/2014/main" id="{2E444D89-5FDC-AAE8-84D8-A71E5D26E51B}"/>
+              </a:ext>
+            </a:extLst>
+          </p:cNvPr>
+          <p:cNvGrpSpPr/>
+          <p:nvPr/>
+        </p:nvGrpSpPr>
+        <p:grpSpPr>
+          <a:xfrm>
+            <a:off x="1767489" y="359350"/>
+            <a:ext cx="7872031" cy="6680960"/>
+            <a:chOff x="1767489" y="359350"/>
+            <a:chExt cx="7872031" cy="6680960"/>
+          </a:xfrm>
+        </p:grpSpPr>
+        <p:cxnSp>
+          <p:nvCxnSpPr>
+            <p:cNvPr id="17" name="Rechte verbindingslijn 16">
+              <a:extLst>
+                <a:ext uri="{FF2B5EF4-FFF2-40B4-BE49-F238E27FC236}">
+                  <a16:creationId xmlns:a16="http://schemas.microsoft.com/office/drawing/2014/main" id="{DF849851-2F4B-DD65-8AC3-CC26138F2123}"/>
+                </a:ext>
+              </a:extLst>
+            </p:cNvPr>
+            <p:cNvCxnSpPr>
+              <a:cxnSpLocks/>
+            </p:cNvCxnSpPr>
+            <p:nvPr/>
+          </p:nvCxnSpPr>
+          <p:spPr>
+            <a:xfrm flipH="1" flipV="1">
+              <a:off x="9157311" y="2343442"/>
+              <a:ext cx="112" cy="2089719"/>
+            </a:xfrm>
+            <a:prstGeom prst="line">
+              <a:avLst/>
+            </a:prstGeom>
+            <a:ln w="101600">
+              <a:solidFill>
+                <a:srgbClr val="FF0000"/>
+              </a:solidFill>
+            </a:ln>
+          </p:spPr>
+          <p:style>
+            <a:lnRef idx="2">
+              <a:schemeClr val="accent1"/>
+            </a:lnRef>
+            <a:fillRef idx="0">
+              <a:schemeClr val="accent1"/>
+            </a:fillRef>
+            <a:effectRef idx="1">
+              <a:schemeClr val="accent1"/>
+            </a:effectRef>
+            <a:fontRef idx="minor">
+              <a:schemeClr val="tx1"/>
+            </a:fontRef>
+          </p:style>
+        </p:cxnSp>
+        <p:cxnSp>
+          <p:nvCxnSpPr>
+            <p:cNvPr id="6" name="Rechte verbindingslijn 5">
+              <a:extLst>
+                <a:ext uri="{FF2B5EF4-FFF2-40B4-BE49-F238E27FC236}">
+                  <a16:creationId xmlns:a16="http://schemas.microsoft.com/office/drawing/2014/main" id="{189B7256-294A-57CD-41B4-31A9E469CD72}"/>
+                </a:ext>
+              </a:extLst>
+            </p:cNvPr>
+            <p:cNvCxnSpPr>
+              <a:cxnSpLocks/>
+            </p:cNvCxnSpPr>
+            <p:nvPr/>
+          </p:nvCxnSpPr>
+          <p:spPr>
+            <a:xfrm flipV="1">
+              <a:off x="8311469" y="3797775"/>
+              <a:ext cx="0" cy="1949723"/>
+            </a:xfrm>
+            <a:prstGeom prst="line">
+              <a:avLst/>
+            </a:prstGeom>
+            <a:ln w="101600">
+              <a:solidFill>
+                <a:srgbClr val="0070C0"/>
+              </a:solidFill>
+            </a:ln>
+          </p:spPr>
+          <p:style>
+            <a:lnRef idx="2">
+              <a:schemeClr val="accent1"/>
+            </a:lnRef>
+            <a:fillRef idx="0">
+              <a:schemeClr val="accent1"/>
+            </a:fillRef>
+            <a:effectRef idx="1">
+              <a:schemeClr val="accent1"/>
+            </a:effectRef>
+            <a:fontRef idx="minor">
+              <a:schemeClr val="tx1"/>
+            </a:fontRef>
+          </p:style>
+        </p:cxnSp>
+        <p:sp>
+          <p:nvSpPr>
+            <p:cNvPr id="18" name="Tekstvak 17">
+              <a:extLst>
+                <a:ext uri="{FF2B5EF4-FFF2-40B4-BE49-F238E27FC236}">
+                  <a16:creationId xmlns:a16="http://schemas.microsoft.com/office/drawing/2014/main" id="{58A5624F-1D02-1A4C-33C6-187009711603}"/>
+                </a:ext>
+              </a:extLst>
+            </p:cNvPr>
+            <p:cNvSpPr txBox="1"/>
+            <p:nvPr/>
+          </p:nvSpPr>
+          <p:spPr>
+            <a:xfrm>
+              <a:off x="1767489" y="3870211"/>
+              <a:ext cx="5903311" cy="3170099"/>
+            </a:xfrm>
+            <a:prstGeom prst="rect">
+              <a:avLst/>
+            </a:prstGeom>
+            <a:noFill/>
+          </p:spPr>
+          <p:txBody>
+            <a:bodyPr wrap="square" rtlCol="0">
+              <a:spAutoFit/>
+            </a:bodyPr>
+            <a:lstStyle/>
+            <a:p>
+              <a:r>
+                <a:rPr lang="en-GB" sz="20000" b="1" dirty="0">
+                  <a:solidFill>
+                    <a:schemeClr val="bg1"/>
+                  </a:solidFill>
+                </a:rPr>
+                <a:t>IDEA</a:t>
+              </a:r>
+            </a:p>
+          </p:txBody>
+        </p:sp>
+        <p:cxnSp>
+          <p:nvCxnSpPr>
+            <p:cNvPr id="3" name="Rechte verbindingslijn 2">
+              <a:extLst>
+                <a:ext uri="{FF2B5EF4-FFF2-40B4-BE49-F238E27FC236}">
+                  <a16:creationId xmlns:a16="http://schemas.microsoft.com/office/drawing/2014/main" id="{75C4DD61-7332-0A12-F241-CF510FB48811}"/>
+                </a:ext>
+              </a:extLst>
+            </p:cNvPr>
+            <p:cNvCxnSpPr>
+              <a:cxnSpLocks/>
+            </p:cNvCxnSpPr>
+            <p:nvPr/>
+          </p:nvCxnSpPr>
+          <p:spPr>
+            <a:xfrm>
+              <a:off x="7688460" y="6170019"/>
+              <a:ext cx="998340" cy="0"/>
+            </a:xfrm>
+            <a:prstGeom prst="line">
+              <a:avLst/>
+            </a:prstGeom>
+            <a:ln w="254000">
+              <a:solidFill>
+                <a:srgbClr val="0070C0"/>
+              </a:solidFill>
+            </a:ln>
+          </p:spPr>
+          <p:style>
+            <a:lnRef idx="2">
+              <a:schemeClr val="accent1"/>
+            </a:lnRef>
+            <a:fillRef idx="0">
+              <a:schemeClr val="accent1"/>
+            </a:fillRef>
+            <a:effectRef idx="1">
+              <a:schemeClr val="accent1"/>
+            </a:effectRef>
+            <a:fontRef idx="minor">
+              <a:schemeClr val="tx1"/>
+            </a:fontRef>
+          </p:style>
+        </p:cxnSp>
+        <p:cxnSp>
+          <p:nvCxnSpPr>
+            <p:cNvPr id="4" name="Rechte verbindingslijn 3">
+              <a:extLst>
+                <a:ext uri="{FF2B5EF4-FFF2-40B4-BE49-F238E27FC236}">
+                  <a16:creationId xmlns:a16="http://schemas.microsoft.com/office/drawing/2014/main" id="{8756F14D-0259-855C-D0C1-B634E086DA13}"/>
+                </a:ext>
+              </a:extLst>
+            </p:cNvPr>
+            <p:cNvCxnSpPr>
+              <a:cxnSpLocks/>
+            </p:cNvCxnSpPr>
+            <p:nvPr/>
+          </p:nvCxnSpPr>
+          <p:spPr>
+            <a:xfrm>
+              <a:off x="7946050" y="4583687"/>
+              <a:ext cx="1067416" cy="0"/>
+            </a:xfrm>
+            <a:prstGeom prst="line">
+              <a:avLst/>
+            </a:prstGeom>
+            <a:ln w="254000">
+              <a:solidFill>
+                <a:srgbClr val="FF0000"/>
+              </a:solidFill>
+            </a:ln>
+          </p:spPr>
+          <p:style>
+            <a:lnRef idx="2">
+              <a:schemeClr val="accent1"/>
+            </a:lnRef>
+            <a:fillRef idx="0">
+              <a:schemeClr val="accent1"/>
+            </a:fillRef>
+            <a:effectRef idx="1">
+              <a:schemeClr val="accent1"/>
+            </a:effectRef>
+            <a:fontRef idx="minor">
+              <a:schemeClr val="tx1"/>
+            </a:fontRef>
+          </p:style>
+        </p:cxnSp>
+        <p:sp>
+          <p:nvSpPr>
+            <p:cNvPr id="9" name="Boog 8">
+              <a:extLst>
+                <a:ext uri="{FF2B5EF4-FFF2-40B4-BE49-F238E27FC236}">
+                  <a16:creationId xmlns:a16="http://schemas.microsoft.com/office/drawing/2014/main" id="{A56B6363-CEEA-872E-DC9A-7E025BF7C191}"/>
+                </a:ext>
+              </a:extLst>
+            </p:cNvPr>
+            <p:cNvSpPr/>
+            <p:nvPr/>
+          </p:nvSpPr>
+          <p:spPr>
+            <a:xfrm rot="5400000">
+              <a:off x="8869466" y="4290786"/>
+              <a:ext cx="288000" cy="288000"/>
+            </a:xfrm>
+            <a:prstGeom prst="arc">
+              <a:avLst>
+                <a:gd name="adj1" fmla="val 16115718"/>
+                <a:gd name="adj2" fmla="val 0"/>
+              </a:avLst>
+            </a:prstGeom>
+            <a:ln w="101600">
+              <a:solidFill>
+                <a:srgbClr val="FF0000"/>
+              </a:solidFill>
+            </a:ln>
+          </p:spPr>
+          <p:style>
+            <a:lnRef idx="2">
+              <a:schemeClr val="accent1"/>
+            </a:lnRef>
+            <a:fillRef idx="0">
+              <a:schemeClr val="accent1"/>
+            </a:fillRef>
+            <a:effectRef idx="1">
+              <a:schemeClr val="accent1"/>
+            </a:effectRef>
+            <a:fontRef idx="minor">
+              <a:schemeClr val="tx1"/>
+            </a:fontRef>
+          </p:style>
+          <p:txBody>
+            <a:bodyPr rtlCol="0" anchor="ctr"/>
+            <a:lstStyle/>
+            <a:p>
+              <a:pPr algn="ctr"/>
+              <a:endParaRPr lang="en-GB"/>
+            </a:p>
+          </p:txBody>
+        </p:sp>
+        <p:sp>
+          <p:nvSpPr>
+            <p:cNvPr id="11" name="Boog 10">
+              <a:extLst>
+                <a:ext uri="{FF2B5EF4-FFF2-40B4-BE49-F238E27FC236}">
+                  <a16:creationId xmlns:a16="http://schemas.microsoft.com/office/drawing/2014/main" id="{9A19F3C6-E052-AEF0-4319-2172901FCA71}"/>
+                </a:ext>
+              </a:extLst>
+            </p:cNvPr>
+            <p:cNvSpPr/>
+            <p:nvPr/>
+          </p:nvSpPr>
+          <p:spPr>
+            <a:xfrm rot="10800000">
+              <a:off x="7550051" y="4583901"/>
+              <a:ext cx="792000" cy="792000"/>
+            </a:xfrm>
+            <a:prstGeom prst="arc">
+              <a:avLst>
+                <a:gd name="adj1" fmla="val 16200000"/>
+                <a:gd name="adj2" fmla="val 5420031"/>
+              </a:avLst>
+            </a:prstGeom>
+            <a:ln w="254000">
+              <a:gradFill flip="none" rotWithShape="1">
+                <a:gsLst>
+                  <a:gs pos="0">
+                    <a:srgbClr val="FF0000"/>
+                  </a:gs>
+                  <a:gs pos="100000">
+                    <a:srgbClr val="C84B80"/>
+                  </a:gs>
+                </a:gsLst>
+                <a:lin ang="16500000" scaled="0"/>
+                <a:tileRect/>
+              </a:gradFill>
+            </a:ln>
+          </p:spPr>
+          <p:style>
+            <a:lnRef idx="2">
+              <a:schemeClr val="accent1"/>
+            </a:lnRef>
+            <a:fillRef idx="0">
+              <a:schemeClr val="accent1"/>
+            </a:fillRef>
+            <a:effectRef idx="1">
+              <a:schemeClr val="accent1"/>
+            </a:effectRef>
+            <a:fontRef idx="minor">
+              <a:schemeClr val="tx1"/>
+            </a:fontRef>
+          </p:style>
+          <p:txBody>
+            <a:bodyPr rtlCol="0" anchor="ctr"/>
+            <a:lstStyle/>
+            <a:p>
+              <a:pPr algn="ctr"/>
+              <a:endParaRPr lang="en-GB" dirty="0"/>
+            </a:p>
+          </p:txBody>
+        </p:sp>
+        <p:sp>
+          <p:nvSpPr>
+            <p:cNvPr id="12" name="Boog 11">
+              <a:extLst>
+                <a:ext uri="{FF2B5EF4-FFF2-40B4-BE49-F238E27FC236}">
+                  <a16:creationId xmlns:a16="http://schemas.microsoft.com/office/drawing/2014/main" id="{4EEEABAF-5A0C-581C-BBDF-C9F565797103}"/>
+                </a:ext>
+              </a:extLst>
+            </p:cNvPr>
+            <p:cNvSpPr/>
+            <p:nvPr/>
+          </p:nvSpPr>
+          <p:spPr>
+            <a:xfrm>
+              <a:off x="8290800" y="5377595"/>
+              <a:ext cx="792000" cy="792000"/>
+            </a:xfrm>
+            <a:prstGeom prst="arc">
+              <a:avLst>
+                <a:gd name="adj1" fmla="val 16200000"/>
+                <a:gd name="adj2" fmla="val 5420031"/>
+              </a:avLst>
+            </a:prstGeom>
+            <a:ln w="254000">
+              <a:gradFill>
+                <a:gsLst>
+                  <a:gs pos="0">
+                    <a:srgbClr val="A85897"/>
+                  </a:gs>
+                  <a:gs pos="100000">
+                    <a:srgbClr val="0070C0"/>
+                  </a:gs>
+                </a:gsLst>
+                <a:lin ang="5400000" scaled="1"/>
+              </a:gradFill>
+            </a:ln>
+          </p:spPr>
+          <p:style>
+            <a:lnRef idx="2">
+              <a:schemeClr val="accent1"/>
+            </a:lnRef>
+            <a:fillRef idx="0">
+              <a:schemeClr val="accent1"/>
+            </a:fillRef>
+            <a:effectRef idx="1">
+              <a:schemeClr val="accent1"/>
+            </a:effectRef>
+            <a:fontRef idx="minor">
+              <a:schemeClr val="tx1"/>
+            </a:fontRef>
+          </p:style>
+          <p:txBody>
+            <a:bodyPr rtlCol="0" anchor="ctr"/>
+            <a:lstStyle/>
+            <a:p>
+              <a:pPr algn="ctr"/>
+              <a:endParaRPr lang="en-GB"/>
+            </a:p>
+          </p:txBody>
+        </p:sp>
+        <p:sp>
+          <p:nvSpPr>
+            <p:cNvPr id="13" name="Boog 12">
+              <a:extLst>
+                <a:ext uri="{FF2B5EF4-FFF2-40B4-BE49-F238E27FC236}">
+                  <a16:creationId xmlns:a16="http://schemas.microsoft.com/office/drawing/2014/main" id="{82AA2F0A-262B-ED4F-EFD8-620D894818AD}"/>
+                </a:ext>
+              </a:extLst>
+            </p:cNvPr>
+            <p:cNvSpPr/>
+            <p:nvPr/>
+          </p:nvSpPr>
+          <p:spPr>
+            <a:xfrm rot="10800000">
+              <a:off x="7551680" y="5913530"/>
+              <a:ext cx="273561" cy="255639"/>
+            </a:xfrm>
+            <a:prstGeom prst="arc">
+              <a:avLst>
+                <a:gd name="adj1" fmla="val 16200000"/>
+                <a:gd name="adj2" fmla="val 5416196"/>
+              </a:avLst>
+            </a:prstGeom>
+            <a:ln w="101600">
+              <a:solidFill>
+                <a:srgbClr val="0070C0"/>
+              </a:solidFill>
+            </a:ln>
+          </p:spPr>
+          <p:style>
+            <a:lnRef idx="2">
+              <a:schemeClr val="accent1"/>
+            </a:lnRef>
+            <a:fillRef idx="0">
+              <a:schemeClr val="accent1"/>
+            </a:fillRef>
+            <a:effectRef idx="1">
+              <a:schemeClr val="accent1"/>
+            </a:effectRef>
+            <a:fontRef idx="minor">
+              <a:schemeClr val="tx1"/>
+            </a:fontRef>
+          </p:style>
+          <p:txBody>
+            <a:bodyPr rtlCol="0" anchor="ctr"/>
+            <a:lstStyle/>
+            <a:p>
+              <a:pPr algn="ctr"/>
+              <a:endParaRPr lang="en-GB"/>
+            </a:p>
+          </p:txBody>
+        </p:sp>
+        <p:cxnSp>
+          <p:nvCxnSpPr>
+            <p:cNvPr id="14" name="Rechte verbindingslijn 13">
+              <a:extLst>
+                <a:ext uri="{FF2B5EF4-FFF2-40B4-BE49-F238E27FC236}">
+                  <a16:creationId xmlns:a16="http://schemas.microsoft.com/office/drawing/2014/main" id="{E552F46F-7BC3-6D46-1A0A-4A87606BE2F7}"/>
+                </a:ext>
+              </a:extLst>
+            </p:cNvPr>
+            <p:cNvCxnSpPr>
+              <a:cxnSpLocks/>
+            </p:cNvCxnSpPr>
+            <p:nvPr/>
+          </p:nvCxnSpPr>
+          <p:spPr>
+            <a:xfrm>
+              <a:off x="7946050" y="5377438"/>
+              <a:ext cx="740750" cy="0"/>
+            </a:xfrm>
+            <a:prstGeom prst="line">
+              <a:avLst/>
+            </a:prstGeom>
+            <a:ln w="254000">
+              <a:gradFill flip="none" rotWithShape="1">
+                <a:gsLst>
+                  <a:gs pos="0">
+                    <a:srgbClr val="C84B80"/>
+                  </a:gs>
+                  <a:gs pos="100000">
+                    <a:srgbClr val="A85897"/>
+                  </a:gs>
+                </a:gsLst>
+                <a:lin ang="0" scaled="0"/>
+                <a:tileRect/>
+              </a:gradFill>
+            </a:ln>
+          </p:spPr>
+          <p:style>
+            <a:lnRef idx="2">
+              <a:schemeClr val="accent1"/>
+            </a:lnRef>
+            <a:fillRef idx="0">
+              <a:schemeClr val="accent1"/>
+            </a:fillRef>
+            <a:effectRef idx="1">
+              <a:schemeClr val="accent1"/>
+            </a:effectRef>
+            <a:fontRef idx="minor">
+              <a:schemeClr val="tx1"/>
+            </a:fontRef>
+          </p:style>
+        </p:cxnSp>
+        <p:sp>
+          <p:nvSpPr>
+            <p:cNvPr id="31" name="Boog 30">
+              <a:extLst>
+                <a:ext uri="{FF2B5EF4-FFF2-40B4-BE49-F238E27FC236}">
+                  <a16:creationId xmlns:a16="http://schemas.microsoft.com/office/drawing/2014/main" id="{FD3CC2C9-468F-1E7D-D6C3-BD0D0BAFD056}"/>
+                </a:ext>
+              </a:extLst>
+            </p:cNvPr>
+            <p:cNvSpPr/>
+            <p:nvPr/>
+          </p:nvSpPr>
+          <p:spPr>
+            <a:xfrm rot="5400000">
+              <a:off x="8003603" y="5605549"/>
+              <a:ext cx="334119" cy="282084"/>
+            </a:xfrm>
+            <a:prstGeom prst="arc">
+              <a:avLst>
+                <a:gd name="adj1" fmla="val 16200000"/>
+                <a:gd name="adj2" fmla="val 10626"/>
+              </a:avLst>
+            </a:prstGeom>
+            <a:ln w="101600">
+              <a:solidFill>
+                <a:srgbClr val="0070C0"/>
+              </a:solidFill>
+            </a:ln>
+          </p:spPr>
+          <p:style>
+            <a:lnRef idx="2">
+              <a:schemeClr val="accent1"/>
+            </a:lnRef>
+            <a:fillRef idx="0">
+              <a:schemeClr val="accent1"/>
+            </a:fillRef>
+            <a:effectRef idx="1">
+              <a:schemeClr val="accent1"/>
+            </a:effectRef>
+            <a:fontRef idx="minor">
+              <a:schemeClr val="tx1"/>
+            </a:fontRef>
+          </p:style>
+          <p:txBody>
+            <a:bodyPr rtlCol="0" anchor="ctr"/>
+            <a:lstStyle/>
+            <a:p>
+              <a:pPr algn="ctr"/>
+              <a:endParaRPr lang="en-GB"/>
+            </a:p>
+          </p:txBody>
+        </p:sp>
+        <p:cxnSp>
+          <p:nvCxnSpPr>
+            <p:cNvPr id="40" name="Rechte verbindingslijn 39">
+              <a:extLst>
+                <a:ext uri="{FF2B5EF4-FFF2-40B4-BE49-F238E27FC236}">
+                  <a16:creationId xmlns:a16="http://schemas.microsoft.com/office/drawing/2014/main" id="{4E82E7B7-8C0E-DAFC-50D3-3596C9A7BAC7}"/>
+                </a:ext>
+              </a:extLst>
+            </p:cNvPr>
+            <p:cNvCxnSpPr>
+              <a:cxnSpLocks/>
+            </p:cNvCxnSpPr>
+            <p:nvPr/>
+          </p:nvCxnSpPr>
+          <p:spPr>
+            <a:xfrm>
+              <a:off x="7687563" y="5912647"/>
+              <a:ext cx="482428" cy="0"/>
+            </a:xfrm>
+            <a:prstGeom prst="line">
+              <a:avLst/>
+            </a:prstGeom>
+            <a:ln w="101600">
+              <a:solidFill>
+                <a:srgbClr val="0070C0"/>
+              </a:solidFill>
+            </a:ln>
+          </p:spPr>
+          <p:style>
+            <a:lnRef idx="2">
+              <a:schemeClr val="accent1"/>
+            </a:lnRef>
+            <a:fillRef idx="0">
+              <a:schemeClr val="accent1"/>
+            </a:fillRef>
+            <a:effectRef idx="1">
+              <a:schemeClr val="accent1"/>
+            </a:effectRef>
+            <a:fontRef idx="minor">
+              <a:schemeClr val="tx1"/>
+            </a:fontRef>
+          </p:style>
+        </p:cxnSp>
+        <p:grpSp>
+          <p:nvGrpSpPr>
+            <p:cNvPr id="69" name="Groep 68">
+              <a:extLst>
+                <a:ext uri="{FF2B5EF4-FFF2-40B4-BE49-F238E27FC236}">
+                  <a16:creationId xmlns:a16="http://schemas.microsoft.com/office/drawing/2014/main" id="{796D64A4-3040-B181-7415-504DBED909D8}"/>
+                </a:ext>
+              </a:extLst>
+            </p:cNvPr>
+            <p:cNvGrpSpPr/>
+            <p:nvPr/>
+          </p:nvGrpSpPr>
+          <p:grpSpPr>
+            <a:xfrm>
+              <a:off x="6984607" y="359350"/>
+              <a:ext cx="2654913" cy="3821561"/>
+              <a:chOff x="4768543" y="1518219"/>
+              <a:chExt cx="2654913" cy="3821561"/>
+            </a:xfrm>
+          </p:grpSpPr>
+          <p:sp>
+            <p:nvSpPr>
+              <p:cNvPr id="70" name="Vrije vorm: vorm 69">
+                <a:extLst>
+                  <a:ext uri="{FF2B5EF4-FFF2-40B4-BE49-F238E27FC236}">
+                    <a16:creationId xmlns:a16="http://schemas.microsoft.com/office/drawing/2014/main" id="{93F08A96-5832-84D0-3E04-547D937DF043}"/>
+                  </a:ext>
+                </a:extLst>
+              </p:cNvPr>
+              <p:cNvSpPr/>
+              <p:nvPr/>
+            </p:nvSpPr>
+            <p:spPr>
+              <a:xfrm>
+                <a:off x="4951422" y="1672864"/>
+                <a:ext cx="2295460" cy="2888243"/>
+              </a:xfrm>
+              <a:custGeom>
+                <a:avLst/>
+                <a:gdLst>
+                  <a:gd name="connsiteX0" fmla="*/ 1059443 w 2295460"/>
+                  <a:gd name="connsiteY0" fmla="*/ 0 h 2888243"/>
+                  <a:gd name="connsiteX1" fmla="*/ 441435 w 2295460"/>
+                  <a:gd name="connsiteY1" fmla="*/ 258555 h 2888243"/>
+                  <a:gd name="connsiteX2" fmla="*/ 81981 w 2295460"/>
+                  <a:gd name="connsiteY2" fmla="*/ 592784 h 2888243"/>
+                  <a:gd name="connsiteX3" fmla="*/ 0 w 2295460"/>
+                  <a:gd name="connsiteY3" fmla="*/ 1040525 h 2888243"/>
+                  <a:gd name="connsiteX4" fmla="*/ 0 w 2295460"/>
+                  <a:gd name="connsiteY4" fmla="*/ 1437816 h 2888243"/>
+                  <a:gd name="connsiteX5" fmla="*/ 182880 w 2295460"/>
+                  <a:gd name="connsiteY5" fmla="*/ 1809882 h 2888243"/>
+                  <a:gd name="connsiteX6" fmla="*/ 422516 w 2295460"/>
+                  <a:gd name="connsiteY6" fmla="*/ 2074742 h 2888243"/>
+                  <a:gd name="connsiteX7" fmla="*/ 504497 w 2295460"/>
+                  <a:gd name="connsiteY7" fmla="*/ 2326991 h 2888243"/>
+                  <a:gd name="connsiteX8" fmla="*/ 599090 w 2295460"/>
+                  <a:gd name="connsiteY8" fmla="*/ 2787344 h 2888243"/>
+                  <a:gd name="connsiteX9" fmla="*/ 813501 w 2295460"/>
+                  <a:gd name="connsiteY9" fmla="*/ 2888243 h 2888243"/>
+                  <a:gd name="connsiteX10" fmla="*/ 1570246 w 2295460"/>
+                  <a:gd name="connsiteY10" fmla="*/ 2881937 h 2888243"/>
+                  <a:gd name="connsiteX11" fmla="*/ 1753126 w 2295460"/>
+                  <a:gd name="connsiteY11" fmla="*/ 2579239 h 2888243"/>
+                  <a:gd name="connsiteX12" fmla="*/ 1822494 w 2295460"/>
+                  <a:gd name="connsiteY12" fmla="*/ 2200867 h 2888243"/>
+                  <a:gd name="connsiteX13" fmla="*/ 2150417 w 2295460"/>
+                  <a:gd name="connsiteY13" fmla="*/ 1790963 h 2888243"/>
+                  <a:gd name="connsiteX14" fmla="*/ 2295460 w 2295460"/>
+                  <a:gd name="connsiteY14" fmla="*/ 1273854 h 2888243"/>
+                  <a:gd name="connsiteX15" fmla="*/ 2282847 w 2295460"/>
+                  <a:gd name="connsiteY15" fmla="*/ 807195 h 2888243"/>
+                  <a:gd name="connsiteX16" fmla="*/ 2049518 w 2295460"/>
+                  <a:gd name="connsiteY16" fmla="*/ 422516 h 2888243"/>
+                  <a:gd name="connsiteX17" fmla="*/ 1765738 w 2295460"/>
+                  <a:gd name="connsiteY17" fmla="*/ 182880 h 2888243"/>
+                  <a:gd name="connsiteX18" fmla="*/ 1412591 w 2295460"/>
+                  <a:gd name="connsiteY18" fmla="*/ 44144 h 2888243"/>
+                  <a:gd name="connsiteX19" fmla="*/ 1059443 w 2295460"/>
+                  <a:gd name="connsiteY19" fmla="*/ 0 h 2888243"/>
+                </a:gdLst>
+                <a:ahLst/>
+                <a:cxnLst>
+                  <a:cxn ang="0">
+                    <a:pos x="connsiteX0" y="connsiteY0"/>
+                  </a:cxn>
+                  <a:cxn ang="0">
+                    <a:pos x="connsiteX1" y="connsiteY1"/>
+                  </a:cxn>
+                  <a:cxn ang="0">
+                    <a:pos x="connsiteX2" y="connsiteY2"/>
+                  </a:cxn>
+                  <a:cxn ang="0">
+                    <a:pos x="connsiteX3" y="connsiteY3"/>
+                  </a:cxn>
+                  <a:cxn ang="0">
+                    <a:pos x="connsiteX4" y="connsiteY4"/>
+                  </a:cxn>
+                  <a:cxn ang="0">
+                    <a:pos x="connsiteX5" y="connsiteY5"/>
+                  </a:cxn>
+                  <a:cxn ang="0">
+                    <a:pos x="connsiteX6" y="connsiteY6"/>
+                  </a:cxn>
+                  <a:cxn ang="0">
+                    <a:pos x="connsiteX7" y="connsiteY7"/>
+                  </a:cxn>
+                  <a:cxn ang="0">
+                    <a:pos x="connsiteX8" y="connsiteY8"/>
+                  </a:cxn>
+                  <a:cxn ang="0">
+                    <a:pos x="connsiteX9" y="connsiteY9"/>
+                  </a:cxn>
+                  <a:cxn ang="0">
+                    <a:pos x="connsiteX10" y="connsiteY10"/>
+                  </a:cxn>
+                  <a:cxn ang="0">
+                    <a:pos x="connsiteX11" y="connsiteY11"/>
+                  </a:cxn>
+                  <a:cxn ang="0">
+                    <a:pos x="connsiteX12" y="connsiteY12"/>
+                  </a:cxn>
+                  <a:cxn ang="0">
+                    <a:pos x="connsiteX13" y="connsiteY13"/>
+                  </a:cxn>
+                  <a:cxn ang="0">
+                    <a:pos x="connsiteX14" y="connsiteY14"/>
+                  </a:cxn>
+                  <a:cxn ang="0">
+                    <a:pos x="connsiteX15" y="connsiteY15"/>
+                  </a:cxn>
+                  <a:cxn ang="0">
+                    <a:pos x="connsiteX16" y="connsiteY16"/>
+                  </a:cxn>
+                  <a:cxn ang="0">
+                    <a:pos x="connsiteX17" y="connsiteY17"/>
+                  </a:cxn>
+                  <a:cxn ang="0">
+                    <a:pos x="connsiteX18" y="connsiteY18"/>
+                  </a:cxn>
+                  <a:cxn ang="0">
+                    <a:pos x="connsiteX19" y="connsiteY19"/>
+                  </a:cxn>
+                </a:cxnLst>
+                <a:rect l="l" t="t" r="r" b="b"/>
+                <a:pathLst>
+                  <a:path w="2295460" h="2888243">
+                    <a:moveTo>
+                      <a:pt x="1059443" y="0"/>
+                    </a:moveTo>
+                    <a:lnTo>
+                      <a:pt x="441435" y="258555"/>
+                    </a:lnTo>
+                    <a:lnTo>
+                      <a:pt x="81981" y="592784"/>
+                    </a:lnTo>
+                    <a:lnTo>
+                      <a:pt x="0" y="1040525"/>
+                    </a:lnTo>
+                    <a:lnTo>
+                      <a:pt x="0" y="1437816"/>
+                    </a:lnTo>
+                    <a:lnTo>
+                      <a:pt x="182880" y="1809882"/>
+                    </a:lnTo>
+                    <a:lnTo>
+                      <a:pt x="422516" y="2074742"/>
+                    </a:lnTo>
+                    <a:lnTo>
+                      <a:pt x="504497" y="2326991"/>
+                    </a:lnTo>
+                    <a:lnTo>
+                      <a:pt x="599090" y="2787344"/>
+                    </a:lnTo>
+                    <a:lnTo>
+                      <a:pt x="813501" y="2888243"/>
+                    </a:lnTo>
+                    <a:lnTo>
+                      <a:pt x="1570246" y="2881937"/>
+                    </a:lnTo>
+                    <a:lnTo>
+                      <a:pt x="1753126" y="2579239"/>
+                    </a:lnTo>
+                    <a:lnTo>
+                      <a:pt x="1822494" y="2200867"/>
+                    </a:lnTo>
+                    <a:lnTo>
+                      <a:pt x="2150417" y="1790963"/>
+                    </a:lnTo>
+                    <a:lnTo>
+                      <a:pt x="2295460" y="1273854"/>
+                    </a:lnTo>
+                    <a:lnTo>
+                      <a:pt x="2282847" y="807195"/>
+                    </a:lnTo>
+                    <a:lnTo>
+                      <a:pt x="2049518" y="422516"/>
+                    </a:lnTo>
+                    <a:lnTo>
+                      <a:pt x="1765738" y="182880"/>
+                    </a:lnTo>
+                    <a:lnTo>
+                      <a:pt x="1412591" y="44144"/>
+                    </a:lnTo>
+                    <a:lnTo>
+                      <a:pt x="1059443" y="0"/>
+                    </a:lnTo>
+                    <a:close/>
+                  </a:path>
+                </a:pathLst>
+              </a:custGeom>
+              <a:gradFill flip="none" rotWithShape="1">
+                <a:gsLst>
+                  <a:gs pos="25000">
+                    <a:srgbClr val="FF0000"/>
+                  </a:gs>
+                  <a:gs pos="75000">
+                    <a:srgbClr val="0070C0">
+                      <a:alpha val="86000"/>
+                    </a:srgbClr>
+                  </a:gs>
+                </a:gsLst>
+                <a:lin ang="5400000" scaled="1"/>
+                <a:tileRect/>
+              </a:gradFill>
+            </p:spPr>
+            <p:style>
+              <a:lnRef idx="2">
+                <a:schemeClr val="accent1">
+                  <a:shade val="15000"/>
+                </a:schemeClr>
+              </a:lnRef>
+              <a:fillRef idx="1">
+                <a:schemeClr val="accent1"/>
+              </a:fillRef>
+              <a:effectRef idx="0">
+                <a:schemeClr val="accent1"/>
+              </a:effectRef>
+              <a:fontRef idx="minor">
+                <a:schemeClr val="lt1"/>
+              </a:fontRef>
+            </p:style>
+            <p:txBody>
+              <a:bodyPr rtlCol="0" anchor="ctr"/>
+              <a:lstStyle/>
+              <a:p>
+                <a:pPr algn="ctr"/>
+                <a:endParaRPr lang="en-GB" dirty="0"/>
+              </a:p>
+            </p:txBody>
+          </p:sp>
+          <p:pic>
+            <p:nvPicPr>
+              <p:cNvPr id="71" name="Graphic 70" descr="Huis met effen opvulling">
+                <a:extLst>
+                  <a:ext uri="{FF2B5EF4-FFF2-40B4-BE49-F238E27FC236}">
+                    <a16:creationId xmlns:a16="http://schemas.microsoft.com/office/drawing/2014/main" id="{95B6EAD8-CF86-65FF-491E-75FFEBA1DD18}"/>
+                  </a:ext>
+                </a:extLst>
+              </p:cNvPr>
+              <p:cNvPicPr>
+                <a:picLocks noChangeAspect="1"/>
+              </p:cNvPicPr>
+              <p:nvPr/>
+            </p:nvPicPr>
+            <p:blipFill>
+              <a:blip r:embed="rId2">
+                <a:extLst>
+                  <a:ext uri="{96DAC541-7B7A-43D3-8B79-37D633B846F1}">
+                    <asvg:svgBlip xmlns:asvg="http://schemas.microsoft.com/office/drawing/2016/SVG/main" r:embed="rId3"/>
+                  </a:ext>
+                </a:extLst>
+              </a:blip>
+              <a:srcRect/>
+              <a:stretch/>
+            </p:blipFill>
+            <p:spPr>
+              <a:xfrm>
+                <a:off x="5349458" y="1989735"/>
+                <a:ext cx="1512000" cy="1512000"/>
+              </a:xfrm>
+              <a:prstGeom prst="rect">
+                <a:avLst/>
+              </a:prstGeom>
+            </p:spPr>
+          </p:pic>
+          <p:sp>
+            <p:nvSpPr>
+              <p:cNvPr id="72" name="Rechthoek 71">
+                <a:extLst>
+                  <a:ext uri="{FF2B5EF4-FFF2-40B4-BE49-F238E27FC236}">
+                    <a16:creationId xmlns:a16="http://schemas.microsoft.com/office/drawing/2014/main" id="{96CCC52E-3CB6-E088-BCB8-AAD7EEE7C14B}"/>
+                  </a:ext>
+                </a:extLst>
+              </p:cNvPr>
+              <p:cNvSpPr/>
+              <p:nvPr/>
+            </p:nvSpPr>
+            <p:spPr>
+              <a:xfrm>
+                <a:off x="5714473" y="4617863"/>
+                <a:ext cx="781970" cy="510803"/>
+              </a:xfrm>
+              <a:prstGeom prst="rect">
+                <a:avLst/>
+              </a:prstGeom>
+              <a:solidFill>
+                <a:schemeClr val="bg2">
+                  <a:lumMod val="75000"/>
+                </a:schemeClr>
+              </a:solidFill>
+            </p:spPr>
+            <p:style>
+              <a:lnRef idx="2">
+                <a:schemeClr val="accent1">
+                  <a:shade val="15000"/>
+                </a:schemeClr>
+              </a:lnRef>
+              <a:fillRef idx="1">
+                <a:schemeClr val="accent1"/>
+              </a:fillRef>
+              <a:effectRef idx="0">
+                <a:schemeClr val="accent1"/>
+              </a:effectRef>
+              <a:fontRef idx="minor">
+                <a:schemeClr val="lt1"/>
+              </a:fontRef>
+            </p:style>
+            <p:txBody>
+              <a:bodyPr rtlCol="0" anchor="ctr"/>
+              <a:lstStyle/>
+              <a:p>
+                <a:pPr algn="ctr"/>
+                <a:endParaRPr lang="en-GB"/>
+              </a:p>
+            </p:txBody>
+          </p:sp>
+          <p:sp>
+            <p:nvSpPr>
+              <p:cNvPr id="73" name="Rechthoek 72">
+                <a:extLst>
+                  <a:ext uri="{FF2B5EF4-FFF2-40B4-BE49-F238E27FC236}">
+                    <a16:creationId xmlns:a16="http://schemas.microsoft.com/office/drawing/2014/main" id="{E7833457-DD71-5797-6494-00877FBB8B5C}"/>
+                  </a:ext>
+                </a:extLst>
+              </p:cNvPr>
+              <p:cNvSpPr/>
+              <p:nvPr/>
+            </p:nvSpPr>
+            <p:spPr>
+              <a:xfrm>
+                <a:off x="6357189" y="2363698"/>
+                <a:ext cx="158508" cy="45719"/>
+              </a:xfrm>
+              <a:prstGeom prst="rect">
+                <a:avLst/>
+              </a:prstGeom>
+              <a:solidFill>
+                <a:srgbClr val="FF0000"/>
+              </a:solidFill>
+              <a:ln>
+                <a:noFill/>
+              </a:ln>
+            </p:spPr>
+            <p:style>
+              <a:lnRef idx="2">
+                <a:schemeClr val="accent1">
+                  <a:shade val="15000"/>
+                </a:schemeClr>
+              </a:lnRef>
+              <a:fillRef idx="1">
+                <a:schemeClr val="accent1"/>
+              </a:fillRef>
+              <a:effectRef idx="0">
+                <a:schemeClr val="accent1"/>
+              </a:effectRef>
+              <a:fontRef idx="minor">
+                <a:schemeClr val="lt1"/>
+              </a:fontRef>
+            </p:style>
+            <p:txBody>
+              <a:bodyPr rtlCol="0" anchor="ctr"/>
+              <a:lstStyle/>
+              <a:p>
+                <a:pPr algn="ctr"/>
+                <a:endParaRPr lang="en-GB"/>
+              </a:p>
+            </p:txBody>
+          </p:sp>
+          <p:sp>
+            <p:nvSpPr>
+              <p:cNvPr id="74" name="Rechthoek 73">
+                <a:extLst>
+                  <a:ext uri="{FF2B5EF4-FFF2-40B4-BE49-F238E27FC236}">
+                    <a16:creationId xmlns:a16="http://schemas.microsoft.com/office/drawing/2014/main" id="{4A10B190-78B8-FED7-0697-069028A63072}"/>
+                  </a:ext>
+                </a:extLst>
+              </p:cNvPr>
+              <p:cNvSpPr/>
+              <p:nvPr/>
+            </p:nvSpPr>
+            <p:spPr>
+              <a:xfrm>
+                <a:off x="6337935" y="2320271"/>
+                <a:ext cx="158508" cy="45719"/>
+              </a:xfrm>
+              <a:prstGeom prst="rect">
+                <a:avLst/>
+              </a:prstGeom>
+              <a:solidFill>
+                <a:srgbClr val="FF0000"/>
+              </a:solidFill>
+              <a:ln>
+                <a:noFill/>
+              </a:ln>
+            </p:spPr>
+            <p:style>
+              <a:lnRef idx="2">
+                <a:schemeClr val="accent1">
+                  <a:shade val="15000"/>
+                </a:schemeClr>
+              </a:lnRef>
+              <a:fillRef idx="1">
+                <a:schemeClr val="accent1"/>
+              </a:fillRef>
+              <a:effectRef idx="0">
+                <a:schemeClr val="accent1"/>
+              </a:effectRef>
+              <a:fontRef idx="minor">
+                <a:schemeClr val="lt1"/>
+              </a:fontRef>
+            </p:style>
+            <p:txBody>
+              <a:bodyPr rtlCol="0" anchor="ctr"/>
+              <a:lstStyle/>
+              <a:p>
+                <a:pPr algn="ctr"/>
+                <a:endParaRPr lang="en-GB"/>
+              </a:p>
+            </p:txBody>
+          </p:sp>
+          <p:sp>
+            <p:nvSpPr>
+              <p:cNvPr id="75" name="Rechthoek 74">
+                <a:extLst>
+                  <a:ext uri="{FF2B5EF4-FFF2-40B4-BE49-F238E27FC236}">
+                    <a16:creationId xmlns:a16="http://schemas.microsoft.com/office/drawing/2014/main" id="{16ECF9E9-AC3F-219F-9FCE-ACA55004FBA8}"/>
+                  </a:ext>
+                </a:extLst>
+              </p:cNvPr>
+              <p:cNvSpPr/>
+              <p:nvPr/>
+            </p:nvSpPr>
+            <p:spPr>
+              <a:xfrm>
+                <a:off x="6329785" y="2284083"/>
+                <a:ext cx="158508" cy="45719"/>
+              </a:xfrm>
+              <a:prstGeom prst="rect">
+                <a:avLst/>
+              </a:prstGeom>
+              <a:solidFill>
+                <a:srgbClr val="FF0000"/>
+              </a:solidFill>
+              <a:ln>
+                <a:noFill/>
+              </a:ln>
+            </p:spPr>
+            <p:style>
+              <a:lnRef idx="2">
+                <a:schemeClr val="accent1">
+                  <a:shade val="15000"/>
+                </a:schemeClr>
+              </a:lnRef>
+              <a:fillRef idx="1">
+                <a:schemeClr val="accent1"/>
+              </a:fillRef>
+              <a:effectRef idx="0">
+                <a:schemeClr val="accent1"/>
+              </a:effectRef>
+              <a:fontRef idx="minor">
+                <a:schemeClr val="lt1"/>
+              </a:fontRef>
+            </p:style>
+            <p:txBody>
+              <a:bodyPr rtlCol="0" anchor="ctr"/>
+              <a:lstStyle/>
+              <a:p>
+                <a:pPr algn="ctr"/>
+                <a:endParaRPr lang="en-GB"/>
+              </a:p>
+            </p:txBody>
+          </p:sp>
+          <p:sp>
+            <p:nvSpPr>
+              <p:cNvPr id="76" name="Rechthoek 75">
+                <a:extLst>
+                  <a:ext uri="{FF2B5EF4-FFF2-40B4-BE49-F238E27FC236}">
+                    <a16:creationId xmlns:a16="http://schemas.microsoft.com/office/drawing/2014/main" id="{F4EE7669-E55A-9C25-1650-1E5F1BEFB74C}"/>
+                  </a:ext>
+                </a:extLst>
+              </p:cNvPr>
+              <p:cNvSpPr/>
+              <p:nvPr/>
+            </p:nvSpPr>
+            <p:spPr>
+              <a:xfrm>
+                <a:off x="6337935" y="2247895"/>
+                <a:ext cx="158508" cy="45719"/>
+              </a:xfrm>
+              <a:prstGeom prst="rect">
+                <a:avLst/>
+              </a:prstGeom>
+              <a:solidFill>
+                <a:srgbClr val="FF0000"/>
+              </a:solidFill>
+              <a:ln>
+                <a:noFill/>
+              </a:ln>
+            </p:spPr>
+            <p:style>
+              <a:lnRef idx="2">
+                <a:schemeClr val="accent1">
+                  <a:shade val="15000"/>
+                </a:schemeClr>
+              </a:lnRef>
+              <a:fillRef idx="1">
+                <a:schemeClr val="accent1"/>
+              </a:fillRef>
+              <a:effectRef idx="0">
+                <a:schemeClr val="accent1"/>
+              </a:effectRef>
+              <a:fontRef idx="minor">
+                <a:schemeClr val="lt1"/>
+              </a:fontRef>
+            </p:style>
+            <p:txBody>
+              <a:bodyPr rtlCol="0" anchor="ctr"/>
+              <a:lstStyle/>
+              <a:p>
+                <a:pPr algn="ctr"/>
+                <a:endParaRPr lang="en-GB"/>
+              </a:p>
+            </p:txBody>
+          </p:sp>
+          <p:sp>
+            <p:nvSpPr>
+              <p:cNvPr id="77" name="Rechthoekige driehoek 76">
+                <a:extLst>
+                  <a:ext uri="{FF2B5EF4-FFF2-40B4-BE49-F238E27FC236}">
+                    <a16:creationId xmlns:a16="http://schemas.microsoft.com/office/drawing/2014/main" id="{E2A5FA9A-68FB-689C-6FD2-4038D5D3543B}"/>
+                  </a:ext>
+                </a:extLst>
+              </p:cNvPr>
+              <p:cNvSpPr/>
+              <p:nvPr/>
+            </p:nvSpPr>
+            <p:spPr>
+              <a:xfrm rot="10680000">
+                <a:off x="6343981" y="2399892"/>
+                <a:ext cx="144000" cy="144000"/>
+              </a:xfrm>
+              <a:prstGeom prst="rtTriangle">
+                <a:avLst/>
+              </a:prstGeom>
+              <a:solidFill>
+                <a:srgbClr val="FA0305"/>
+              </a:solidFill>
+              <a:ln>
+                <a:noFill/>
+              </a:ln>
+            </p:spPr>
+            <p:style>
+              <a:lnRef idx="2">
+                <a:schemeClr val="accent1">
+                  <a:shade val="15000"/>
+                </a:schemeClr>
+              </a:lnRef>
+              <a:fillRef idx="1">
+                <a:schemeClr val="accent1"/>
+              </a:fillRef>
+              <a:effectRef idx="0">
+                <a:schemeClr val="accent1"/>
+              </a:effectRef>
+              <a:fontRef idx="minor">
+                <a:schemeClr val="lt1"/>
+              </a:fontRef>
+            </p:style>
+            <p:txBody>
+              <a:bodyPr rtlCol="0" anchor="ctr"/>
+              <a:lstStyle/>
+              <a:p>
+                <a:pPr algn="ctr"/>
+                <a:endParaRPr lang="en-GB"/>
+              </a:p>
+            </p:txBody>
+          </p:sp>
+          <p:sp>
+            <p:nvSpPr>
+              <p:cNvPr id="78" name="Rechthoekige driehoek 77">
+                <a:extLst>
+                  <a:ext uri="{FF2B5EF4-FFF2-40B4-BE49-F238E27FC236}">
+                    <a16:creationId xmlns:a16="http://schemas.microsoft.com/office/drawing/2014/main" id="{CDBDF683-24AF-AC07-F74E-6F8634F22736}"/>
+                  </a:ext>
+                </a:extLst>
+              </p:cNvPr>
+              <p:cNvSpPr/>
+              <p:nvPr/>
+            </p:nvSpPr>
+            <p:spPr>
+              <a:xfrm rot="10680000">
+                <a:off x="6380346" y="2435318"/>
+                <a:ext cx="108000" cy="108000"/>
+              </a:xfrm>
+              <a:prstGeom prst="rtTriangle">
+                <a:avLst/>
+              </a:prstGeom>
+              <a:solidFill>
+                <a:srgbClr val="F1080D"/>
+              </a:solidFill>
+              <a:ln>
+                <a:noFill/>
+              </a:ln>
+            </p:spPr>
+            <p:style>
+              <a:lnRef idx="2">
+                <a:schemeClr val="accent1">
+                  <a:shade val="15000"/>
+                </a:schemeClr>
+              </a:lnRef>
+              <a:fillRef idx="1">
+                <a:schemeClr val="accent1"/>
+              </a:fillRef>
+              <a:effectRef idx="0">
+                <a:schemeClr val="accent1"/>
+              </a:effectRef>
+              <a:fontRef idx="minor">
+                <a:schemeClr val="lt1"/>
+              </a:fontRef>
+            </p:style>
+            <p:txBody>
+              <a:bodyPr rtlCol="0" anchor="ctr"/>
+              <a:lstStyle/>
+              <a:p>
+                <a:pPr algn="ctr"/>
+                <a:endParaRPr lang="en-GB"/>
+              </a:p>
+            </p:txBody>
+          </p:sp>
+          <p:sp>
+            <p:nvSpPr>
+              <p:cNvPr id="79" name="Rechthoekige driehoek 78">
+                <a:extLst>
+                  <a:ext uri="{FF2B5EF4-FFF2-40B4-BE49-F238E27FC236}">
+                    <a16:creationId xmlns:a16="http://schemas.microsoft.com/office/drawing/2014/main" id="{F619FDB9-47E7-2522-11C3-0F17269FBA2D}"/>
+                  </a:ext>
+                </a:extLst>
+              </p:cNvPr>
+              <p:cNvSpPr/>
+              <p:nvPr/>
+            </p:nvSpPr>
+            <p:spPr>
+              <a:xfrm rot="10680000">
+                <a:off x="6419962" y="2474435"/>
+                <a:ext cx="72000" cy="72000"/>
+              </a:xfrm>
+              <a:prstGeom prst="rtTriangle">
+                <a:avLst/>
+              </a:prstGeom>
+              <a:solidFill>
+                <a:srgbClr val="EA0C13"/>
+              </a:solidFill>
+              <a:ln>
+                <a:noFill/>
+              </a:ln>
+            </p:spPr>
+            <p:style>
+              <a:lnRef idx="2">
+                <a:schemeClr val="accent1">
+                  <a:shade val="15000"/>
+                </a:schemeClr>
+              </a:lnRef>
+              <a:fillRef idx="1">
+                <a:schemeClr val="accent1"/>
+              </a:fillRef>
+              <a:effectRef idx="0">
+                <a:schemeClr val="accent1"/>
+              </a:effectRef>
+              <a:fontRef idx="minor">
+                <a:schemeClr val="lt1"/>
+              </a:fontRef>
+            </p:style>
+            <p:txBody>
+              <a:bodyPr rtlCol="0" anchor="ctr"/>
+              <a:lstStyle/>
+              <a:p>
+                <a:pPr algn="ctr"/>
+                <a:endParaRPr lang="en-GB"/>
+              </a:p>
+            </p:txBody>
+          </p:sp>
+          <p:sp>
+            <p:nvSpPr>
+              <p:cNvPr id="80" name="Rechthoekige driehoek 79">
+                <a:extLst>
+                  <a:ext uri="{FF2B5EF4-FFF2-40B4-BE49-F238E27FC236}">
+                    <a16:creationId xmlns:a16="http://schemas.microsoft.com/office/drawing/2014/main" id="{59F88A0E-6130-6D31-67E4-8697C6E90241}"/>
+                  </a:ext>
+                </a:extLst>
+              </p:cNvPr>
+              <p:cNvSpPr/>
+              <p:nvPr/>
+            </p:nvSpPr>
+            <p:spPr>
+              <a:xfrm rot="10680000">
+                <a:off x="6438062" y="2492435"/>
+                <a:ext cx="36000" cy="36000"/>
+              </a:xfrm>
+              <a:prstGeom prst="rtTriangle">
+                <a:avLst/>
+              </a:prstGeom>
+              <a:solidFill>
+                <a:srgbClr val="EA0C13"/>
+              </a:solidFill>
+              <a:ln>
+                <a:noFill/>
+              </a:ln>
+            </p:spPr>
+            <p:style>
+              <a:lnRef idx="2">
+                <a:schemeClr val="accent1">
+                  <a:shade val="15000"/>
+                </a:schemeClr>
+              </a:lnRef>
+              <a:fillRef idx="1">
+                <a:schemeClr val="accent1"/>
+              </a:fillRef>
+              <a:effectRef idx="0">
+                <a:schemeClr val="accent1"/>
+              </a:effectRef>
+              <a:fontRef idx="minor">
+                <a:schemeClr val="lt1"/>
+              </a:fontRef>
+            </p:style>
+            <p:txBody>
+              <a:bodyPr rtlCol="0" anchor="ctr"/>
+              <a:lstStyle/>
+              <a:p>
+                <a:pPr algn="ctr"/>
+                <a:endParaRPr lang="en-GB"/>
+              </a:p>
+            </p:txBody>
+          </p:sp>
+          <p:pic>
+            <p:nvPicPr>
+              <p:cNvPr id="81" name="Afbeelding 80" descr="Afbeelding met zwart, duisternis&#10;&#10;Door AI gegenereerde inhoud is mogelijk onjuist.">
+                <a:extLst>
+                  <a:ext uri="{FF2B5EF4-FFF2-40B4-BE49-F238E27FC236}">
+                    <a16:creationId xmlns:a16="http://schemas.microsoft.com/office/drawing/2014/main" id="{C3D770F1-7895-782A-A59E-94F16FE7F666}"/>
+                  </a:ext>
+                </a:extLst>
+              </p:cNvPr>
+              <p:cNvPicPr>
+                <a:picLocks noChangeAspect="1"/>
+              </p:cNvPicPr>
+              <p:nvPr/>
+            </p:nvPicPr>
+            <p:blipFill>
+              <a:blip r:embed="rId4">
+                <a:extLst>
+                  <a:ext uri="{28A0092B-C50C-407E-A947-70E740481C1C}">
+                    <a14:useLocalDpi xmlns:a14="http://schemas.microsoft.com/office/drawing/2010/main" val="0"/>
+                  </a:ext>
+                </a:extLst>
+              </a:blip>
+              <a:srcRect l="23291" t="23267" r="23403"/>
+              <a:stretch/>
+            </p:blipFill>
+            <p:spPr>
+              <a:xfrm>
+                <a:off x="4768543" y="1518219"/>
+                <a:ext cx="2654913" cy="3821561"/>
+              </a:xfrm>
+              <a:prstGeom prst="rect">
+                <a:avLst/>
+              </a:prstGeom>
+            </p:spPr>
+          </p:pic>
+        </p:grpSp>
+      </p:grpSp>
+    </p:spTree>
+    <p:extLst>
+      <p:ext uri="{BB962C8B-B14F-4D97-AF65-F5344CB8AC3E}">
+        <p14:creationId xmlns:p14="http://schemas.microsoft.com/office/powerpoint/2010/main" val="908596958"/>
+      </p:ext>
+    </p:extLst>
+  </p:cSld>
+  <p:clrMapOvr>
+    <a:masterClrMapping/>
+  </p:clrMapOvr>
+</p:sld>
+</file>
+
+<file path=ppt/slides/slide3.xml><?xml version="1.0" encoding="utf-8"?>
+<p:sld xmlns:a="http://schemas.openxmlformats.org/drawingml/2006/main" xmlns:r="http://schemas.openxmlformats.org/officeDocument/2006/relationships" xmlns:p="http://schemas.openxmlformats.org/presentationml/2006/main">
+  <p:cSld>
     <p:spTree>
       <p:nvGrpSpPr>
         <p:cNvPr id="1" name="">

</xml_diff>

<commit_message>
Changed outline of bulb and house to white
</commit_message>
<xml_diff>
--- a/IDEAS/Resources/Images/IDEAS-logo-development.pptx
+++ b/IDEAS/Resources/Images/IDEAS-logo-development.pptx
@@ -8,6 +8,7 @@
     <p:sldId id="271" r:id="rId2"/>
     <p:sldId id="272" r:id="rId3"/>
     <p:sldId id="269" r:id="rId4"/>
+    <p:sldId id="273" r:id="rId5"/>
   </p:sldIdLst>
   <p:sldSz cx="12192000" cy="6858000"/>
   <p:notesSz cx="6858000" cy="9144000"/>
@@ -4862,12 +4863,595 @@
           </a:p>
         </p:txBody>
       </p:sp>
+      <p:cxnSp>
+        <p:nvCxnSpPr>
+          <p:cNvPr id="17" name="Rechte verbindingslijn 16">
+            <a:extLst>
+              <a:ext uri="{FF2B5EF4-FFF2-40B4-BE49-F238E27FC236}">
+                <a16:creationId xmlns:a16="http://schemas.microsoft.com/office/drawing/2014/main" id="{DF849851-2F4B-DD65-8AC3-CC26138F2123}"/>
+              </a:ext>
+            </a:extLst>
+          </p:cNvPr>
+          <p:cNvCxnSpPr>
+            <a:cxnSpLocks/>
+          </p:cNvCxnSpPr>
+          <p:nvPr/>
+        </p:nvCxnSpPr>
+        <p:spPr>
+          <a:xfrm flipH="1" flipV="1">
+            <a:off x="9157311" y="2343442"/>
+            <a:ext cx="112" cy="2089719"/>
+          </a:xfrm>
+          <a:prstGeom prst="line">
+            <a:avLst/>
+          </a:prstGeom>
+          <a:ln w="101600">
+            <a:solidFill>
+              <a:srgbClr val="FF0000"/>
+            </a:solidFill>
+          </a:ln>
+        </p:spPr>
+        <p:style>
+          <a:lnRef idx="2">
+            <a:schemeClr val="accent1"/>
+          </a:lnRef>
+          <a:fillRef idx="0">
+            <a:schemeClr val="accent1"/>
+          </a:fillRef>
+          <a:effectRef idx="1">
+            <a:schemeClr val="accent1"/>
+          </a:effectRef>
+          <a:fontRef idx="minor">
+            <a:schemeClr val="tx1"/>
+          </a:fontRef>
+        </p:style>
+      </p:cxnSp>
+      <p:cxnSp>
+        <p:nvCxnSpPr>
+          <p:cNvPr id="6" name="Rechte verbindingslijn 5">
+            <a:extLst>
+              <a:ext uri="{FF2B5EF4-FFF2-40B4-BE49-F238E27FC236}">
+                <a16:creationId xmlns:a16="http://schemas.microsoft.com/office/drawing/2014/main" id="{189B7256-294A-57CD-41B4-31A9E469CD72}"/>
+              </a:ext>
+            </a:extLst>
+          </p:cNvPr>
+          <p:cNvCxnSpPr>
+            <a:cxnSpLocks/>
+          </p:cNvCxnSpPr>
+          <p:nvPr/>
+        </p:nvCxnSpPr>
+        <p:spPr>
+          <a:xfrm flipV="1">
+            <a:off x="8311469" y="3797775"/>
+            <a:ext cx="0" cy="1949723"/>
+          </a:xfrm>
+          <a:prstGeom prst="line">
+            <a:avLst/>
+          </a:prstGeom>
+          <a:ln w="101600">
+            <a:solidFill>
+              <a:srgbClr val="0070C0"/>
+            </a:solidFill>
+          </a:ln>
+        </p:spPr>
+        <p:style>
+          <a:lnRef idx="2">
+            <a:schemeClr val="accent1"/>
+          </a:lnRef>
+          <a:fillRef idx="0">
+            <a:schemeClr val="accent1"/>
+          </a:fillRef>
+          <a:effectRef idx="1">
+            <a:schemeClr val="accent1"/>
+          </a:effectRef>
+          <a:fontRef idx="minor">
+            <a:schemeClr val="tx1"/>
+          </a:fontRef>
+        </p:style>
+      </p:cxnSp>
+      <p:sp>
+        <p:nvSpPr>
+          <p:cNvPr id="18" name="Tekstvak 17">
+            <a:extLst>
+              <a:ext uri="{FF2B5EF4-FFF2-40B4-BE49-F238E27FC236}">
+                <a16:creationId xmlns:a16="http://schemas.microsoft.com/office/drawing/2014/main" id="{58A5624F-1D02-1A4C-33C6-187009711603}"/>
+              </a:ext>
+            </a:extLst>
+          </p:cNvPr>
+          <p:cNvSpPr txBox="1"/>
+          <p:nvPr/>
+        </p:nvSpPr>
+        <p:spPr>
+          <a:xfrm>
+            <a:off x="1767489" y="3870211"/>
+            <a:ext cx="5903311" cy="3170099"/>
+          </a:xfrm>
+          <a:prstGeom prst="rect">
+            <a:avLst/>
+          </a:prstGeom>
+          <a:noFill/>
+        </p:spPr>
+        <p:txBody>
+          <a:bodyPr wrap="square" rtlCol="0">
+            <a:spAutoFit/>
+          </a:bodyPr>
+          <a:lstStyle/>
+          <a:p>
+            <a:r>
+              <a:rPr lang="en-GB" sz="20000" b="1" dirty="0">
+                <a:solidFill>
+                  <a:schemeClr val="bg1"/>
+                </a:solidFill>
+              </a:rPr>
+              <a:t>IDEA</a:t>
+            </a:r>
+          </a:p>
+        </p:txBody>
+      </p:sp>
+      <p:cxnSp>
+        <p:nvCxnSpPr>
+          <p:cNvPr id="3" name="Rechte verbindingslijn 2">
+            <a:extLst>
+              <a:ext uri="{FF2B5EF4-FFF2-40B4-BE49-F238E27FC236}">
+                <a16:creationId xmlns:a16="http://schemas.microsoft.com/office/drawing/2014/main" id="{75C4DD61-7332-0A12-F241-CF510FB48811}"/>
+              </a:ext>
+            </a:extLst>
+          </p:cNvPr>
+          <p:cNvCxnSpPr>
+            <a:cxnSpLocks/>
+          </p:cNvCxnSpPr>
+          <p:nvPr/>
+        </p:nvCxnSpPr>
+        <p:spPr>
+          <a:xfrm>
+            <a:off x="7688460" y="6170019"/>
+            <a:ext cx="998340" cy="0"/>
+          </a:xfrm>
+          <a:prstGeom prst="line">
+            <a:avLst/>
+          </a:prstGeom>
+          <a:ln w="254000">
+            <a:solidFill>
+              <a:srgbClr val="0070C0"/>
+            </a:solidFill>
+          </a:ln>
+        </p:spPr>
+        <p:style>
+          <a:lnRef idx="2">
+            <a:schemeClr val="accent1"/>
+          </a:lnRef>
+          <a:fillRef idx="0">
+            <a:schemeClr val="accent1"/>
+          </a:fillRef>
+          <a:effectRef idx="1">
+            <a:schemeClr val="accent1"/>
+          </a:effectRef>
+          <a:fontRef idx="minor">
+            <a:schemeClr val="tx1"/>
+          </a:fontRef>
+        </p:style>
+      </p:cxnSp>
+      <p:cxnSp>
+        <p:nvCxnSpPr>
+          <p:cNvPr id="4" name="Rechte verbindingslijn 3">
+            <a:extLst>
+              <a:ext uri="{FF2B5EF4-FFF2-40B4-BE49-F238E27FC236}">
+                <a16:creationId xmlns:a16="http://schemas.microsoft.com/office/drawing/2014/main" id="{8756F14D-0259-855C-D0C1-B634E086DA13}"/>
+              </a:ext>
+            </a:extLst>
+          </p:cNvPr>
+          <p:cNvCxnSpPr>
+            <a:cxnSpLocks/>
+          </p:cNvCxnSpPr>
+          <p:nvPr/>
+        </p:nvCxnSpPr>
+        <p:spPr>
+          <a:xfrm>
+            <a:off x="7946050" y="4583687"/>
+            <a:ext cx="1067416" cy="0"/>
+          </a:xfrm>
+          <a:prstGeom prst="line">
+            <a:avLst/>
+          </a:prstGeom>
+          <a:ln w="254000">
+            <a:solidFill>
+              <a:srgbClr val="FF0000"/>
+            </a:solidFill>
+          </a:ln>
+        </p:spPr>
+        <p:style>
+          <a:lnRef idx="2">
+            <a:schemeClr val="accent1"/>
+          </a:lnRef>
+          <a:fillRef idx="0">
+            <a:schemeClr val="accent1"/>
+          </a:fillRef>
+          <a:effectRef idx="1">
+            <a:schemeClr val="accent1"/>
+          </a:effectRef>
+          <a:fontRef idx="minor">
+            <a:schemeClr val="tx1"/>
+          </a:fontRef>
+        </p:style>
+      </p:cxnSp>
+      <p:sp>
+        <p:nvSpPr>
+          <p:cNvPr id="9" name="Boog 8">
+            <a:extLst>
+              <a:ext uri="{FF2B5EF4-FFF2-40B4-BE49-F238E27FC236}">
+                <a16:creationId xmlns:a16="http://schemas.microsoft.com/office/drawing/2014/main" id="{A56B6363-CEEA-872E-DC9A-7E025BF7C191}"/>
+              </a:ext>
+            </a:extLst>
+          </p:cNvPr>
+          <p:cNvSpPr/>
+          <p:nvPr/>
+        </p:nvSpPr>
+        <p:spPr>
+          <a:xfrm rot="5400000">
+            <a:off x="8869466" y="4290786"/>
+            <a:ext cx="288000" cy="288000"/>
+          </a:xfrm>
+          <a:prstGeom prst="arc">
+            <a:avLst>
+              <a:gd name="adj1" fmla="val 16115718"/>
+              <a:gd name="adj2" fmla="val 0"/>
+            </a:avLst>
+          </a:prstGeom>
+          <a:ln w="101600">
+            <a:solidFill>
+              <a:srgbClr val="FF0000"/>
+            </a:solidFill>
+          </a:ln>
+        </p:spPr>
+        <p:style>
+          <a:lnRef idx="2">
+            <a:schemeClr val="accent1"/>
+          </a:lnRef>
+          <a:fillRef idx="0">
+            <a:schemeClr val="accent1"/>
+          </a:fillRef>
+          <a:effectRef idx="1">
+            <a:schemeClr val="accent1"/>
+          </a:effectRef>
+          <a:fontRef idx="minor">
+            <a:schemeClr val="tx1"/>
+          </a:fontRef>
+        </p:style>
+        <p:txBody>
+          <a:bodyPr rtlCol="0" anchor="ctr"/>
+          <a:lstStyle/>
+          <a:p>
+            <a:pPr algn="ctr"/>
+            <a:endParaRPr lang="en-GB"/>
+          </a:p>
+        </p:txBody>
+      </p:sp>
+      <p:sp>
+        <p:nvSpPr>
+          <p:cNvPr id="11" name="Boog 10">
+            <a:extLst>
+              <a:ext uri="{FF2B5EF4-FFF2-40B4-BE49-F238E27FC236}">
+                <a16:creationId xmlns:a16="http://schemas.microsoft.com/office/drawing/2014/main" id="{9A19F3C6-E052-AEF0-4319-2172901FCA71}"/>
+              </a:ext>
+            </a:extLst>
+          </p:cNvPr>
+          <p:cNvSpPr/>
+          <p:nvPr/>
+        </p:nvSpPr>
+        <p:spPr>
+          <a:xfrm rot="10800000">
+            <a:off x="7550051" y="4583901"/>
+            <a:ext cx="792000" cy="792000"/>
+          </a:xfrm>
+          <a:prstGeom prst="arc">
+            <a:avLst>
+              <a:gd name="adj1" fmla="val 16200000"/>
+              <a:gd name="adj2" fmla="val 5420031"/>
+            </a:avLst>
+          </a:prstGeom>
+          <a:ln w="254000">
+            <a:gradFill flip="none" rotWithShape="1">
+              <a:gsLst>
+                <a:gs pos="0">
+                  <a:srgbClr val="FF0000"/>
+                </a:gs>
+                <a:gs pos="100000">
+                  <a:srgbClr val="C84B80"/>
+                </a:gs>
+              </a:gsLst>
+              <a:lin ang="16500000" scaled="0"/>
+              <a:tileRect/>
+            </a:gradFill>
+          </a:ln>
+        </p:spPr>
+        <p:style>
+          <a:lnRef idx="2">
+            <a:schemeClr val="accent1"/>
+          </a:lnRef>
+          <a:fillRef idx="0">
+            <a:schemeClr val="accent1"/>
+          </a:fillRef>
+          <a:effectRef idx="1">
+            <a:schemeClr val="accent1"/>
+          </a:effectRef>
+          <a:fontRef idx="minor">
+            <a:schemeClr val="tx1"/>
+          </a:fontRef>
+        </p:style>
+        <p:txBody>
+          <a:bodyPr rtlCol="0" anchor="ctr"/>
+          <a:lstStyle/>
+          <a:p>
+            <a:pPr algn="ctr"/>
+            <a:endParaRPr lang="en-GB" dirty="0"/>
+          </a:p>
+        </p:txBody>
+      </p:sp>
+      <p:sp>
+        <p:nvSpPr>
+          <p:cNvPr id="12" name="Boog 11">
+            <a:extLst>
+              <a:ext uri="{FF2B5EF4-FFF2-40B4-BE49-F238E27FC236}">
+                <a16:creationId xmlns:a16="http://schemas.microsoft.com/office/drawing/2014/main" id="{4EEEABAF-5A0C-581C-BBDF-C9F565797103}"/>
+              </a:ext>
+            </a:extLst>
+          </p:cNvPr>
+          <p:cNvSpPr/>
+          <p:nvPr/>
+        </p:nvSpPr>
+        <p:spPr>
+          <a:xfrm>
+            <a:off x="8290800" y="5377595"/>
+            <a:ext cx="792000" cy="792000"/>
+          </a:xfrm>
+          <a:prstGeom prst="arc">
+            <a:avLst>
+              <a:gd name="adj1" fmla="val 16200000"/>
+              <a:gd name="adj2" fmla="val 5420031"/>
+            </a:avLst>
+          </a:prstGeom>
+          <a:ln w="254000">
+            <a:gradFill>
+              <a:gsLst>
+                <a:gs pos="0">
+                  <a:srgbClr val="A85897"/>
+                </a:gs>
+                <a:gs pos="100000">
+                  <a:srgbClr val="0070C0"/>
+                </a:gs>
+              </a:gsLst>
+              <a:lin ang="5400000" scaled="1"/>
+            </a:gradFill>
+          </a:ln>
+        </p:spPr>
+        <p:style>
+          <a:lnRef idx="2">
+            <a:schemeClr val="accent1"/>
+          </a:lnRef>
+          <a:fillRef idx="0">
+            <a:schemeClr val="accent1"/>
+          </a:fillRef>
+          <a:effectRef idx="1">
+            <a:schemeClr val="accent1"/>
+          </a:effectRef>
+          <a:fontRef idx="minor">
+            <a:schemeClr val="tx1"/>
+          </a:fontRef>
+        </p:style>
+        <p:txBody>
+          <a:bodyPr rtlCol="0" anchor="ctr"/>
+          <a:lstStyle/>
+          <a:p>
+            <a:pPr algn="ctr"/>
+            <a:endParaRPr lang="en-GB"/>
+          </a:p>
+        </p:txBody>
+      </p:sp>
+      <p:sp>
+        <p:nvSpPr>
+          <p:cNvPr id="13" name="Boog 12">
+            <a:extLst>
+              <a:ext uri="{FF2B5EF4-FFF2-40B4-BE49-F238E27FC236}">
+                <a16:creationId xmlns:a16="http://schemas.microsoft.com/office/drawing/2014/main" id="{82AA2F0A-262B-ED4F-EFD8-620D894818AD}"/>
+              </a:ext>
+            </a:extLst>
+          </p:cNvPr>
+          <p:cNvSpPr/>
+          <p:nvPr/>
+        </p:nvSpPr>
+        <p:spPr>
+          <a:xfrm rot="10800000">
+            <a:off x="7551680" y="5913530"/>
+            <a:ext cx="273561" cy="255639"/>
+          </a:xfrm>
+          <a:prstGeom prst="arc">
+            <a:avLst>
+              <a:gd name="adj1" fmla="val 16200000"/>
+              <a:gd name="adj2" fmla="val 5416196"/>
+            </a:avLst>
+          </a:prstGeom>
+          <a:ln w="101600">
+            <a:solidFill>
+              <a:srgbClr val="0070C0"/>
+            </a:solidFill>
+          </a:ln>
+        </p:spPr>
+        <p:style>
+          <a:lnRef idx="2">
+            <a:schemeClr val="accent1"/>
+          </a:lnRef>
+          <a:fillRef idx="0">
+            <a:schemeClr val="accent1"/>
+          </a:fillRef>
+          <a:effectRef idx="1">
+            <a:schemeClr val="accent1"/>
+          </a:effectRef>
+          <a:fontRef idx="minor">
+            <a:schemeClr val="tx1"/>
+          </a:fontRef>
+        </p:style>
+        <p:txBody>
+          <a:bodyPr rtlCol="0" anchor="ctr"/>
+          <a:lstStyle/>
+          <a:p>
+            <a:pPr algn="ctr"/>
+            <a:endParaRPr lang="en-GB"/>
+          </a:p>
+        </p:txBody>
+      </p:sp>
+      <p:cxnSp>
+        <p:nvCxnSpPr>
+          <p:cNvPr id="14" name="Rechte verbindingslijn 13">
+            <a:extLst>
+              <a:ext uri="{FF2B5EF4-FFF2-40B4-BE49-F238E27FC236}">
+                <a16:creationId xmlns:a16="http://schemas.microsoft.com/office/drawing/2014/main" id="{E552F46F-7BC3-6D46-1A0A-4A87606BE2F7}"/>
+              </a:ext>
+            </a:extLst>
+          </p:cNvPr>
+          <p:cNvCxnSpPr>
+            <a:cxnSpLocks/>
+          </p:cNvCxnSpPr>
+          <p:nvPr/>
+        </p:nvCxnSpPr>
+        <p:spPr>
+          <a:xfrm>
+            <a:off x="7946050" y="5377438"/>
+            <a:ext cx="740750" cy="0"/>
+          </a:xfrm>
+          <a:prstGeom prst="line">
+            <a:avLst/>
+          </a:prstGeom>
+          <a:ln w="254000">
+            <a:gradFill flip="none" rotWithShape="1">
+              <a:gsLst>
+                <a:gs pos="0">
+                  <a:srgbClr val="C84B80"/>
+                </a:gs>
+                <a:gs pos="100000">
+                  <a:srgbClr val="A85897"/>
+                </a:gs>
+              </a:gsLst>
+              <a:lin ang="0" scaled="0"/>
+              <a:tileRect/>
+            </a:gradFill>
+          </a:ln>
+        </p:spPr>
+        <p:style>
+          <a:lnRef idx="2">
+            <a:schemeClr val="accent1"/>
+          </a:lnRef>
+          <a:fillRef idx="0">
+            <a:schemeClr val="accent1"/>
+          </a:fillRef>
+          <a:effectRef idx="1">
+            <a:schemeClr val="accent1"/>
+          </a:effectRef>
+          <a:fontRef idx="minor">
+            <a:schemeClr val="tx1"/>
+          </a:fontRef>
+        </p:style>
+      </p:cxnSp>
+      <p:sp>
+        <p:nvSpPr>
+          <p:cNvPr id="31" name="Boog 30">
+            <a:extLst>
+              <a:ext uri="{FF2B5EF4-FFF2-40B4-BE49-F238E27FC236}">
+                <a16:creationId xmlns:a16="http://schemas.microsoft.com/office/drawing/2014/main" id="{FD3CC2C9-468F-1E7D-D6C3-BD0D0BAFD056}"/>
+              </a:ext>
+            </a:extLst>
+          </p:cNvPr>
+          <p:cNvSpPr/>
+          <p:nvPr/>
+        </p:nvSpPr>
+        <p:spPr>
+          <a:xfrm rot="5400000">
+            <a:off x="8003603" y="5605549"/>
+            <a:ext cx="334119" cy="282084"/>
+          </a:xfrm>
+          <a:prstGeom prst="arc">
+            <a:avLst>
+              <a:gd name="adj1" fmla="val 16200000"/>
+              <a:gd name="adj2" fmla="val 10626"/>
+            </a:avLst>
+          </a:prstGeom>
+          <a:ln w="101600">
+            <a:solidFill>
+              <a:srgbClr val="0070C0"/>
+            </a:solidFill>
+          </a:ln>
+        </p:spPr>
+        <p:style>
+          <a:lnRef idx="2">
+            <a:schemeClr val="accent1"/>
+          </a:lnRef>
+          <a:fillRef idx="0">
+            <a:schemeClr val="accent1"/>
+          </a:fillRef>
+          <a:effectRef idx="1">
+            <a:schemeClr val="accent1"/>
+          </a:effectRef>
+          <a:fontRef idx="minor">
+            <a:schemeClr val="tx1"/>
+          </a:fontRef>
+        </p:style>
+        <p:txBody>
+          <a:bodyPr rtlCol="0" anchor="ctr"/>
+          <a:lstStyle/>
+          <a:p>
+            <a:pPr algn="ctr"/>
+            <a:endParaRPr lang="en-GB"/>
+          </a:p>
+        </p:txBody>
+      </p:sp>
+      <p:cxnSp>
+        <p:nvCxnSpPr>
+          <p:cNvPr id="40" name="Rechte verbindingslijn 39">
+            <a:extLst>
+              <a:ext uri="{FF2B5EF4-FFF2-40B4-BE49-F238E27FC236}">
+                <a16:creationId xmlns:a16="http://schemas.microsoft.com/office/drawing/2014/main" id="{4E82E7B7-8C0E-DAFC-50D3-3596C9A7BAC7}"/>
+              </a:ext>
+            </a:extLst>
+          </p:cNvPr>
+          <p:cNvCxnSpPr>
+            <a:cxnSpLocks/>
+          </p:cNvCxnSpPr>
+          <p:nvPr/>
+        </p:nvCxnSpPr>
+        <p:spPr>
+          <a:xfrm>
+            <a:off x="7687563" y="5912647"/>
+            <a:ext cx="482428" cy="0"/>
+          </a:xfrm>
+          <a:prstGeom prst="line">
+            <a:avLst/>
+          </a:prstGeom>
+          <a:ln w="101600">
+            <a:solidFill>
+              <a:srgbClr val="0070C0"/>
+            </a:solidFill>
+          </a:ln>
+        </p:spPr>
+        <p:style>
+          <a:lnRef idx="2">
+            <a:schemeClr val="accent1"/>
+          </a:lnRef>
+          <a:fillRef idx="0">
+            <a:schemeClr val="accent1"/>
+          </a:fillRef>
+          <a:effectRef idx="1">
+            <a:schemeClr val="accent1"/>
+          </a:effectRef>
+          <a:fontRef idx="minor">
+            <a:schemeClr val="tx1"/>
+          </a:fontRef>
+        </p:style>
+      </p:cxnSp>
       <p:grpSp>
         <p:nvGrpSpPr>
-          <p:cNvPr id="82" name="Groep 81">
-            <a:extLst>
-              <a:ext uri="{FF2B5EF4-FFF2-40B4-BE49-F238E27FC236}">
-                <a16:creationId xmlns:a16="http://schemas.microsoft.com/office/drawing/2014/main" id="{2E444D89-5FDC-AAE8-84D8-A71E5D26E51B}"/>
+          <p:cNvPr id="25" name="Group 24">
+            <a:extLst>
+              <a:ext uri="{FF2B5EF4-FFF2-40B4-BE49-F238E27FC236}">
+                <a16:creationId xmlns:a16="http://schemas.microsoft.com/office/drawing/2014/main" id="{16F7CDBA-D553-6685-9AF2-DB4D77BB90A0}"/>
               </a:ext>
             </a:extLst>
           </p:cNvPr>
@@ -4876,229 +5460,18 @@
         </p:nvGrpSpPr>
         <p:grpSpPr>
           <a:xfrm>
-            <a:off x="1767489" y="359350"/>
-            <a:ext cx="7872031" cy="6680960"/>
-            <a:chOff x="1767489" y="359350"/>
-            <a:chExt cx="7872031" cy="6680960"/>
+            <a:off x="6964805" y="370240"/>
+            <a:ext cx="2651990" cy="3820491"/>
+            <a:chOff x="4779463" y="1518754"/>
+            <a:chExt cx="2651990" cy="3820491"/>
           </a:xfrm>
         </p:grpSpPr>
-        <p:cxnSp>
-          <p:nvCxnSpPr>
-            <p:cNvPr id="17" name="Rechte verbindingslijn 16">
+        <p:sp>
+          <p:nvSpPr>
+            <p:cNvPr id="26" name="Vrije vorm: vorm 9">
               <a:extLst>
                 <a:ext uri="{FF2B5EF4-FFF2-40B4-BE49-F238E27FC236}">
-                  <a16:creationId xmlns:a16="http://schemas.microsoft.com/office/drawing/2014/main" id="{DF849851-2F4B-DD65-8AC3-CC26138F2123}"/>
-                </a:ext>
-              </a:extLst>
-            </p:cNvPr>
-            <p:cNvCxnSpPr>
-              <a:cxnSpLocks/>
-            </p:cNvCxnSpPr>
-            <p:nvPr/>
-          </p:nvCxnSpPr>
-          <p:spPr>
-            <a:xfrm flipH="1" flipV="1">
-              <a:off x="9157311" y="2343442"/>
-              <a:ext cx="112" cy="2089719"/>
-            </a:xfrm>
-            <a:prstGeom prst="line">
-              <a:avLst/>
-            </a:prstGeom>
-            <a:ln w="101600">
-              <a:solidFill>
-                <a:srgbClr val="FF0000"/>
-              </a:solidFill>
-            </a:ln>
-          </p:spPr>
-          <p:style>
-            <a:lnRef idx="2">
-              <a:schemeClr val="accent1"/>
-            </a:lnRef>
-            <a:fillRef idx="0">
-              <a:schemeClr val="accent1"/>
-            </a:fillRef>
-            <a:effectRef idx="1">
-              <a:schemeClr val="accent1"/>
-            </a:effectRef>
-            <a:fontRef idx="minor">
-              <a:schemeClr val="tx1"/>
-            </a:fontRef>
-          </p:style>
-        </p:cxnSp>
-        <p:cxnSp>
-          <p:nvCxnSpPr>
-            <p:cNvPr id="6" name="Rechte verbindingslijn 5">
-              <a:extLst>
-                <a:ext uri="{FF2B5EF4-FFF2-40B4-BE49-F238E27FC236}">
-                  <a16:creationId xmlns:a16="http://schemas.microsoft.com/office/drawing/2014/main" id="{189B7256-294A-57CD-41B4-31A9E469CD72}"/>
-                </a:ext>
-              </a:extLst>
-            </p:cNvPr>
-            <p:cNvCxnSpPr>
-              <a:cxnSpLocks/>
-            </p:cNvCxnSpPr>
-            <p:nvPr/>
-          </p:nvCxnSpPr>
-          <p:spPr>
-            <a:xfrm flipV="1">
-              <a:off x="8311469" y="3797775"/>
-              <a:ext cx="0" cy="1949723"/>
-            </a:xfrm>
-            <a:prstGeom prst="line">
-              <a:avLst/>
-            </a:prstGeom>
-            <a:ln w="101600">
-              <a:solidFill>
-                <a:srgbClr val="0070C0"/>
-              </a:solidFill>
-            </a:ln>
-          </p:spPr>
-          <p:style>
-            <a:lnRef idx="2">
-              <a:schemeClr val="accent1"/>
-            </a:lnRef>
-            <a:fillRef idx="0">
-              <a:schemeClr val="accent1"/>
-            </a:fillRef>
-            <a:effectRef idx="1">
-              <a:schemeClr val="accent1"/>
-            </a:effectRef>
-            <a:fontRef idx="minor">
-              <a:schemeClr val="tx1"/>
-            </a:fontRef>
-          </p:style>
-        </p:cxnSp>
-        <p:sp>
-          <p:nvSpPr>
-            <p:cNvPr id="18" name="Tekstvak 17">
-              <a:extLst>
-                <a:ext uri="{FF2B5EF4-FFF2-40B4-BE49-F238E27FC236}">
-                  <a16:creationId xmlns:a16="http://schemas.microsoft.com/office/drawing/2014/main" id="{58A5624F-1D02-1A4C-33C6-187009711603}"/>
-                </a:ext>
-              </a:extLst>
-            </p:cNvPr>
-            <p:cNvSpPr txBox="1"/>
-            <p:nvPr/>
-          </p:nvSpPr>
-          <p:spPr>
-            <a:xfrm>
-              <a:off x="1767489" y="3870211"/>
-              <a:ext cx="5903311" cy="3170099"/>
-            </a:xfrm>
-            <a:prstGeom prst="rect">
-              <a:avLst/>
-            </a:prstGeom>
-            <a:noFill/>
-          </p:spPr>
-          <p:txBody>
-            <a:bodyPr wrap="square" rtlCol="0">
-              <a:spAutoFit/>
-            </a:bodyPr>
-            <a:lstStyle/>
-            <a:p>
-              <a:r>
-                <a:rPr lang="en-GB" sz="20000" b="1" dirty="0">
-                  <a:solidFill>
-                    <a:schemeClr val="bg1"/>
-                  </a:solidFill>
-                </a:rPr>
-                <a:t>IDEA</a:t>
-              </a:r>
-            </a:p>
-          </p:txBody>
-        </p:sp>
-        <p:cxnSp>
-          <p:nvCxnSpPr>
-            <p:cNvPr id="3" name="Rechte verbindingslijn 2">
-              <a:extLst>
-                <a:ext uri="{FF2B5EF4-FFF2-40B4-BE49-F238E27FC236}">
-                  <a16:creationId xmlns:a16="http://schemas.microsoft.com/office/drawing/2014/main" id="{75C4DD61-7332-0A12-F241-CF510FB48811}"/>
-                </a:ext>
-              </a:extLst>
-            </p:cNvPr>
-            <p:cNvCxnSpPr>
-              <a:cxnSpLocks/>
-            </p:cNvCxnSpPr>
-            <p:nvPr/>
-          </p:nvCxnSpPr>
-          <p:spPr>
-            <a:xfrm>
-              <a:off x="7688460" y="6170019"/>
-              <a:ext cx="998340" cy="0"/>
-            </a:xfrm>
-            <a:prstGeom prst="line">
-              <a:avLst/>
-            </a:prstGeom>
-            <a:ln w="254000">
-              <a:solidFill>
-                <a:srgbClr val="0070C0"/>
-              </a:solidFill>
-            </a:ln>
-          </p:spPr>
-          <p:style>
-            <a:lnRef idx="2">
-              <a:schemeClr val="accent1"/>
-            </a:lnRef>
-            <a:fillRef idx="0">
-              <a:schemeClr val="accent1"/>
-            </a:fillRef>
-            <a:effectRef idx="1">
-              <a:schemeClr val="accent1"/>
-            </a:effectRef>
-            <a:fontRef idx="minor">
-              <a:schemeClr val="tx1"/>
-            </a:fontRef>
-          </p:style>
-        </p:cxnSp>
-        <p:cxnSp>
-          <p:nvCxnSpPr>
-            <p:cNvPr id="4" name="Rechte verbindingslijn 3">
-              <a:extLst>
-                <a:ext uri="{FF2B5EF4-FFF2-40B4-BE49-F238E27FC236}">
-                  <a16:creationId xmlns:a16="http://schemas.microsoft.com/office/drawing/2014/main" id="{8756F14D-0259-855C-D0C1-B634E086DA13}"/>
-                </a:ext>
-              </a:extLst>
-            </p:cNvPr>
-            <p:cNvCxnSpPr>
-              <a:cxnSpLocks/>
-            </p:cNvCxnSpPr>
-            <p:nvPr/>
-          </p:nvCxnSpPr>
-          <p:spPr>
-            <a:xfrm>
-              <a:off x="7946050" y="4583687"/>
-              <a:ext cx="1067416" cy="0"/>
-            </a:xfrm>
-            <a:prstGeom prst="line">
-              <a:avLst/>
-            </a:prstGeom>
-            <a:ln w="254000">
-              <a:solidFill>
-                <a:srgbClr val="FF0000"/>
-              </a:solidFill>
-            </a:ln>
-          </p:spPr>
-          <p:style>
-            <a:lnRef idx="2">
-              <a:schemeClr val="accent1"/>
-            </a:lnRef>
-            <a:fillRef idx="0">
-              <a:schemeClr val="accent1"/>
-            </a:fillRef>
-            <a:effectRef idx="1">
-              <a:schemeClr val="accent1"/>
-            </a:effectRef>
-            <a:fontRef idx="minor">
-              <a:schemeClr val="tx1"/>
-            </a:fontRef>
-          </p:style>
-        </p:cxnSp>
-        <p:sp>
-          <p:nvSpPr>
-            <p:cNvPr id="9" name="Boog 8">
-              <a:extLst>
-                <a:ext uri="{FF2B5EF4-FFF2-40B4-BE49-F238E27FC236}">
-                  <a16:creationId xmlns:a16="http://schemas.microsoft.com/office/drawing/2014/main" id="{A56B6363-CEEA-872E-DC9A-7E025BF7C191}"/>
+                  <a16:creationId xmlns:a16="http://schemas.microsoft.com/office/drawing/2014/main" id="{95ADD44C-E257-E156-15A8-9ED19C27C408}"/>
                 </a:ext>
               </a:extLst>
             </p:cNvPr>
@@ -5106,34 +5479,299 @@
             <p:nvPr/>
           </p:nvSpPr>
           <p:spPr>
-            <a:xfrm rot="5400000">
-              <a:off x="8869466" y="4290786"/>
-              <a:ext cx="288000" cy="288000"/>
+            <a:xfrm>
+              <a:off x="4951422" y="1672864"/>
+              <a:ext cx="2295460" cy="2888243"/>
             </a:xfrm>
-            <a:prstGeom prst="arc">
-              <a:avLst>
-                <a:gd name="adj1" fmla="val 16115718"/>
-                <a:gd name="adj2" fmla="val 0"/>
-              </a:avLst>
-            </a:prstGeom>
-            <a:ln w="101600">
-              <a:solidFill>
-                <a:srgbClr val="FF0000"/>
-              </a:solidFill>
-            </a:ln>
+            <a:custGeom>
+              <a:avLst/>
+              <a:gdLst>
+                <a:gd name="connsiteX0" fmla="*/ 1059443 w 2295460"/>
+                <a:gd name="connsiteY0" fmla="*/ 0 h 2888243"/>
+                <a:gd name="connsiteX1" fmla="*/ 441435 w 2295460"/>
+                <a:gd name="connsiteY1" fmla="*/ 258555 h 2888243"/>
+                <a:gd name="connsiteX2" fmla="*/ 81981 w 2295460"/>
+                <a:gd name="connsiteY2" fmla="*/ 592784 h 2888243"/>
+                <a:gd name="connsiteX3" fmla="*/ 0 w 2295460"/>
+                <a:gd name="connsiteY3" fmla="*/ 1040525 h 2888243"/>
+                <a:gd name="connsiteX4" fmla="*/ 0 w 2295460"/>
+                <a:gd name="connsiteY4" fmla="*/ 1437816 h 2888243"/>
+                <a:gd name="connsiteX5" fmla="*/ 182880 w 2295460"/>
+                <a:gd name="connsiteY5" fmla="*/ 1809882 h 2888243"/>
+                <a:gd name="connsiteX6" fmla="*/ 422516 w 2295460"/>
+                <a:gd name="connsiteY6" fmla="*/ 2074742 h 2888243"/>
+                <a:gd name="connsiteX7" fmla="*/ 504497 w 2295460"/>
+                <a:gd name="connsiteY7" fmla="*/ 2326991 h 2888243"/>
+                <a:gd name="connsiteX8" fmla="*/ 599090 w 2295460"/>
+                <a:gd name="connsiteY8" fmla="*/ 2787344 h 2888243"/>
+                <a:gd name="connsiteX9" fmla="*/ 813501 w 2295460"/>
+                <a:gd name="connsiteY9" fmla="*/ 2888243 h 2888243"/>
+                <a:gd name="connsiteX10" fmla="*/ 1570246 w 2295460"/>
+                <a:gd name="connsiteY10" fmla="*/ 2881937 h 2888243"/>
+                <a:gd name="connsiteX11" fmla="*/ 1753126 w 2295460"/>
+                <a:gd name="connsiteY11" fmla="*/ 2579239 h 2888243"/>
+                <a:gd name="connsiteX12" fmla="*/ 1822494 w 2295460"/>
+                <a:gd name="connsiteY12" fmla="*/ 2200867 h 2888243"/>
+                <a:gd name="connsiteX13" fmla="*/ 2150417 w 2295460"/>
+                <a:gd name="connsiteY13" fmla="*/ 1790963 h 2888243"/>
+                <a:gd name="connsiteX14" fmla="*/ 2295460 w 2295460"/>
+                <a:gd name="connsiteY14" fmla="*/ 1273854 h 2888243"/>
+                <a:gd name="connsiteX15" fmla="*/ 2282847 w 2295460"/>
+                <a:gd name="connsiteY15" fmla="*/ 807195 h 2888243"/>
+                <a:gd name="connsiteX16" fmla="*/ 2049518 w 2295460"/>
+                <a:gd name="connsiteY16" fmla="*/ 422516 h 2888243"/>
+                <a:gd name="connsiteX17" fmla="*/ 1765738 w 2295460"/>
+                <a:gd name="connsiteY17" fmla="*/ 182880 h 2888243"/>
+                <a:gd name="connsiteX18" fmla="*/ 1412591 w 2295460"/>
+                <a:gd name="connsiteY18" fmla="*/ 44144 h 2888243"/>
+                <a:gd name="connsiteX19" fmla="*/ 1059443 w 2295460"/>
+                <a:gd name="connsiteY19" fmla="*/ 0 h 2888243"/>
+              </a:gdLst>
+              <a:ahLst/>
+              <a:cxnLst>
+                <a:cxn ang="0">
+                  <a:pos x="connsiteX0" y="connsiteY0"/>
+                </a:cxn>
+                <a:cxn ang="0">
+                  <a:pos x="connsiteX1" y="connsiteY1"/>
+                </a:cxn>
+                <a:cxn ang="0">
+                  <a:pos x="connsiteX2" y="connsiteY2"/>
+                </a:cxn>
+                <a:cxn ang="0">
+                  <a:pos x="connsiteX3" y="connsiteY3"/>
+                </a:cxn>
+                <a:cxn ang="0">
+                  <a:pos x="connsiteX4" y="connsiteY4"/>
+                </a:cxn>
+                <a:cxn ang="0">
+                  <a:pos x="connsiteX5" y="connsiteY5"/>
+                </a:cxn>
+                <a:cxn ang="0">
+                  <a:pos x="connsiteX6" y="connsiteY6"/>
+                </a:cxn>
+                <a:cxn ang="0">
+                  <a:pos x="connsiteX7" y="connsiteY7"/>
+                </a:cxn>
+                <a:cxn ang="0">
+                  <a:pos x="connsiteX8" y="connsiteY8"/>
+                </a:cxn>
+                <a:cxn ang="0">
+                  <a:pos x="connsiteX9" y="connsiteY9"/>
+                </a:cxn>
+                <a:cxn ang="0">
+                  <a:pos x="connsiteX10" y="connsiteY10"/>
+                </a:cxn>
+                <a:cxn ang="0">
+                  <a:pos x="connsiteX11" y="connsiteY11"/>
+                </a:cxn>
+                <a:cxn ang="0">
+                  <a:pos x="connsiteX12" y="connsiteY12"/>
+                </a:cxn>
+                <a:cxn ang="0">
+                  <a:pos x="connsiteX13" y="connsiteY13"/>
+                </a:cxn>
+                <a:cxn ang="0">
+                  <a:pos x="connsiteX14" y="connsiteY14"/>
+                </a:cxn>
+                <a:cxn ang="0">
+                  <a:pos x="connsiteX15" y="connsiteY15"/>
+                </a:cxn>
+                <a:cxn ang="0">
+                  <a:pos x="connsiteX16" y="connsiteY16"/>
+                </a:cxn>
+                <a:cxn ang="0">
+                  <a:pos x="connsiteX17" y="connsiteY17"/>
+                </a:cxn>
+                <a:cxn ang="0">
+                  <a:pos x="connsiteX18" y="connsiteY18"/>
+                </a:cxn>
+                <a:cxn ang="0">
+                  <a:pos x="connsiteX19" y="connsiteY19"/>
+                </a:cxn>
+              </a:cxnLst>
+              <a:rect l="l" t="t" r="r" b="b"/>
+              <a:pathLst>
+                <a:path w="2295460" h="2888243">
+                  <a:moveTo>
+                    <a:pt x="1059443" y="0"/>
+                  </a:moveTo>
+                  <a:lnTo>
+                    <a:pt x="441435" y="258555"/>
+                  </a:lnTo>
+                  <a:lnTo>
+                    <a:pt x="81981" y="592784"/>
+                  </a:lnTo>
+                  <a:lnTo>
+                    <a:pt x="0" y="1040525"/>
+                  </a:lnTo>
+                  <a:lnTo>
+                    <a:pt x="0" y="1437816"/>
+                  </a:lnTo>
+                  <a:lnTo>
+                    <a:pt x="182880" y="1809882"/>
+                  </a:lnTo>
+                  <a:lnTo>
+                    <a:pt x="422516" y="2074742"/>
+                  </a:lnTo>
+                  <a:lnTo>
+                    <a:pt x="504497" y="2326991"/>
+                  </a:lnTo>
+                  <a:lnTo>
+                    <a:pt x="599090" y="2787344"/>
+                  </a:lnTo>
+                  <a:lnTo>
+                    <a:pt x="813501" y="2888243"/>
+                  </a:lnTo>
+                  <a:lnTo>
+                    <a:pt x="1570246" y="2881937"/>
+                  </a:lnTo>
+                  <a:lnTo>
+                    <a:pt x="1753126" y="2579239"/>
+                  </a:lnTo>
+                  <a:lnTo>
+                    <a:pt x="1822494" y="2200867"/>
+                  </a:lnTo>
+                  <a:lnTo>
+                    <a:pt x="2150417" y="1790963"/>
+                  </a:lnTo>
+                  <a:lnTo>
+                    <a:pt x="2295460" y="1273854"/>
+                  </a:lnTo>
+                  <a:lnTo>
+                    <a:pt x="2282847" y="807195"/>
+                  </a:lnTo>
+                  <a:lnTo>
+                    <a:pt x="2049518" y="422516"/>
+                  </a:lnTo>
+                  <a:lnTo>
+                    <a:pt x="1765738" y="182880"/>
+                  </a:lnTo>
+                  <a:lnTo>
+                    <a:pt x="1412591" y="44144"/>
+                  </a:lnTo>
+                  <a:lnTo>
+                    <a:pt x="1059443" y="0"/>
+                  </a:lnTo>
+                  <a:close/>
+                </a:path>
+              </a:pathLst>
+            </a:custGeom>
+            <a:gradFill flip="none" rotWithShape="1">
+              <a:gsLst>
+                <a:gs pos="25000">
+                  <a:srgbClr val="FF0000"/>
+                </a:gs>
+                <a:gs pos="75000">
+                  <a:srgbClr val="0070C0">
+                    <a:alpha val="86000"/>
+                  </a:srgbClr>
+                </a:gs>
+              </a:gsLst>
+              <a:lin ang="5400000" scaled="1"/>
+              <a:tileRect/>
+            </a:gradFill>
           </p:spPr>
           <p:style>
             <a:lnRef idx="2">
-              <a:schemeClr val="accent1"/>
+              <a:schemeClr val="accent1">
+                <a:shade val="15000"/>
+              </a:schemeClr>
             </a:lnRef>
-            <a:fillRef idx="0">
+            <a:fillRef idx="1">
               <a:schemeClr val="accent1"/>
             </a:fillRef>
-            <a:effectRef idx="1">
+            <a:effectRef idx="0">
               <a:schemeClr val="accent1"/>
             </a:effectRef>
             <a:fontRef idx="minor">
-              <a:schemeClr val="tx1"/>
+              <a:schemeClr val="lt1"/>
+            </a:fontRef>
+          </p:style>
+          <p:txBody>
+            <a:bodyPr rtlCol="0" anchor="ctr"/>
+            <a:lstStyle/>
+            <a:p>
+              <a:pPr algn="ctr"/>
+              <a:endParaRPr lang="en-GB" dirty="0"/>
+            </a:p>
+          </p:txBody>
+        </p:sp>
+        <p:pic>
+          <p:nvPicPr>
+            <p:cNvPr id="27" name="Graphic 26" descr="Huis met effen opvulling">
+              <a:extLst>
+                <a:ext uri="{FF2B5EF4-FFF2-40B4-BE49-F238E27FC236}">
+                  <a16:creationId xmlns:a16="http://schemas.microsoft.com/office/drawing/2014/main" id="{8E3E9B1F-C44D-0571-9541-DD75AD972E41}"/>
+                </a:ext>
+              </a:extLst>
+            </p:cNvPr>
+            <p:cNvPicPr>
+              <a:picLocks noChangeAspect="1"/>
+            </p:cNvPicPr>
+            <p:nvPr/>
+          </p:nvPicPr>
+          <p:blipFill>
+            <a:blip r:embed="rId2">
+              <a:extLst>
+                <a:ext uri="{96DAC541-7B7A-43D3-8B79-37D633B846F1}">
+                  <asvg:svgBlip xmlns:asvg="http://schemas.microsoft.com/office/drawing/2016/SVG/main" r:embed="rId3"/>
+                </a:ext>
+              </a:extLst>
+            </a:blip>
+            <a:srcRect/>
+            <a:stretch/>
+          </p:blipFill>
+          <p:spPr>
+            <a:xfrm>
+              <a:off x="5349458" y="1989735"/>
+              <a:ext cx="1512000" cy="1512000"/>
+            </a:xfrm>
+            <a:prstGeom prst="rect">
+              <a:avLst/>
+            </a:prstGeom>
+          </p:spPr>
+        </p:pic>
+        <p:sp>
+          <p:nvSpPr>
+            <p:cNvPr id="28" name="Rechthoek 7">
+              <a:extLst>
+                <a:ext uri="{FF2B5EF4-FFF2-40B4-BE49-F238E27FC236}">
+                  <a16:creationId xmlns:a16="http://schemas.microsoft.com/office/drawing/2014/main" id="{A1AF9732-2237-7D4B-BBAA-88258AB47DB4}"/>
+                </a:ext>
+              </a:extLst>
+            </p:cNvPr>
+            <p:cNvSpPr/>
+            <p:nvPr/>
+          </p:nvSpPr>
+          <p:spPr>
+            <a:xfrm>
+              <a:off x="5714473" y="4617863"/>
+              <a:ext cx="781970" cy="510803"/>
+            </a:xfrm>
+            <a:prstGeom prst="rect">
+              <a:avLst/>
+            </a:prstGeom>
+            <a:solidFill>
+              <a:schemeClr val="bg2">
+                <a:lumMod val="75000"/>
+              </a:schemeClr>
+            </a:solidFill>
+          </p:spPr>
+          <p:style>
+            <a:lnRef idx="2">
+              <a:schemeClr val="accent1">
+                <a:shade val="15000"/>
+              </a:schemeClr>
+            </a:lnRef>
+            <a:fillRef idx="1">
+              <a:schemeClr val="accent1"/>
+            </a:fillRef>
+            <a:effectRef idx="0">
+              <a:schemeClr val="accent1"/>
+            </a:effectRef>
+            <a:fontRef idx="minor">
+              <a:schemeClr val="lt1"/>
             </a:fontRef>
           </p:style>
           <p:txBody>
@@ -5147,71 +5785,10 @@
         </p:sp>
         <p:sp>
           <p:nvSpPr>
-            <p:cNvPr id="11" name="Boog 10">
+            <p:cNvPr id="29" name="Rechthoek 22">
               <a:extLst>
                 <a:ext uri="{FF2B5EF4-FFF2-40B4-BE49-F238E27FC236}">
-                  <a16:creationId xmlns:a16="http://schemas.microsoft.com/office/drawing/2014/main" id="{9A19F3C6-E052-AEF0-4319-2172901FCA71}"/>
-                </a:ext>
-              </a:extLst>
-            </p:cNvPr>
-            <p:cNvSpPr/>
-            <p:nvPr/>
-          </p:nvSpPr>
-          <p:spPr>
-            <a:xfrm rot="10800000">
-              <a:off x="7550051" y="4583901"/>
-              <a:ext cx="792000" cy="792000"/>
-            </a:xfrm>
-            <a:prstGeom prst="arc">
-              <a:avLst>
-                <a:gd name="adj1" fmla="val 16200000"/>
-                <a:gd name="adj2" fmla="val 5420031"/>
-              </a:avLst>
-            </a:prstGeom>
-            <a:ln w="254000">
-              <a:gradFill flip="none" rotWithShape="1">
-                <a:gsLst>
-                  <a:gs pos="0">
-                    <a:srgbClr val="FF0000"/>
-                  </a:gs>
-                  <a:gs pos="100000">
-                    <a:srgbClr val="C84B80"/>
-                  </a:gs>
-                </a:gsLst>
-                <a:lin ang="16500000" scaled="0"/>
-                <a:tileRect/>
-              </a:gradFill>
-            </a:ln>
-          </p:spPr>
-          <p:style>
-            <a:lnRef idx="2">
-              <a:schemeClr val="accent1"/>
-            </a:lnRef>
-            <a:fillRef idx="0">
-              <a:schemeClr val="accent1"/>
-            </a:fillRef>
-            <a:effectRef idx="1">
-              <a:schemeClr val="accent1"/>
-            </a:effectRef>
-            <a:fontRef idx="minor">
-              <a:schemeClr val="tx1"/>
-            </a:fontRef>
-          </p:style>
-          <p:txBody>
-            <a:bodyPr rtlCol="0" anchor="ctr"/>
-            <a:lstStyle/>
-            <a:p>
-              <a:pPr algn="ctr"/>
-              <a:endParaRPr lang="en-GB" dirty="0"/>
-            </a:p>
-          </p:txBody>
-        </p:sp>
-        <p:sp>
-          <p:nvSpPr>
-            <p:cNvPr id="12" name="Boog 11">
-              <a:extLst>
-                <a:ext uri="{FF2B5EF4-FFF2-40B4-BE49-F238E27FC236}">
-                  <a16:creationId xmlns:a16="http://schemas.microsoft.com/office/drawing/2014/main" id="{4EEEABAF-5A0C-581C-BBDF-C9F565797103}"/>
+                  <a16:creationId xmlns:a16="http://schemas.microsoft.com/office/drawing/2014/main" id="{D313C028-F924-7AAC-29B6-E284FF3C69BF}"/>
                 </a:ext>
               </a:extLst>
             </p:cNvPr>
@@ -5220,41 +5797,33 @@
           </p:nvSpPr>
           <p:spPr>
             <a:xfrm>
-              <a:off x="8290800" y="5377595"/>
-              <a:ext cx="792000" cy="792000"/>
+              <a:off x="6357189" y="2363698"/>
+              <a:ext cx="158508" cy="45719"/>
             </a:xfrm>
-            <a:prstGeom prst="arc">
-              <a:avLst>
-                <a:gd name="adj1" fmla="val 16200000"/>
-                <a:gd name="adj2" fmla="val 5420031"/>
-              </a:avLst>
+            <a:prstGeom prst="rect">
+              <a:avLst/>
             </a:prstGeom>
-            <a:ln w="254000">
-              <a:gradFill>
-                <a:gsLst>
-                  <a:gs pos="0">
-                    <a:srgbClr val="A85897"/>
-                  </a:gs>
-                  <a:gs pos="100000">
-                    <a:srgbClr val="0070C0"/>
-                  </a:gs>
-                </a:gsLst>
-                <a:lin ang="5400000" scaled="1"/>
-              </a:gradFill>
+            <a:solidFill>
+              <a:srgbClr val="FF0000"/>
+            </a:solidFill>
+            <a:ln>
+              <a:noFill/>
             </a:ln>
           </p:spPr>
           <p:style>
             <a:lnRef idx="2">
-              <a:schemeClr val="accent1"/>
+              <a:schemeClr val="accent1">
+                <a:shade val="15000"/>
+              </a:schemeClr>
             </a:lnRef>
-            <a:fillRef idx="0">
+            <a:fillRef idx="1">
               <a:schemeClr val="accent1"/>
             </a:fillRef>
-            <a:effectRef idx="1">
+            <a:effectRef idx="0">
               <a:schemeClr val="accent1"/>
             </a:effectRef>
             <a:fontRef idx="minor">
-              <a:schemeClr val="tx1"/>
+              <a:schemeClr val="lt1"/>
             </a:fontRef>
           </p:style>
           <p:txBody>
@@ -5268,10 +5837,10 @@
         </p:sp>
         <p:sp>
           <p:nvSpPr>
-            <p:cNvPr id="13" name="Boog 12">
+            <p:cNvPr id="30" name="Rechthoek 23">
               <a:extLst>
                 <a:ext uri="{FF2B5EF4-FFF2-40B4-BE49-F238E27FC236}">
-                  <a16:creationId xmlns:a16="http://schemas.microsoft.com/office/drawing/2014/main" id="{82AA2F0A-262B-ED4F-EFD8-620D894818AD}"/>
+                  <a16:creationId xmlns:a16="http://schemas.microsoft.com/office/drawing/2014/main" id="{B414927F-30EC-BD80-0DC9-2EA086665DDC}"/>
                 </a:ext>
               </a:extLst>
             </p:cNvPr>
@@ -5279,34 +5848,34 @@
             <p:nvPr/>
           </p:nvSpPr>
           <p:spPr>
-            <a:xfrm rot="10800000">
-              <a:off x="7551680" y="5913530"/>
-              <a:ext cx="273561" cy="255639"/>
+            <a:xfrm>
+              <a:off x="6337935" y="2320271"/>
+              <a:ext cx="158508" cy="45719"/>
             </a:xfrm>
-            <a:prstGeom prst="arc">
-              <a:avLst>
-                <a:gd name="adj1" fmla="val 16200000"/>
-                <a:gd name="adj2" fmla="val 5416196"/>
-              </a:avLst>
+            <a:prstGeom prst="rect">
+              <a:avLst/>
             </a:prstGeom>
-            <a:ln w="101600">
-              <a:solidFill>
-                <a:srgbClr val="0070C0"/>
-              </a:solidFill>
+            <a:solidFill>
+              <a:srgbClr val="FF0000"/>
+            </a:solidFill>
+            <a:ln>
+              <a:noFill/>
             </a:ln>
           </p:spPr>
           <p:style>
             <a:lnRef idx="2">
-              <a:schemeClr val="accent1"/>
+              <a:schemeClr val="accent1">
+                <a:shade val="15000"/>
+              </a:schemeClr>
             </a:lnRef>
-            <a:fillRef idx="0">
+            <a:fillRef idx="1">
               <a:schemeClr val="accent1"/>
             </a:fillRef>
-            <a:effectRef idx="1">
+            <a:effectRef idx="0">
               <a:schemeClr val="accent1"/>
             </a:effectRef>
             <a:fontRef idx="minor">
-              <a:schemeClr val="tx1"/>
+              <a:schemeClr val="lt1"/>
             </a:fontRef>
           </p:style>
           <p:txBody>
@@ -5318,64 +5887,12 @@
             </a:p>
           </p:txBody>
         </p:sp>
-        <p:cxnSp>
-          <p:nvCxnSpPr>
-            <p:cNvPr id="14" name="Rechte verbindingslijn 13">
+        <p:sp>
+          <p:nvSpPr>
+            <p:cNvPr id="32" name="Rechthoek 29">
               <a:extLst>
                 <a:ext uri="{FF2B5EF4-FFF2-40B4-BE49-F238E27FC236}">
-                  <a16:creationId xmlns:a16="http://schemas.microsoft.com/office/drawing/2014/main" id="{E552F46F-7BC3-6D46-1A0A-4A87606BE2F7}"/>
-                </a:ext>
-              </a:extLst>
-            </p:cNvPr>
-            <p:cNvCxnSpPr>
-              <a:cxnSpLocks/>
-            </p:cNvCxnSpPr>
-            <p:nvPr/>
-          </p:nvCxnSpPr>
-          <p:spPr>
-            <a:xfrm>
-              <a:off x="7946050" y="5377438"/>
-              <a:ext cx="740750" cy="0"/>
-            </a:xfrm>
-            <a:prstGeom prst="line">
-              <a:avLst/>
-            </a:prstGeom>
-            <a:ln w="254000">
-              <a:gradFill flip="none" rotWithShape="1">
-                <a:gsLst>
-                  <a:gs pos="0">
-                    <a:srgbClr val="C84B80"/>
-                  </a:gs>
-                  <a:gs pos="100000">
-                    <a:srgbClr val="A85897"/>
-                  </a:gs>
-                </a:gsLst>
-                <a:lin ang="0" scaled="0"/>
-                <a:tileRect/>
-              </a:gradFill>
-            </a:ln>
-          </p:spPr>
-          <p:style>
-            <a:lnRef idx="2">
-              <a:schemeClr val="accent1"/>
-            </a:lnRef>
-            <a:fillRef idx="0">
-              <a:schemeClr val="accent1"/>
-            </a:fillRef>
-            <a:effectRef idx="1">
-              <a:schemeClr val="accent1"/>
-            </a:effectRef>
-            <a:fontRef idx="minor">
-              <a:schemeClr val="tx1"/>
-            </a:fontRef>
-          </p:style>
-        </p:cxnSp>
-        <p:sp>
-          <p:nvSpPr>
-            <p:cNvPr id="31" name="Boog 30">
-              <a:extLst>
-                <a:ext uri="{FF2B5EF4-FFF2-40B4-BE49-F238E27FC236}">
-                  <a16:creationId xmlns:a16="http://schemas.microsoft.com/office/drawing/2014/main" id="{FD3CC2C9-468F-1E7D-D6C3-BD0D0BAFD056}"/>
+                  <a16:creationId xmlns:a16="http://schemas.microsoft.com/office/drawing/2014/main" id="{A9E6FF16-42E1-CE18-E03D-A69BF7E6B524}"/>
                 </a:ext>
               </a:extLst>
             </p:cNvPr>
@@ -5383,34 +5900,34 @@
             <p:nvPr/>
           </p:nvSpPr>
           <p:spPr>
-            <a:xfrm rot="5400000">
-              <a:off x="8003603" y="5605549"/>
-              <a:ext cx="334119" cy="282084"/>
+            <a:xfrm>
+              <a:off x="6329785" y="2284083"/>
+              <a:ext cx="158508" cy="45719"/>
             </a:xfrm>
-            <a:prstGeom prst="arc">
-              <a:avLst>
-                <a:gd name="adj1" fmla="val 16200000"/>
-                <a:gd name="adj2" fmla="val 10626"/>
-              </a:avLst>
+            <a:prstGeom prst="rect">
+              <a:avLst/>
             </a:prstGeom>
-            <a:ln w="101600">
-              <a:solidFill>
-                <a:srgbClr val="0070C0"/>
-              </a:solidFill>
+            <a:solidFill>
+              <a:srgbClr val="FF0000"/>
+            </a:solidFill>
+            <a:ln>
+              <a:noFill/>
             </a:ln>
           </p:spPr>
           <p:style>
             <a:lnRef idx="2">
-              <a:schemeClr val="accent1"/>
+              <a:schemeClr val="accent1">
+                <a:shade val="15000"/>
+              </a:schemeClr>
             </a:lnRef>
-            <a:fillRef idx="0">
+            <a:fillRef idx="1">
               <a:schemeClr val="accent1"/>
             </a:fillRef>
-            <a:effectRef idx="1">
+            <a:effectRef idx="0">
               <a:schemeClr val="accent1"/>
             </a:effectRef>
             <a:fontRef idx="minor">
-              <a:schemeClr val="tx1"/>
+              <a:schemeClr val="lt1"/>
             </a:fontRef>
           </p:style>
           <p:txBody>
@@ -5422,838 +5939,302 @@
             </a:p>
           </p:txBody>
         </p:sp>
-        <p:cxnSp>
-          <p:nvCxnSpPr>
-            <p:cNvPr id="40" name="Rechte verbindingslijn 39">
+        <p:sp>
+          <p:nvSpPr>
+            <p:cNvPr id="33" name="Rechthoek 30">
               <a:extLst>
                 <a:ext uri="{FF2B5EF4-FFF2-40B4-BE49-F238E27FC236}">
-                  <a16:creationId xmlns:a16="http://schemas.microsoft.com/office/drawing/2014/main" id="{4E82E7B7-8C0E-DAFC-50D3-3596C9A7BAC7}"/>
+                  <a16:creationId xmlns:a16="http://schemas.microsoft.com/office/drawing/2014/main" id="{71B21EC2-2D94-8D49-E532-2A5E64A94F7C}"/>
                 </a:ext>
               </a:extLst>
             </p:cNvPr>
-            <p:cNvCxnSpPr>
-              <a:cxnSpLocks/>
-            </p:cNvCxnSpPr>
+            <p:cNvSpPr/>
             <p:nvPr/>
-          </p:nvCxnSpPr>
+          </p:nvSpPr>
           <p:spPr>
             <a:xfrm>
-              <a:off x="7687563" y="5912647"/>
-              <a:ext cx="482428" cy="0"/>
+              <a:off x="6337935" y="2247895"/>
+              <a:ext cx="158508" cy="45719"/>
             </a:xfrm>
-            <a:prstGeom prst="line">
+            <a:prstGeom prst="rect">
               <a:avLst/>
             </a:prstGeom>
-            <a:ln w="101600">
-              <a:solidFill>
-                <a:srgbClr val="0070C0"/>
-              </a:solidFill>
+            <a:solidFill>
+              <a:srgbClr val="FF0000"/>
+            </a:solidFill>
+            <a:ln>
+              <a:noFill/>
             </a:ln>
           </p:spPr>
           <p:style>
             <a:lnRef idx="2">
-              <a:schemeClr val="accent1"/>
+              <a:schemeClr val="accent1">
+                <a:shade val="15000"/>
+              </a:schemeClr>
             </a:lnRef>
-            <a:fillRef idx="0">
+            <a:fillRef idx="1">
               <a:schemeClr val="accent1"/>
             </a:fillRef>
-            <a:effectRef idx="1">
+            <a:effectRef idx="0">
               <a:schemeClr val="accent1"/>
             </a:effectRef>
             <a:fontRef idx="minor">
-              <a:schemeClr val="tx1"/>
+              <a:schemeClr val="lt1"/>
             </a:fontRef>
           </p:style>
-        </p:cxnSp>
-        <p:grpSp>
-          <p:nvGrpSpPr>
-            <p:cNvPr id="69" name="Groep 68">
+          <p:txBody>
+            <a:bodyPr rtlCol="0" anchor="ctr"/>
+            <a:lstStyle/>
+            <a:p>
+              <a:pPr algn="ctr"/>
+              <a:endParaRPr lang="en-GB"/>
+            </a:p>
+          </p:txBody>
+        </p:sp>
+        <p:sp>
+          <p:nvSpPr>
+            <p:cNvPr id="34" name="Rechthoekige driehoek 33">
               <a:extLst>
                 <a:ext uri="{FF2B5EF4-FFF2-40B4-BE49-F238E27FC236}">
-                  <a16:creationId xmlns:a16="http://schemas.microsoft.com/office/drawing/2014/main" id="{796D64A4-3040-B181-7415-504DBED909D8}"/>
+                  <a16:creationId xmlns:a16="http://schemas.microsoft.com/office/drawing/2014/main" id="{11F6802E-752A-0474-9A49-7203A5431A66}"/>
                 </a:ext>
               </a:extLst>
             </p:cNvPr>
-            <p:cNvGrpSpPr/>
+            <p:cNvSpPr/>
             <p:nvPr/>
-          </p:nvGrpSpPr>
-          <p:grpSpPr>
+          </p:nvSpPr>
+          <p:spPr>
+            <a:xfrm rot="10680000">
+              <a:off x="6343981" y="2399892"/>
+              <a:ext cx="144000" cy="144000"/>
+            </a:xfrm>
+            <a:prstGeom prst="rtTriangle">
+              <a:avLst/>
+            </a:prstGeom>
+            <a:solidFill>
+              <a:srgbClr val="FA0305"/>
+            </a:solidFill>
+            <a:ln>
+              <a:noFill/>
+            </a:ln>
+          </p:spPr>
+          <p:style>
+            <a:lnRef idx="2">
+              <a:schemeClr val="accent1">
+                <a:shade val="15000"/>
+              </a:schemeClr>
+            </a:lnRef>
+            <a:fillRef idx="1">
+              <a:schemeClr val="accent1"/>
+            </a:fillRef>
+            <a:effectRef idx="0">
+              <a:schemeClr val="accent1"/>
+            </a:effectRef>
+            <a:fontRef idx="minor">
+              <a:schemeClr val="lt1"/>
+            </a:fontRef>
+          </p:style>
+          <p:txBody>
+            <a:bodyPr rtlCol="0" anchor="ctr"/>
+            <a:lstStyle/>
+            <a:p>
+              <a:pPr algn="ctr"/>
+              <a:endParaRPr lang="en-GB"/>
+            </a:p>
+          </p:txBody>
+        </p:sp>
+        <p:sp>
+          <p:nvSpPr>
+            <p:cNvPr id="35" name="Rechthoekige driehoek 34">
+              <a:extLst>
+                <a:ext uri="{FF2B5EF4-FFF2-40B4-BE49-F238E27FC236}">
+                  <a16:creationId xmlns:a16="http://schemas.microsoft.com/office/drawing/2014/main" id="{99861560-7066-4396-F1A3-C91E60456702}"/>
+                </a:ext>
+              </a:extLst>
+            </p:cNvPr>
+            <p:cNvSpPr/>
+            <p:nvPr/>
+          </p:nvSpPr>
+          <p:spPr>
+            <a:xfrm rot="10680000">
+              <a:off x="6380346" y="2435318"/>
+              <a:ext cx="108000" cy="108000"/>
+            </a:xfrm>
+            <a:prstGeom prst="rtTriangle">
+              <a:avLst/>
+            </a:prstGeom>
+            <a:solidFill>
+              <a:srgbClr val="F1080D"/>
+            </a:solidFill>
+            <a:ln>
+              <a:noFill/>
+            </a:ln>
+          </p:spPr>
+          <p:style>
+            <a:lnRef idx="2">
+              <a:schemeClr val="accent1">
+                <a:shade val="15000"/>
+              </a:schemeClr>
+            </a:lnRef>
+            <a:fillRef idx="1">
+              <a:schemeClr val="accent1"/>
+            </a:fillRef>
+            <a:effectRef idx="0">
+              <a:schemeClr val="accent1"/>
+            </a:effectRef>
+            <a:fontRef idx="minor">
+              <a:schemeClr val="lt1"/>
+            </a:fontRef>
+          </p:style>
+          <p:txBody>
+            <a:bodyPr rtlCol="0" anchor="ctr"/>
+            <a:lstStyle/>
+            <a:p>
+              <a:pPr algn="ctr"/>
+              <a:endParaRPr lang="en-GB"/>
+            </a:p>
+          </p:txBody>
+        </p:sp>
+        <p:sp>
+          <p:nvSpPr>
+            <p:cNvPr id="37" name="Rechthoekige driehoek 35">
+              <a:extLst>
+                <a:ext uri="{FF2B5EF4-FFF2-40B4-BE49-F238E27FC236}">
+                  <a16:creationId xmlns:a16="http://schemas.microsoft.com/office/drawing/2014/main" id="{9DE120E9-4694-A40C-B5DE-233762E086E7}"/>
+                </a:ext>
+              </a:extLst>
+            </p:cNvPr>
+            <p:cNvSpPr/>
+            <p:nvPr/>
+          </p:nvSpPr>
+          <p:spPr>
+            <a:xfrm rot="10680000">
+              <a:off x="6419962" y="2474435"/>
+              <a:ext cx="72000" cy="72000"/>
+            </a:xfrm>
+            <a:prstGeom prst="rtTriangle">
+              <a:avLst/>
+            </a:prstGeom>
+            <a:solidFill>
+              <a:srgbClr val="EA0C13"/>
+            </a:solidFill>
+            <a:ln>
+              <a:noFill/>
+            </a:ln>
+          </p:spPr>
+          <p:style>
+            <a:lnRef idx="2">
+              <a:schemeClr val="accent1">
+                <a:shade val="15000"/>
+              </a:schemeClr>
+            </a:lnRef>
+            <a:fillRef idx="1">
+              <a:schemeClr val="accent1"/>
+            </a:fillRef>
+            <a:effectRef idx="0">
+              <a:schemeClr val="accent1"/>
+            </a:effectRef>
+            <a:fontRef idx="minor">
+              <a:schemeClr val="lt1"/>
+            </a:fontRef>
+          </p:style>
+          <p:txBody>
+            <a:bodyPr rtlCol="0" anchor="ctr"/>
+            <a:lstStyle/>
+            <a:p>
+              <a:pPr algn="ctr"/>
+              <a:endParaRPr lang="en-GB"/>
+            </a:p>
+          </p:txBody>
+        </p:sp>
+        <p:sp>
+          <p:nvSpPr>
+            <p:cNvPr id="38" name="Rechthoekige driehoek 36">
+              <a:extLst>
+                <a:ext uri="{FF2B5EF4-FFF2-40B4-BE49-F238E27FC236}">
+                  <a16:creationId xmlns:a16="http://schemas.microsoft.com/office/drawing/2014/main" id="{39B4D176-DF82-5F31-AFC7-E1674969237E}"/>
+                </a:ext>
+              </a:extLst>
+            </p:cNvPr>
+            <p:cNvSpPr/>
+            <p:nvPr/>
+          </p:nvSpPr>
+          <p:spPr>
+            <a:xfrm rot="10680000">
+              <a:off x="6438062" y="2492435"/>
+              <a:ext cx="36000" cy="36000"/>
+            </a:xfrm>
+            <a:prstGeom prst="rtTriangle">
+              <a:avLst/>
+            </a:prstGeom>
+            <a:solidFill>
+              <a:srgbClr val="EA0C13"/>
+            </a:solidFill>
+            <a:ln>
+              <a:noFill/>
+            </a:ln>
+          </p:spPr>
+          <p:style>
+            <a:lnRef idx="2">
+              <a:schemeClr val="accent1">
+                <a:shade val="15000"/>
+              </a:schemeClr>
+            </a:lnRef>
+            <a:fillRef idx="1">
+              <a:schemeClr val="accent1"/>
+            </a:fillRef>
+            <a:effectRef idx="0">
+              <a:schemeClr val="accent1"/>
+            </a:effectRef>
+            <a:fontRef idx="minor">
+              <a:schemeClr val="lt1"/>
+            </a:fontRef>
+          </p:style>
+          <p:txBody>
+            <a:bodyPr rtlCol="0" anchor="ctr"/>
+            <a:lstStyle/>
+            <a:p>
+              <a:pPr algn="ctr"/>
+              <a:endParaRPr lang="en-GB"/>
+            </a:p>
+          </p:txBody>
+        </p:sp>
+        <p:pic>
+          <p:nvPicPr>
+            <p:cNvPr id="39" name="Picture 38" descr="A white light bulb with a black background&#10;&#10;AI-generated content may be incorrect.">
+              <a:extLst>
+                <a:ext uri="{FF2B5EF4-FFF2-40B4-BE49-F238E27FC236}">
+                  <a16:creationId xmlns:a16="http://schemas.microsoft.com/office/drawing/2014/main" id="{9480984C-A2DE-E960-AD69-EBA6545256CB}"/>
+                </a:ext>
+              </a:extLst>
+            </p:cNvPr>
+            <p:cNvPicPr>
+              <a:picLocks noChangeAspect="1"/>
+            </p:cNvPicPr>
+            <p:nvPr/>
+          </p:nvPicPr>
+          <p:blipFill>
+            <a:blip r:embed="rId4">
+              <a:extLst>
+                <a:ext uri="{28A0092B-C50C-407E-A947-70E740481C1C}">
+                  <a14:useLocalDpi xmlns:a14="http://schemas.microsoft.com/office/drawing/2010/main" val="0"/>
+                </a:ext>
+              </a:extLst>
+            </a:blip>
+            <a:stretch>
+              <a:fillRect/>
+            </a:stretch>
+          </p:blipFill>
+          <p:spPr>
             <a:xfrm>
-              <a:off x="6984607" y="359350"/>
-              <a:ext cx="2654913" cy="3821561"/>
-              <a:chOff x="4768543" y="1518219"/>
-              <a:chExt cx="2654913" cy="3821561"/>
+              <a:off x="4779463" y="1518754"/>
+              <a:ext cx="2651990" cy="3820491"/>
             </a:xfrm>
-          </p:grpSpPr>
-          <p:sp>
-            <p:nvSpPr>
-              <p:cNvPr id="70" name="Vrije vorm: vorm 69">
-                <a:extLst>
-                  <a:ext uri="{FF2B5EF4-FFF2-40B4-BE49-F238E27FC236}">
-                    <a16:creationId xmlns:a16="http://schemas.microsoft.com/office/drawing/2014/main" id="{93F08A96-5832-84D0-3E04-547D937DF043}"/>
-                  </a:ext>
-                </a:extLst>
-              </p:cNvPr>
-              <p:cNvSpPr/>
-              <p:nvPr/>
-            </p:nvSpPr>
-            <p:spPr>
-              <a:xfrm>
-                <a:off x="4951422" y="1672864"/>
-                <a:ext cx="2295460" cy="2888243"/>
-              </a:xfrm>
-              <a:custGeom>
-                <a:avLst/>
-                <a:gdLst>
-                  <a:gd name="connsiteX0" fmla="*/ 1059443 w 2295460"/>
-                  <a:gd name="connsiteY0" fmla="*/ 0 h 2888243"/>
-                  <a:gd name="connsiteX1" fmla="*/ 441435 w 2295460"/>
-                  <a:gd name="connsiteY1" fmla="*/ 258555 h 2888243"/>
-                  <a:gd name="connsiteX2" fmla="*/ 81981 w 2295460"/>
-                  <a:gd name="connsiteY2" fmla="*/ 592784 h 2888243"/>
-                  <a:gd name="connsiteX3" fmla="*/ 0 w 2295460"/>
-                  <a:gd name="connsiteY3" fmla="*/ 1040525 h 2888243"/>
-                  <a:gd name="connsiteX4" fmla="*/ 0 w 2295460"/>
-                  <a:gd name="connsiteY4" fmla="*/ 1437816 h 2888243"/>
-                  <a:gd name="connsiteX5" fmla="*/ 182880 w 2295460"/>
-                  <a:gd name="connsiteY5" fmla="*/ 1809882 h 2888243"/>
-                  <a:gd name="connsiteX6" fmla="*/ 422516 w 2295460"/>
-                  <a:gd name="connsiteY6" fmla="*/ 2074742 h 2888243"/>
-                  <a:gd name="connsiteX7" fmla="*/ 504497 w 2295460"/>
-                  <a:gd name="connsiteY7" fmla="*/ 2326991 h 2888243"/>
-                  <a:gd name="connsiteX8" fmla="*/ 599090 w 2295460"/>
-                  <a:gd name="connsiteY8" fmla="*/ 2787344 h 2888243"/>
-                  <a:gd name="connsiteX9" fmla="*/ 813501 w 2295460"/>
-                  <a:gd name="connsiteY9" fmla="*/ 2888243 h 2888243"/>
-                  <a:gd name="connsiteX10" fmla="*/ 1570246 w 2295460"/>
-                  <a:gd name="connsiteY10" fmla="*/ 2881937 h 2888243"/>
-                  <a:gd name="connsiteX11" fmla="*/ 1753126 w 2295460"/>
-                  <a:gd name="connsiteY11" fmla="*/ 2579239 h 2888243"/>
-                  <a:gd name="connsiteX12" fmla="*/ 1822494 w 2295460"/>
-                  <a:gd name="connsiteY12" fmla="*/ 2200867 h 2888243"/>
-                  <a:gd name="connsiteX13" fmla="*/ 2150417 w 2295460"/>
-                  <a:gd name="connsiteY13" fmla="*/ 1790963 h 2888243"/>
-                  <a:gd name="connsiteX14" fmla="*/ 2295460 w 2295460"/>
-                  <a:gd name="connsiteY14" fmla="*/ 1273854 h 2888243"/>
-                  <a:gd name="connsiteX15" fmla="*/ 2282847 w 2295460"/>
-                  <a:gd name="connsiteY15" fmla="*/ 807195 h 2888243"/>
-                  <a:gd name="connsiteX16" fmla="*/ 2049518 w 2295460"/>
-                  <a:gd name="connsiteY16" fmla="*/ 422516 h 2888243"/>
-                  <a:gd name="connsiteX17" fmla="*/ 1765738 w 2295460"/>
-                  <a:gd name="connsiteY17" fmla="*/ 182880 h 2888243"/>
-                  <a:gd name="connsiteX18" fmla="*/ 1412591 w 2295460"/>
-                  <a:gd name="connsiteY18" fmla="*/ 44144 h 2888243"/>
-                  <a:gd name="connsiteX19" fmla="*/ 1059443 w 2295460"/>
-                  <a:gd name="connsiteY19" fmla="*/ 0 h 2888243"/>
-                </a:gdLst>
-                <a:ahLst/>
-                <a:cxnLst>
-                  <a:cxn ang="0">
-                    <a:pos x="connsiteX0" y="connsiteY0"/>
-                  </a:cxn>
-                  <a:cxn ang="0">
-                    <a:pos x="connsiteX1" y="connsiteY1"/>
-                  </a:cxn>
-                  <a:cxn ang="0">
-                    <a:pos x="connsiteX2" y="connsiteY2"/>
-                  </a:cxn>
-                  <a:cxn ang="0">
-                    <a:pos x="connsiteX3" y="connsiteY3"/>
-                  </a:cxn>
-                  <a:cxn ang="0">
-                    <a:pos x="connsiteX4" y="connsiteY4"/>
-                  </a:cxn>
-                  <a:cxn ang="0">
-                    <a:pos x="connsiteX5" y="connsiteY5"/>
-                  </a:cxn>
-                  <a:cxn ang="0">
-                    <a:pos x="connsiteX6" y="connsiteY6"/>
-                  </a:cxn>
-                  <a:cxn ang="0">
-                    <a:pos x="connsiteX7" y="connsiteY7"/>
-                  </a:cxn>
-                  <a:cxn ang="0">
-                    <a:pos x="connsiteX8" y="connsiteY8"/>
-                  </a:cxn>
-                  <a:cxn ang="0">
-                    <a:pos x="connsiteX9" y="connsiteY9"/>
-                  </a:cxn>
-                  <a:cxn ang="0">
-                    <a:pos x="connsiteX10" y="connsiteY10"/>
-                  </a:cxn>
-                  <a:cxn ang="0">
-                    <a:pos x="connsiteX11" y="connsiteY11"/>
-                  </a:cxn>
-                  <a:cxn ang="0">
-                    <a:pos x="connsiteX12" y="connsiteY12"/>
-                  </a:cxn>
-                  <a:cxn ang="0">
-                    <a:pos x="connsiteX13" y="connsiteY13"/>
-                  </a:cxn>
-                  <a:cxn ang="0">
-                    <a:pos x="connsiteX14" y="connsiteY14"/>
-                  </a:cxn>
-                  <a:cxn ang="0">
-                    <a:pos x="connsiteX15" y="connsiteY15"/>
-                  </a:cxn>
-                  <a:cxn ang="0">
-                    <a:pos x="connsiteX16" y="connsiteY16"/>
-                  </a:cxn>
-                  <a:cxn ang="0">
-                    <a:pos x="connsiteX17" y="connsiteY17"/>
-                  </a:cxn>
-                  <a:cxn ang="0">
-                    <a:pos x="connsiteX18" y="connsiteY18"/>
-                  </a:cxn>
-                  <a:cxn ang="0">
-                    <a:pos x="connsiteX19" y="connsiteY19"/>
-                  </a:cxn>
-                </a:cxnLst>
-                <a:rect l="l" t="t" r="r" b="b"/>
-                <a:pathLst>
-                  <a:path w="2295460" h="2888243">
-                    <a:moveTo>
-                      <a:pt x="1059443" y="0"/>
-                    </a:moveTo>
-                    <a:lnTo>
-                      <a:pt x="441435" y="258555"/>
-                    </a:lnTo>
-                    <a:lnTo>
-                      <a:pt x="81981" y="592784"/>
-                    </a:lnTo>
-                    <a:lnTo>
-                      <a:pt x="0" y="1040525"/>
-                    </a:lnTo>
-                    <a:lnTo>
-                      <a:pt x="0" y="1437816"/>
-                    </a:lnTo>
-                    <a:lnTo>
-                      <a:pt x="182880" y="1809882"/>
-                    </a:lnTo>
-                    <a:lnTo>
-                      <a:pt x="422516" y="2074742"/>
-                    </a:lnTo>
-                    <a:lnTo>
-                      <a:pt x="504497" y="2326991"/>
-                    </a:lnTo>
-                    <a:lnTo>
-                      <a:pt x="599090" y="2787344"/>
-                    </a:lnTo>
-                    <a:lnTo>
-                      <a:pt x="813501" y="2888243"/>
-                    </a:lnTo>
-                    <a:lnTo>
-                      <a:pt x="1570246" y="2881937"/>
-                    </a:lnTo>
-                    <a:lnTo>
-                      <a:pt x="1753126" y="2579239"/>
-                    </a:lnTo>
-                    <a:lnTo>
-                      <a:pt x="1822494" y="2200867"/>
-                    </a:lnTo>
-                    <a:lnTo>
-                      <a:pt x="2150417" y="1790963"/>
-                    </a:lnTo>
-                    <a:lnTo>
-                      <a:pt x="2295460" y="1273854"/>
-                    </a:lnTo>
-                    <a:lnTo>
-                      <a:pt x="2282847" y="807195"/>
-                    </a:lnTo>
-                    <a:lnTo>
-                      <a:pt x="2049518" y="422516"/>
-                    </a:lnTo>
-                    <a:lnTo>
-                      <a:pt x="1765738" y="182880"/>
-                    </a:lnTo>
-                    <a:lnTo>
-                      <a:pt x="1412591" y="44144"/>
-                    </a:lnTo>
-                    <a:lnTo>
-                      <a:pt x="1059443" y="0"/>
-                    </a:lnTo>
-                    <a:close/>
-                  </a:path>
-                </a:pathLst>
-              </a:custGeom>
-              <a:gradFill flip="none" rotWithShape="1">
-                <a:gsLst>
-                  <a:gs pos="25000">
-                    <a:srgbClr val="FF0000"/>
-                  </a:gs>
-                  <a:gs pos="75000">
-                    <a:srgbClr val="0070C0">
-                      <a:alpha val="86000"/>
-                    </a:srgbClr>
-                  </a:gs>
-                </a:gsLst>
-                <a:lin ang="5400000" scaled="1"/>
-                <a:tileRect/>
-              </a:gradFill>
-            </p:spPr>
-            <p:style>
-              <a:lnRef idx="2">
-                <a:schemeClr val="accent1">
-                  <a:shade val="15000"/>
-                </a:schemeClr>
-              </a:lnRef>
-              <a:fillRef idx="1">
-                <a:schemeClr val="accent1"/>
-              </a:fillRef>
-              <a:effectRef idx="0">
-                <a:schemeClr val="accent1"/>
-              </a:effectRef>
-              <a:fontRef idx="minor">
-                <a:schemeClr val="lt1"/>
-              </a:fontRef>
-            </p:style>
-            <p:txBody>
-              <a:bodyPr rtlCol="0" anchor="ctr"/>
-              <a:lstStyle/>
-              <a:p>
-                <a:pPr algn="ctr"/>
-                <a:endParaRPr lang="en-GB" dirty="0"/>
-              </a:p>
-            </p:txBody>
-          </p:sp>
-          <p:pic>
-            <p:nvPicPr>
-              <p:cNvPr id="71" name="Graphic 70" descr="Huis met effen opvulling">
-                <a:extLst>
-                  <a:ext uri="{FF2B5EF4-FFF2-40B4-BE49-F238E27FC236}">
-                    <a16:creationId xmlns:a16="http://schemas.microsoft.com/office/drawing/2014/main" id="{95B6EAD8-CF86-65FF-491E-75FFEBA1DD18}"/>
-                  </a:ext>
-                </a:extLst>
-              </p:cNvPr>
-              <p:cNvPicPr>
-                <a:picLocks noChangeAspect="1"/>
-              </p:cNvPicPr>
-              <p:nvPr/>
-            </p:nvPicPr>
-            <p:blipFill>
-              <a:blip r:embed="rId2">
-                <a:extLst>
-                  <a:ext uri="{96DAC541-7B7A-43D3-8B79-37D633B846F1}">
-                    <asvg:svgBlip xmlns:asvg="http://schemas.microsoft.com/office/drawing/2016/SVG/main" r:embed="rId3"/>
-                  </a:ext>
-                </a:extLst>
-              </a:blip>
-              <a:srcRect/>
-              <a:stretch/>
-            </p:blipFill>
-            <p:spPr>
-              <a:xfrm>
-                <a:off x="5349458" y="1989735"/>
-                <a:ext cx="1512000" cy="1512000"/>
-              </a:xfrm>
-              <a:prstGeom prst="rect">
-                <a:avLst/>
-              </a:prstGeom>
-            </p:spPr>
-          </p:pic>
-          <p:sp>
-            <p:nvSpPr>
-              <p:cNvPr id="72" name="Rechthoek 71">
-                <a:extLst>
-                  <a:ext uri="{FF2B5EF4-FFF2-40B4-BE49-F238E27FC236}">
-                    <a16:creationId xmlns:a16="http://schemas.microsoft.com/office/drawing/2014/main" id="{96CCC52E-3CB6-E088-BCB8-AAD7EEE7C14B}"/>
-                  </a:ext>
-                </a:extLst>
-              </p:cNvPr>
-              <p:cNvSpPr/>
-              <p:nvPr/>
-            </p:nvSpPr>
-            <p:spPr>
-              <a:xfrm>
-                <a:off x="5714473" y="4617863"/>
-                <a:ext cx="781970" cy="510803"/>
-              </a:xfrm>
-              <a:prstGeom prst="rect">
-                <a:avLst/>
-              </a:prstGeom>
-              <a:solidFill>
-                <a:schemeClr val="bg2">
-                  <a:lumMod val="75000"/>
-                </a:schemeClr>
-              </a:solidFill>
-            </p:spPr>
-            <p:style>
-              <a:lnRef idx="2">
-                <a:schemeClr val="accent1">
-                  <a:shade val="15000"/>
-                </a:schemeClr>
-              </a:lnRef>
-              <a:fillRef idx="1">
-                <a:schemeClr val="accent1"/>
-              </a:fillRef>
-              <a:effectRef idx="0">
-                <a:schemeClr val="accent1"/>
-              </a:effectRef>
-              <a:fontRef idx="minor">
-                <a:schemeClr val="lt1"/>
-              </a:fontRef>
-            </p:style>
-            <p:txBody>
-              <a:bodyPr rtlCol="0" anchor="ctr"/>
-              <a:lstStyle/>
-              <a:p>
-                <a:pPr algn="ctr"/>
-                <a:endParaRPr lang="en-GB"/>
-              </a:p>
-            </p:txBody>
-          </p:sp>
-          <p:sp>
-            <p:nvSpPr>
-              <p:cNvPr id="73" name="Rechthoek 72">
-                <a:extLst>
-                  <a:ext uri="{FF2B5EF4-FFF2-40B4-BE49-F238E27FC236}">
-                    <a16:creationId xmlns:a16="http://schemas.microsoft.com/office/drawing/2014/main" id="{E7833457-DD71-5797-6494-00877FBB8B5C}"/>
-                  </a:ext>
-                </a:extLst>
-              </p:cNvPr>
-              <p:cNvSpPr/>
-              <p:nvPr/>
-            </p:nvSpPr>
-            <p:spPr>
-              <a:xfrm>
-                <a:off x="6357189" y="2363698"/>
-                <a:ext cx="158508" cy="45719"/>
-              </a:xfrm>
-              <a:prstGeom prst="rect">
-                <a:avLst/>
-              </a:prstGeom>
-              <a:solidFill>
-                <a:srgbClr val="FF0000"/>
-              </a:solidFill>
-              <a:ln>
-                <a:noFill/>
-              </a:ln>
-            </p:spPr>
-            <p:style>
-              <a:lnRef idx="2">
-                <a:schemeClr val="accent1">
-                  <a:shade val="15000"/>
-                </a:schemeClr>
-              </a:lnRef>
-              <a:fillRef idx="1">
-                <a:schemeClr val="accent1"/>
-              </a:fillRef>
-              <a:effectRef idx="0">
-                <a:schemeClr val="accent1"/>
-              </a:effectRef>
-              <a:fontRef idx="minor">
-                <a:schemeClr val="lt1"/>
-              </a:fontRef>
-            </p:style>
-            <p:txBody>
-              <a:bodyPr rtlCol="0" anchor="ctr"/>
-              <a:lstStyle/>
-              <a:p>
-                <a:pPr algn="ctr"/>
-                <a:endParaRPr lang="en-GB"/>
-              </a:p>
-            </p:txBody>
-          </p:sp>
-          <p:sp>
-            <p:nvSpPr>
-              <p:cNvPr id="74" name="Rechthoek 73">
-                <a:extLst>
-                  <a:ext uri="{FF2B5EF4-FFF2-40B4-BE49-F238E27FC236}">
-                    <a16:creationId xmlns:a16="http://schemas.microsoft.com/office/drawing/2014/main" id="{4A10B190-78B8-FED7-0697-069028A63072}"/>
-                  </a:ext>
-                </a:extLst>
-              </p:cNvPr>
-              <p:cNvSpPr/>
-              <p:nvPr/>
-            </p:nvSpPr>
-            <p:spPr>
-              <a:xfrm>
-                <a:off x="6337935" y="2320271"/>
-                <a:ext cx="158508" cy="45719"/>
-              </a:xfrm>
-              <a:prstGeom prst="rect">
-                <a:avLst/>
-              </a:prstGeom>
-              <a:solidFill>
-                <a:srgbClr val="FF0000"/>
-              </a:solidFill>
-              <a:ln>
-                <a:noFill/>
-              </a:ln>
-            </p:spPr>
-            <p:style>
-              <a:lnRef idx="2">
-                <a:schemeClr val="accent1">
-                  <a:shade val="15000"/>
-                </a:schemeClr>
-              </a:lnRef>
-              <a:fillRef idx="1">
-                <a:schemeClr val="accent1"/>
-              </a:fillRef>
-              <a:effectRef idx="0">
-                <a:schemeClr val="accent1"/>
-              </a:effectRef>
-              <a:fontRef idx="minor">
-                <a:schemeClr val="lt1"/>
-              </a:fontRef>
-            </p:style>
-            <p:txBody>
-              <a:bodyPr rtlCol="0" anchor="ctr"/>
-              <a:lstStyle/>
-              <a:p>
-                <a:pPr algn="ctr"/>
-                <a:endParaRPr lang="en-GB"/>
-              </a:p>
-            </p:txBody>
-          </p:sp>
-          <p:sp>
-            <p:nvSpPr>
-              <p:cNvPr id="75" name="Rechthoek 74">
-                <a:extLst>
-                  <a:ext uri="{FF2B5EF4-FFF2-40B4-BE49-F238E27FC236}">
-                    <a16:creationId xmlns:a16="http://schemas.microsoft.com/office/drawing/2014/main" id="{16ECF9E9-AC3F-219F-9FCE-ACA55004FBA8}"/>
-                  </a:ext>
-                </a:extLst>
-              </p:cNvPr>
-              <p:cNvSpPr/>
-              <p:nvPr/>
-            </p:nvSpPr>
-            <p:spPr>
-              <a:xfrm>
-                <a:off x="6329785" y="2284083"/>
-                <a:ext cx="158508" cy="45719"/>
-              </a:xfrm>
-              <a:prstGeom prst="rect">
-                <a:avLst/>
-              </a:prstGeom>
-              <a:solidFill>
-                <a:srgbClr val="FF0000"/>
-              </a:solidFill>
-              <a:ln>
-                <a:noFill/>
-              </a:ln>
-            </p:spPr>
-            <p:style>
-              <a:lnRef idx="2">
-                <a:schemeClr val="accent1">
-                  <a:shade val="15000"/>
-                </a:schemeClr>
-              </a:lnRef>
-              <a:fillRef idx="1">
-                <a:schemeClr val="accent1"/>
-              </a:fillRef>
-              <a:effectRef idx="0">
-                <a:schemeClr val="accent1"/>
-              </a:effectRef>
-              <a:fontRef idx="minor">
-                <a:schemeClr val="lt1"/>
-              </a:fontRef>
-            </p:style>
-            <p:txBody>
-              <a:bodyPr rtlCol="0" anchor="ctr"/>
-              <a:lstStyle/>
-              <a:p>
-                <a:pPr algn="ctr"/>
-                <a:endParaRPr lang="en-GB"/>
-              </a:p>
-            </p:txBody>
-          </p:sp>
-          <p:sp>
-            <p:nvSpPr>
-              <p:cNvPr id="76" name="Rechthoek 75">
-                <a:extLst>
-                  <a:ext uri="{FF2B5EF4-FFF2-40B4-BE49-F238E27FC236}">
-                    <a16:creationId xmlns:a16="http://schemas.microsoft.com/office/drawing/2014/main" id="{F4EE7669-E55A-9C25-1650-1E5F1BEFB74C}"/>
-                  </a:ext>
-                </a:extLst>
-              </p:cNvPr>
-              <p:cNvSpPr/>
-              <p:nvPr/>
-            </p:nvSpPr>
-            <p:spPr>
-              <a:xfrm>
-                <a:off x="6337935" y="2247895"/>
-                <a:ext cx="158508" cy="45719"/>
-              </a:xfrm>
-              <a:prstGeom prst="rect">
-                <a:avLst/>
-              </a:prstGeom>
-              <a:solidFill>
-                <a:srgbClr val="FF0000"/>
-              </a:solidFill>
-              <a:ln>
-                <a:noFill/>
-              </a:ln>
-            </p:spPr>
-            <p:style>
-              <a:lnRef idx="2">
-                <a:schemeClr val="accent1">
-                  <a:shade val="15000"/>
-                </a:schemeClr>
-              </a:lnRef>
-              <a:fillRef idx="1">
-                <a:schemeClr val="accent1"/>
-              </a:fillRef>
-              <a:effectRef idx="0">
-                <a:schemeClr val="accent1"/>
-              </a:effectRef>
-              <a:fontRef idx="minor">
-                <a:schemeClr val="lt1"/>
-              </a:fontRef>
-            </p:style>
-            <p:txBody>
-              <a:bodyPr rtlCol="0" anchor="ctr"/>
-              <a:lstStyle/>
-              <a:p>
-                <a:pPr algn="ctr"/>
-                <a:endParaRPr lang="en-GB"/>
-              </a:p>
-            </p:txBody>
-          </p:sp>
-          <p:sp>
-            <p:nvSpPr>
-              <p:cNvPr id="77" name="Rechthoekige driehoek 76">
-                <a:extLst>
-                  <a:ext uri="{FF2B5EF4-FFF2-40B4-BE49-F238E27FC236}">
-                    <a16:creationId xmlns:a16="http://schemas.microsoft.com/office/drawing/2014/main" id="{E2A5FA9A-68FB-689C-6FD2-4038D5D3543B}"/>
-                  </a:ext>
-                </a:extLst>
-              </p:cNvPr>
-              <p:cNvSpPr/>
-              <p:nvPr/>
-            </p:nvSpPr>
-            <p:spPr>
-              <a:xfrm rot="10680000">
-                <a:off x="6343981" y="2399892"/>
-                <a:ext cx="144000" cy="144000"/>
-              </a:xfrm>
-              <a:prstGeom prst="rtTriangle">
-                <a:avLst/>
-              </a:prstGeom>
-              <a:solidFill>
-                <a:srgbClr val="FA0305"/>
-              </a:solidFill>
-              <a:ln>
-                <a:noFill/>
-              </a:ln>
-            </p:spPr>
-            <p:style>
-              <a:lnRef idx="2">
-                <a:schemeClr val="accent1">
-                  <a:shade val="15000"/>
-                </a:schemeClr>
-              </a:lnRef>
-              <a:fillRef idx="1">
-                <a:schemeClr val="accent1"/>
-              </a:fillRef>
-              <a:effectRef idx="0">
-                <a:schemeClr val="accent1"/>
-              </a:effectRef>
-              <a:fontRef idx="minor">
-                <a:schemeClr val="lt1"/>
-              </a:fontRef>
-            </p:style>
-            <p:txBody>
-              <a:bodyPr rtlCol="0" anchor="ctr"/>
-              <a:lstStyle/>
-              <a:p>
-                <a:pPr algn="ctr"/>
-                <a:endParaRPr lang="en-GB"/>
-              </a:p>
-            </p:txBody>
-          </p:sp>
-          <p:sp>
-            <p:nvSpPr>
-              <p:cNvPr id="78" name="Rechthoekige driehoek 77">
-                <a:extLst>
-                  <a:ext uri="{FF2B5EF4-FFF2-40B4-BE49-F238E27FC236}">
-                    <a16:creationId xmlns:a16="http://schemas.microsoft.com/office/drawing/2014/main" id="{CDBDF683-24AF-AC07-F74E-6F8634F22736}"/>
-                  </a:ext>
-                </a:extLst>
-              </p:cNvPr>
-              <p:cNvSpPr/>
-              <p:nvPr/>
-            </p:nvSpPr>
-            <p:spPr>
-              <a:xfrm rot="10680000">
-                <a:off x="6380346" y="2435318"/>
-                <a:ext cx="108000" cy="108000"/>
-              </a:xfrm>
-              <a:prstGeom prst="rtTriangle">
-                <a:avLst/>
-              </a:prstGeom>
-              <a:solidFill>
-                <a:srgbClr val="F1080D"/>
-              </a:solidFill>
-              <a:ln>
-                <a:noFill/>
-              </a:ln>
-            </p:spPr>
-            <p:style>
-              <a:lnRef idx="2">
-                <a:schemeClr val="accent1">
-                  <a:shade val="15000"/>
-                </a:schemeClr>
-              </a:lnRef>
-              <a:fillRef idx="1">
-                <a:schemeClr val="accent1"/>
-              </a:fillRef>
-              <a:effectRef idx="0">
-                <a:schemeClr val="accent1"/>
-              </a:effectRef>
-              <a:fontRef idx="minor">
-                <a:schemeClr val="lt1"/>
-              </a:fontRef>
-            </p:style>
-            <p:txBody>
-              <a:bodyPr rtlCol="0" anchor="ctr"/>
-              <a:lstStyle/>
-              <a:p>
-                <a:pPr algn="ctr"/>
-                <a:endParaRPr lang="en-GB"/>
-              </a:p>
-            </p:txBody>
-          </p:sp>
-          <p:sp>
-            <p:nvSpPr>
-              <p:cNvPr id="79" name="Rechthoekige driehoek 78">
-                <a:extLst>
-                  <a:ext uri="{FF2B5EF4-FFF2-40B4-BE49-F238E27FC236}">
-                    <a16:creationId xmlns:a16="http://schemas.microsoft.com/office/drawing/2014/main" id="{F619FDB9-47E7-2522-11C3-0F17269FBA2D}"/>
-                  </a:ext>
-                </a:extLst>
-              </p:cNvPr>
-              <p:cNvSpPr/>
-              <p:nvPr/>
-            </p:nvSpPr>
-            <p:spPr>
-              <a:xfrm rot="10680000">
-                <a:off x="6419962" y="2474435"/>
-                <a:ext cx="72000" cy="72000"/>
-              </a:xfrm>
-              <a:prstGeom prst="rtTriangle">
-                <a:avLst/>
-              </a:prstGeom>
-              <a:solidFill>
-                <a:srgbClr val="EA0C13"/>
-              </a:solidFill>
-              <a:ln>
-                <a:noFill/>
-              </a:ln>
-            </p:spPr>
-            <p:style>
-              <a:lnRef idx="2">
-                <a:schemeClr val="accent1">
-                  <a:shade val="15000"/>
-                </a:schemeClr>
-              </a:lnRef>
-              <a:fillRef idx="1">
-                <a:schemeClr val="accent1"/>
-              </a:fillRef>
-              <a:effectRef idx="0">
-                <a:schemeClr val="accent1"/>
-              </a:effectRef>
-              <a:fontRef idx="minor">
-                <a:schemeClr val="lt1"/>
-              </a:fontRef>
-            </p:style>
-            <p:txBody>
-              <a:bodyPr rtlCol="0" anchor="ctr"/>
-              <a:lstStyle/>
-              <a:p>
-                <a:pPr algn="ctr"/>
-                <a:endParaRPr lang="en-GB"/>
-              </a:p>
-            </p:txBody>
-          </p:sp>
-          <p:sp>
-            <p:nvSpPr>
-              <p:cNvPr id="80" name="Rechthoekige driehoek 79">
-                <a:extLst>
-                  <a:ext uri="{FF2B5EF4-FFF2-40B4-BE49-F238E27FC236}">
-                    <a16:creationId xmlns:a16="http://schemas.microsoft.com/office/drawing/2014/main" id="{59F88A0E-6130-6D31-67E4-8697C6E90241}"/>
-                  </a:ext>
-                </a:extLst>
-              </p:cNvPr>
-              <p:cNvSpPr/>
-              <p:nvPr/>
-            </p:nvSpPr>
-            <p:spPr>
-              <a:xfrm rot="10680000">
-                <a:off x="6438062" y="2492435"/>
-                <a:ext cx="36000" cy="36000"/>
-              </a:xfrm>
-              <a:prstGeom prst="rtTriangle">
-                <a:avLst/>
-              </a:prstGeom>
-              <a:solidFill>
-                <a:srgbClr val="EA0C13"/>
-              </a:solidFill>
-              <a:ln>
-                <a:noFill/>
-              </a:ln>
-            </p:spPr>
-            <p:style>
-              <a:lnRef idx="2">
-                <a:schemeClr val="accent1">
-                  <a:shade val="15000"/>
-                </a:schemeClr>
-              </a:lnRef>
-              <a:fillRef idx="1">
-                <a:schemeClr val="accent1"/>
-              </a:fillRef>
-              <a:effectRef idx="0">
-                <a:schemeClr val="accent1"/>
-              </a:effectRef>
-              <a:fontRef idx="minor">
-                <a:schemeClr val="lt1"/>
-              </a:fontRef>
-            </p:style>
-            <p:txBody>
-              <a:bodyPr rtlCol="0" anchor="ctr"/>
-              <a:lstStyle/>
-              <a:p>
-                <a:pPr algn="ctr"/>
-                <a:endParaRPr lang="en-GB"/>
-              </a:p>
-            </p:txBody>
-          </p:sp>
-          <p:pic>
-            <p:nvPicPr>
-              <p:cNvPr id="81" name="Afbeelding 80" descr="Afbeelding met zwart, duisternis&#10;&#10;Door AI gegenereerde inhoud is mogelijk onjuist.">
-                <a:extLst>
-                  <a:ext uri="{FF2B5EF4-FFF2-40B4-BE49-F238E27FC236}">
-                    <a16:creationId xmlns:a16="http://schemas.microsoft.com/office/drawing/2014/main" id="{C3D770F1-7895-782A-A59E-94F16FE7F666}"/>
-                  </a:ext>
-                </a:extLst>
-              </p:cNvPr>
-              <p:cNvPicPr>
-                <a:picLocks noChangeAspect="1"/>
-              </p:cNvPicPr>
-              <p:nvPr/>
-            </p:nvPicPr>
-            <p:blipFill>
-              <a:blip r:embed="rId4">
-                <a:extLst>
-                  <a:ext uri="{28A0092B-C50C-407E-A947-70E740481C1C}">
-                    <a14:useLocalDpi xmlns:a14="http://schemas.microsoft.com/office/drawing/2010/main" val="0"/>
-                  </a:ext>
-                </a:extLst>
-              </a:blip>
-              <a:srcRect l="23291" t="23267" r="23403"/>
-              <a:stretch/>
-            </p:blipFill>
-            <p:spPr>
-              <a:xfrm>
-                <a:off x="4768543" y="1518219"/>
-                <a:ext cx="2654913" cy="3821561"/>
-              </a:xfrm>
-              <a:prstGeom prst="rect">
-                <a:avLst/>
-              </a:prstGeom>
-            </p:spPr>
-          </p:pic>
-        </p:grpSp>
+            <a:prstGeom prst="rect">
+              <a:avLst/>
+            </a:prstGeom>
+          </p:spPr>
+        </p:pic>
       </p:grpSp>
     </p:spTree>
     <p:extLst>
@@ -6321,17 +6302,868 @@
           <a:p>
             <a:r>
               <a:rPr lang="en-GB" b="1" dirty="0"/>
-              <a:t>Minimal icon</a:t>
+              <a:t>Minimal icon – Light mode</a:t>
+            </a:r>
+          </a:p>
+        </p:txBody>
+      </p:sp>
+      <p:sp>
+        <p:nvSpPr>
+          <p:cNvPr id="10" name="Vrije vorm: vorm 9">
+            <a:extLst>
+              <a:ext uri="{FF2B5EF4-FFF2-40B4-BE49-F238E27FC236}">
+                <a16:creationId xmlns:a16="http://schemas.microsoft.com/office/drawing/2014/main" id="{31096432-5763-DB49-DD5D-93FEC2460A94}"/>
+              </a:ext>
+            </a:extLst>
+          </p:cNvPr>
+          <p:cNvSpPr/>
+          <p:nvPr/>
+        </p:nvSpPr>
+        <p:spPr>
+          <a:xfrm>
+            <a:off x="4951422" y="1672864"/>
+            <a:ext cx="2295460" cy="2888243"/>
+          </a:xfrm>
+          <a:custGeom>
+            <a:avLst/>
+            <a:gdLst>
+              <a:gd name="connsiteX0" fmla="*/ 1059443 w 2295460"/>
+              <a:gd name="connsiteY0" fmla="*/ 0 h 2888243"/>
+              <a:gd name="connsiteX1" fmla="*/ 441435 w 2295460"/>
+              <a:gd name="connsiteY1" fmla="*/ 258555 h 2888243"/>
+              <a:gd name="connsiteX2" fmla="*/ 81981 w 2295460"/>
+              <a:gd name="connsiteY2" fmla="*/ 592784 h 2888243"/>
+              <a:gd name="connsiteX3" fmla="*/ 0 w 2295460"/>
+              <a:gd name="connsiteY3" fmla="*/ 1040525 h 2888243"/>
+              <a:gd name="connsiteX4" fmla="*/ 0 w 2295460"/>
+              <a:gd name="connsiteY4" fmla="*/ 1437816 h 2888243"/>
+              <a:gd name="connsiteX5" fmla="*/ 182880 w 2295460"/>
+              <a:gd name="connsiteY5" fmla="*/ 1809882 h 2888243"/>
+              <a:gd name="connsiteX6" fmla="*/ 422516 w 2295460"/>
+              <a:gd name="connsiteY6" fmla="*/ 2074742 h 2888243"/>
+              <a:gd name="connsiteX7" fmla="*/ 504497 w 2295460"/>
+              <a:gd name="connsiteY7" fmla="*/ 2326991 h 2888243"/>
+              <a:gd name="connsiteX8" fmla="*/ 599090 w 2295460"/>
+              <a:gd name="connsiteY8" fmla="*/ 2787344 h 2888243"/>
+              <a:gd name="connsiteX9" fmla="*/ 813501 w 2295460"/>
+              <a:gd name="connsiteY9" fmla="*/ 2888243 h 2888243"/>
+              <a:gd name="connsiteX10" fmla="*/ 1570246 w 2295460"/>
+              <a:gd name="connsiteY10" fmla="*/ 2881937 h 2888243"/>
+              <a:gd name="connsiteX11" fmla="*/ 1753126 w 2295460"/>
+              <a:gd name="connsiteY11" fmla="*/ 2579239 h 2888243"/>
+              <a:gd name="connsiteX12" fmla="*/ 1822494 w 2295460"/>
+              <a:gd name="connsiteY12" fmla="*/ 2200867 h 2888243"/>
+              <a:gd name="connsiteX13" fmla="*/ 2150417 w 2295460"/>
+              <a:gd name="connsiteY13" fmla="*/ 1790963 h 2888243"/>
+              <a:gd name="connsiteX14" fmla="*/ 2295460 w 2295460"/>
+              <a:gd name="connsiteY14" fmla="*/ 1273854 h 2888243"/>
+              <a:gd name="connsiteX15" fmla="*/ 2282847 w 2295460"/>
+              <a:gd name="connsiteY15" fmla="*/ 807195 h 2888243"/>
+              <a:gd name="connsiteX16" fmla="*/ 2049518 w 2295460"/>
+              <a:gd name="connsiteY16" fmla="*/ 422516 h 2888243"/>
+              <a:gd name="connsiteX17" fmla="*/ 1765738 w 2295460"/>
+              <a:gd name="connsiteY17" fmla="*/ 182880 h 2888243"/>
+              <a:gd name="connsiteX18" fmla="*/ 1412591 w 2295460"/>
+              <a:gd name="connsiteY18" fmla="*/ 44144 h 2888243"/>
+              <a:gd name="connsiteX19" fmla="*/ 1059443 w 2295460"/>
+              <a:gd name="connsiteY19" fmla="*/ 0 h 2888243"/>
+            </a:gdLst>
+            <a:ahLst/>
+            <a:cxnLst>
+              <a:cxn ang="0">
+                <a:pos x="connsiteX0" y="connsiteY0"/>
+              </a:cxn>
+              <a:cxn ang="0">
+                <a:pos x="connsiteX1" y="connsiteY1"/>
+              </a:cxn>
+              <a:cxn ang="0">
+                <a:pos x="connsiteX2" y="connsiteY2"/>
+              </a:cxn>
+              <a:cxn ang="0">
+                <a:pos x="connsiteX3" y="connsiteY3"/>
+              </a:cxn>
+              <a:cxn ang="0">
+                <a:pos x="connsiteX4" y="connsiteY4"/>
+              </a:cxn>
+              <a:cxn ang="0">
+                <a:pos x="connsiteX5" y="connsiteY5"/>
+              </a:cxn>
+              <a:cxn ang="0">
+                <a:pos x="connsiteX6" y="connsiteY6"/>
+              </a:cxn>
+              <a:cxn ang="0">
+                <a:pos x="connsiteX7" y="connsiteY7"/>
+              </a:cxn>
+              <a:cxn ang="0">
+                <a:pos x="connsiteX8" y="connsiteY8"/>
+              </a:cxn>
+              <a:cxn ang="0">
+                <a:pos x="connsiteX9" y="connsiteY9"/>
+              </a:cxn>
+              <a:cxn ang="0">
+                <a:pos x="connsiteX10" y="connsiteY10"/>
+              </a:cxn>
+              <a:cxn ang="0">
+                <a:pos x="connsiteX11" y="connsiteY11"/>
+              </a:cxn>
+              <a:cxn ang="0">
+                <a:pos x="connsiteX12" y="connsiteY12"/>
+              </a:cxn>
+              <a:cxn ang="0">
+                <a:pos x="connsiteX13" y="connsiteY13"/>
+              </a:cxn>
+              <a:cxn ang="0">
+                <a:pos x="connsiteX14" y="connsiteY14"/>
+              </a:cxn>
+              <a:cxn ang="0">
+                <a:pos x="connsiteX15" y="connsiteY15"/>
+              </a:cxn>
+              <a:cxn ang="0">
+                <a:pos x="connsiteX16" y="connsiteY16"/>
+              </a:cxn>
+              <a:cxn ang="0">
+                <a:pos x="connsiteX17" y="connsiteY17"/>
+              </a:cxn>
+              <a:cxn ang="0">
+                <a:pos x="connsiteX18" y="connsiteY18"/>
+              </a:cxn>
+              <a:cxn ang="0">
+                <a:pos x="connsiteX19" y="connsiteY19"/>
+              </a:cxn>
+            </a:cxnLst>
+            <a:rect l="l" t="t" r="r" b="b"/>
+            <a:pathLst>
+              <a:path w="2295460" h="2888243">
+                <a:moveTo>
+                  <a:pt x="1059443" y="0"/>
+                </a:moveTo>
+                <a:lnTo>
+                  <a:pt x="441435" y="258555"/>
+                </a:lnTo>
+                <a:lnTo>
+                  <a:pt x="81981" y="592784"/>
+                </a:lnTo>
+                <a:lnTo>
+                  <a:pt x="0" y="1040525"/>
+                </a:lnTo>
+                <a:lnTo>
+                  <a:pt x="0" y="1437816"/>
+                </a:lnTo>
+                <a:lnTo>
+                  <a:pt x="182880" y="1809882"/>
+                </a:lnTo>
+                <a:lnTo>
+                  <a:pt x="422516" y="2074742"/>
+                </a:lnTo>
+                <a:lnTo>
+                  <a:pt x="504497" y="2326991"/>
+                </a:lnTo>
+                <a:lnTo>
+                  <a:pt x="599090" y="2787344"/>
+                </a:lnTo>
+                <a:lnTo>
+                  <a:pt x="813501" y="2888243"/>
+                </a:lnTo>
+                <a:lnTo>
+                  <a:pt x="1570246" y="2881937"/>
+                </a:lnTo>
+                <a:lnTo>
+                  <a:pt x="1753126" y="2579239"/>
+                </a:lnTo>
+                <a:lnTo>
+                  <a:pt x="1822494" y="2200867"/>
+                </a:lnTo>
+                <a:lnTo>
+                  <a:pt x="2150417" y="1790963"/>
+                </a:lnTo>
+                <a:lnTo>
+                  <a:pt x="2295460" y="1273854"/>
+                </a:lnTo>
+                <a:lnTo>
+                  <a:pt x="2282847" y="807195"/>
+                </a:lnTo>
+                <a:lnTo>
+                  <a:pt x="2049518" y="422516"/>
+                </a:lnTo>
+                <a:lnTo>
+                  <a:pt x="1765738" y="182880"/>
+                </a:lnTo>
+                <a:lnTo>
+                  <a:pt x="1412591" y="44144"/>
+                </a:lnTo>
+                <a:lnTo>
+                  <a:pt x="1059443" y="0"/>
+                </a:lnTo>
+                <a:close/>
+              </a:path>
+            </a:pathLst>
+          </a:custGeom>
+          <a:gradFill flip="none" rotWithShape="1">
+            <a:gsLst>
+              <a:gs pos="25000">
+                <a:srgbClr val="FF0000"/>
+              </a:gs>
+              <a:gs pos="75000">
+                <a:srgbClr val="0070C0">
+                  <a:alpha val="86000"/>
+                </a:srgbClr>
+              </a:gs>
+            </a:gsLst>
+            <a:lin ang="5400000" scaled="1"/>
+            <a:tileRect/>
+          </a:gradFill>
+        </p:spPr>
+        <p:style>
+          <a:lnRef idx="2">
+            <a:schemeClr val="accent1">
+              <a:shade val="15000"/>
+            </a:schemeClr>
+          </a:lnRef>
+          <a:fillRef idx="1">
+            <a:schemeClr val="accent1"/>
+          </a:fillRef>
+          <a:effectRef idx="0">
+            <a:schemeClr val="accent1"/>
+          </a:effectRef>
+          <a:fontRef idx="minor">
+            <a:schemeClr val="lt1"/>
+          </a:fontRef>
+        </p:style>
+        <p:txBody>
+          <a:bodyPr rtlCol="0" anchor="ctr"/>
+          <a:lstStyle/>
+          <a:p>
+            <a:pPr algn="ctr"/>
+            <a:endParaRPr lang="en-GB" dirty="0"/>
+          </a:p>
+        </p:txBody>
+      </p:sp>
+      <p:pic>
+        <p:nvPicPr>
+          <p:cNvPr id="7" name="Graphic 6" descr="Huis met effen opvulling">
+            <a:extLst>
+              <a:ext uri="{FF2B5EF4-FFF2-40B4-BE49-F238E27FC236}">
+                <a16:creationId xmlns:a16="http://schemas.microsoft.com/office/drawing/2014/main" id="{C04A5282-7B5E-44C2-F4BA-BA4D5A09B62A}"/>
+              </a:ext>
+            </a:extLst>
+          </p:cNvPr>
+          <p:cNvPicPr>
+            <a:picLocks noChangeAspect="1"/>
+          </p:cNvPicPr>
+          <p:nvPr/>
+        </p:nvPicPr>
+        <p:blipFill>
+          <a:blip r:embed="rId2">
+            <a:extLst>
+              <a:ext uri="{96DAC541-7B7A-43D3-8B79-37D633B846F1}">
+                <asvg:svgBlip xmlns:asvg="http://schemas.microsoft.com/office/drawing/2016/SVG/main" r:embed="rId3"/>
+              </a:ext>
+            </a:extLst>
+          </a:blip>
+          <a:srcRect/>
+          <a:stretch/>
+        </p:blipFill>
+        <p:spPr>
+          <a:xfrm>
+            <a:off x="5349458" y="1989735"/>
+            <a:ext cx="1512000" cy="1512000"/>
+          </a:xfrm>
+          <a:prstGeom prst="rect">
+            <a:avLst/>
+          </a:prstGeom>
+        </p:spPr>
+      </p:pic>
+      <p:sp>
+        <p:nvSpPr>
+          <p:cNvPr id="8" name="Rechthoek 7">
+            <a:extLst>
+              <a:ext uri="{FF2B5EF4-FFF2-40B4-BE49-F238E27FC236}">
+                <a16:creationId xmlns:a16="http://schemas.microsoft.com/office/drawing/2014/main" id="{EF5DC001-E5C5-3DA2-8027-076F8BFEBE6D}"/>
+              </a:ext>
+            </a:extLst>
+          </p:cNvPr>
+          <p:cNvSpPr/>
+          <p:nvPr/>
+        </p:nvSpPr>
+        <p:spPr>
+          <a:xfrm>
+            <a:off x="5714473" y="4617863"/>
+            <a:ext cx="781970" cy="510803"/>
+          </a:xfrm>
+          <a:prstGeom prst="rect">
+            <a:avLst/>
+          </a:prstGeom>
+          <a:solidFill>
+            <a:schemeClr val="bg2">
+              <a:lumMod val="75000"/>
+            </a:schemeClr>
+          </a:solidFill>
+        </p:spPr>
+        <p:style>
+          <a:lnRef idx="2">
+            <a:schemeClr val="accent1">
+              <a:shade val="15000"/>
+            </a:schemeClr>
+          </a:lnRef>
+          <a:fillRef idx="1">
+            <a:schemeClr val="accent1"/>
+          </a:fillRef>
+          <a:effectRef idx="0">
+            <a:schemeClr val="accent1"/>
+          </a:effectRef>
+          <a:fontRef idx="minor">
+            <a:schemeClr val="lt1"/>
+          </a:fontRef>
+        </p:style>
+        <p:txBody>
+          <a:bodyPr rtlCol="0" anchor="ctr"/>
+          <a:lstStyle/>
+          <a:p>
+            <a:pPr algn="ctr"/>
+            <a:endParaRPr lang="en-GB"/>
+          </a:p>
+        </p:txBody>
+      </p:sp>
+      <p:sp>
+        <p:nvSpPr>
+          <p:cNvPr id="23" name="Rechthoek 22">
+            <a:extLst>
+              <a:ext uri="{FF2B5EF4-FFF2-40B4-BE49-F238E27FC236}">
+                <a16:creationId xmlns:a16="http://schemas.microsoft.com/office/drawing/2014/main" id="{22009CBD-7430-F663-9765-F884FF673E0E}"/>
+              </a:ext>
+            </a:extLst>
+          </p:cNvPr>
+          <p:cNvSpPr/>
+          <p:nvPr/>
+        </p:nvSpPr>
+        <p:spPr>
+          <a:xfrm>
+            <a:off x="6357189" y="2363698"/>
+            <a:ext cx="158508" cy="45719"/>
+          </a:xfrm>
+          <a:prstGeom prst="rect">
+            <a:avLst/>
+          </a:prstGeom>
+          <a:solidFill>
+            <a:srgbClr val="FF0000"/>
+          </a:solidFill>
+          <a:ln>
+            <a:noFill/>
+          </a:ln>
+        </p:spPr>
+        <p:style>
+          <a:lnRef idx="2">
+            <a:schemeClr val="accent1">
+              <a:shade val="15000"/>
+            </a:schemeClr>
+          </a:lnRef>
+          <a:fillRef idx="1">
+            <a:schemeClr val="accent1"/>
+          </a:fillRef>
+          <a:effectRef idx="0">
+            <a:schemeClr val="accent1"/>
+          </a:effectRef>
+          <a:fontRef idx="minor">
+            <a:schemeClr val="lt1"/>
+          </a:fontRef>
+        </p:style>
+        <p:txBody>
+          <a:bodyPr rtlCol="0" anchor="ctr"/>
+          <a:lstStyle/>
+          <a:p>
+            <a:pPr algn="ctr"/>
+            <a:endParaRPr lang="en-GB"/>
+          </a:p>
+        </p:txBody>
+      </p:sp>
+      <p:sp>
+        <p:nvSpPr>
+          <p:cNvPr id="24" name="Rechthoek 23">
+            <a:extLst>
+              <a:ext uri="{FF2B5EF4-FFF2-40B4-BE49-F238E27FC236}">
+                <a16:creationId xmlns:a16="http://schemas.microsoft.com/office/drawing/2014/main" id="{9750DEC3-84A7-1604-F11D-E6868E3D9C71}"/>
+              </a:ext>
+            </a:extLst>
+          </p:cNvPr>
+          <p:cNvSpPr/>
+          <p:nvPr/>
+        </p:nvSpPr>
+        <p:spPr>
+          <a:xfrm>
+            <a:off x="6337935" y="2320271"/>
+            <a:ext cx="158508" cy="45719"/>
+          </a:xfrm>
+          <a:prstGeom prst="rect">
+            <a:avLst/>
+          </a:prstGeom>
+          <a:solidFill>
+            <a:srgbClr val="FF0000"/>
+          </a:solidFill>
+          <a:ln>
+            <a:noFill/>
+          </a:ln>
+        </p:spPr>
+        <p:style>
+          <a:lnRef idx="2">
+            <a:schemeClr val="accent1">
+              <a:shade val="15000"/>
+            </a:schemeClr>
+          </a:lnRef>
+          <a:fillRef idx="1">
+            <a:schemeClr val="accent1"/>
+          </a:fillRef>
+          <a:effectRef idx="0">
+            <a:schemeClr val="accent1"/>
+          </a:effectRef>
+          <a:fontRef idx="minor">
+            <a:schemeClr val="lt1"/>
+          </a:fontRef>
+        </p:style>
+        <p:txBody>
+          <a:bodyPr rtlCol="0" anchor="ctr"/>
+          <a:lstStyle/>
+          <a:p>
+            <a:pPr algn="ctr"/>
+            <a:endParaRPr lang="en-GB"/>
+          </a:p>
+        </p:txBody>
+      </p:sp>
+      <p:sp>
+        <p:nvSpPr>
+          <p:cNvPr id="30" name="Rechthoek 29">
+            <a:extLst>
+              <a:ext uri="{FF2B5EF4-FFF2-40B4-BE49-F238E27FC236}">
+                <a16:creationId xmlns:a16="http://schemas.microsoft.com/office/drawing/2014/main" id="{F412B91D-4AE3-5E4D-D217-85C3C0E995FE}"/>
+              </a:ext>
+            </a:extLst>
+          </p:cNvPr>
+          <p:cNvSpPr/>
+          <p:nvPr/>
+        </p:nvSpPr>
+        <p:spPr>
+          <a:xfrm>
+            <a:off x="6329785" y="2284083"/>
+            <a:ext cx="158508" cy="45719"/>
+          </a:xfrm>
+          <a:prstGeom prst="rect">
+            <a:avLst/>
+          </a:prstGeom>
+          <a:solidFill>
+            <a:srgbClr val="FF0000"/>
+          </a:solidFill>
+          <a:ln>
+            <a:noFill/>
+          </a:ln>
+        </p:spPr>
+        <p:style>
+          <a:lnRef idx="2">
+            <a:schemeClr val="accent1">
+              <a:shade val="15000"/>
+            </a:schemeClr>
+          </a:lnRef>
+          <a:fillRef idx="1">
+            <a:schemeClr val="accent1"/>
+          </a:fillRef>
+          <a:effectRef idx="0">
+            <a:schemeClr val="accent1"/>
+          </a:effectRef>
+          <a:fontRef idx="minor">
+            <a:schemeClr val="lt1"/>
+          </a:fontRef>
+        </p:style>
+        <p:txBody>
+          <a:bodyPr rtlCol="0" anchor="ctr"/>
+          <a:lstStyle/>
+          <a:p>
+            <a:pPr algn="ctr"/>
+            <a:endParaRPr lang="en-GB"/>
+          </a:p>
+        </p:txBody>
+      </p:sp>
+      <p:sp>
+        <p:nvSpPr>
+          <p:cNvPr id="31" name="Rechthoek 30">
+            <a:extLst>
+              <a:ext uri="{FF2B5EF4-FFF2-40B4-BE49-F238E27FC236}">
+                <a16:creationId xmlns:a16="http://schemas.microsoft.com/office/drawing/2014/main" id="{08E30AAE-41D7-CCC6-0579-174FC2FCBBBE}"/>
+              </a:ext>
+            </a:extLst>
+          </p:cNvPr>
+          <p:cNvSpPr/>
+          <p:nvPr/>
+        </p:nvSpPr>
+        <p:spPr>
+          <a:xfrm>
+            <a:off x="6337935" y="2247895"/>
+            <a:ext cx="158508" cy="45719"/>
+          </a:xfrm>
+          <a:prstGeom prst="rect">
+            <a:avLst/>
+          </a:prstGeom>
+          <a:solidFill>
+            <a:srgbClr val="FF0000"/>
+          </a:solidFill>
+          <a:ln>
+            <a:noFill/>
+          </a:ln>
+        </p:spPr>
+        <p:style>
+          <a:lnRef idx="2">
+            <a:schemeClr val="accent1">
+              <a:shade val="15000"/>
+            </a:schemeClr>
+          </a:lnRef>
+          <a:fillRef idx="1">
+            <a:schemeClr val="accent1"/>
+          </a:fillRef>
+          <a:effectRef idx="0">
+            <a:schemeClr val="accent1"/>
+          </a:effectRef>
+          <a:fontRef idx="minor">
+            <a:schemeClr val="lt1"/>
+          </a:fontRef>
+        </p:style>
+        <p:txBody>
+          <a:bodyPr rtlCol="0" anchor="ctr"/>
+          <a:lstStyle/>
+          <a:p>
+            <a:pPr algn="ctr"/>
+            <a:endParaRPr lang="en-GB"/>
+          </a:p>
+        </p:txBody>
+      </p:sp>
+      <p:sp>
+        <p:nvSpPr>
+          <p:cNvPr id="34" name="Rechthoekige driehoek 33">
+            <a:extLst>
+              <a:ext uri="{FF2B5EF4-FFF2-40B4-BE49-F238E27FC236}">
+                <a16:creationId xmlns:a16="http://schemas.microsoft.com/office/drawing/2014/main" id="{7D176FB3-3A1E-8482-E466-3223DB6AB7C2}"/>
+              </a:ext>
+            </a:extLst>
+          </p:cNvPr>
+          <p:cNvSpPr/>
+          <p:nvPr/>
+        </p:nvSpPr>
+        <p:spPr>
+          <a:xfrm rot="10680000">
+            <a:off x="6343981" y="2399892"/>
+            <a:ext cx="144000" cy="144000"/>
+          </a:xfrm>
+          <a:prstGeom prst="rtTriangle">
+            <a:avLst/>
+          </a:prstGeom>
+          <a:solidFill>
+            <a:srgbClr val="FA0305"/>
+          </a:solidFill>
+          <a:ln>
+            <a:noFill/>
+          </a:ln>
+        </p:spPr>
+        <p:style>
+          <a:lnRef idx="2">
+            <a:schemeClr val="accent1">
+              <a:shade val="15000"/>
+            </a:schemeClr>
+          </a:lnRef>
+          <a:fillRef idx="1">
+            <a:schemeClr val="accent1"/>
+          </a:fillRef>
+          <a:effectRef idx="0">
+            <a:schemeClr val="accent1"/>
+          </a:effectRef>
+          <a:fontRef idx="minor">
+            <a:schemeClr val="lt1"/>
+          </a:fontRef>
+        </p:style>
+        <p:txBody>
+          <a:bodyPr rtlCol="0" anchor="ctr"/>
+          <a:lstStyle/>
+          <a:p>
+            <a:pPr algn="ctr"/>
+            <a:endParaRPr lang="en-GB"/>
+          </a:p>
+        </p:txBody>
+      </p:sp>
+      <p:sp>
+        <p:nvSpPr>
+          <p:cNvPr id="35" name="Rechthoekige driehoek 34">
+            <a:extLst>
+              <a:ext uri="{FF2B5EF4-FFF2-40B4-BE49-F238E27FC236}">
+                <a16:creationId xmlns:a16="http://schemas.microsoft.com/office/drawing/2014/main" id="{4793F759-CFB8-5D88-84D0-20F3173C5A55}"/>
+              </a:ext>
+            </a:extLst>
+          </p:cNvPr>
+          <p:cNvSpPr/>
+          <p:nvPr/>
+        </p:nvSpPr>
+        <p:spPr>
+          <a:xfrm rot="10680000">
+            <a:off x="6380346" y="2435318"/>
+            <a:ext cx="108000" cy="108000"/>
+          </a:xfrm>
+          <a:prstGeom prst="rtTriangle">
+            <a:avLst/>
+          </a:prstGeom>
+          <a:solidFill>
+            <a:srgbClr val="F1080D"/>
+          </a:solidFill>
+          <a:ln>
+            <a:noFill/>
+          </a:ln>
+        </p:spPr>
+        <p:style>
+          <a:lnRef idx="2">
+            <a:schemeClr val="accent1">
+              <a:shade val="15000"/>
+            </a:schemeClr>
+          </a:lnRef>
+          <a:fillRef idx="1">
+            <a:schemeClr val="accent1"/>
+          </a:fillRef>
+          <a:effectRef idx="0">
+            <a:schemeClr val="accent1"/>
+          </a:effectRef>
+          <a:fontRef idx="minor">
+            <a:schemeClr val="lt1"/>
+          </a:fontRef>
+        </p:style>
+        <p:txBody>
+          <a:bodyPr rtlCol="0" anchor="ctr"/>
+          <a:lstStyle/>
+          <a:p>
+            <a:pPr algn="ctr"/>
+            <a:endParaRPr lang="en-GB"/>
+          </a:p>
+        </p:txBody>
+      </p:sp>
+      <p:sp>
+        <p:nvSpPr>
+          <p:cNvPr id="36" name="Rechthoekige driehoek 35">
+            <a:extLst>
+              <a:ext uri="{FF2B5EF4-FFF2-40B4-BE49-F238E27FC236}">
+                <a16:creationId xmlns:a16="http://schemas.microsoft.com/office/drawing/2014/main" id="{AB1FDB77-CDE2-498F-6610-499AED680374}"/>
+              </a:ext>
+            </a:extLst>
+          </p:cNvPr>
+          <p:cNvSpPr/>
+          <p:nvPr/>
+        </p:nvSpPr>
+        <p:spPr>
+          <a:xfrm rot="10680000">
+            <a:off x="6419962" y="2474435"/>
+            <a:ext cx="72000" cy="72000"/>
+          </a:xfrm>
+          <a:prstGeom prst="rtTriangle">
+            <a:avLst/>
+          </a:prstGeom>
+          <a:solidFill>
+            <a:srgbClr val="EA0C13"/>
+          </a:solidFill>
+          <a:ln>
+            <a:noFill/>
+          </a:ln>
+        </p:spPr>
+        <p:style>
+          <a:lnRef idx="2">
+            <a:schemeClr val="accent1">
+              <a:shade val="15000"/>
+            </a:schemeClr>
+          </a:lnRef>
+          <a:fillRef idx="1">
+            <a:schemeClr val="accent1"/>
+          </a:fillRef>
+          <a:effectRef idx="0">
+            <a:schemeClr val="accent1"/>
+          </a:effectRef>
+          <a:fontRef idx="minor">
+            <a:schemeClr val="lt1"/>
+          </a:fontRef>
+        </p:style>
+        <p:txBody>
+          <a:bodyPr rtlCol="0" anchor="ctr"/>
+          <a:lstStyle/>
+          <a:p>
+            <a:pPr algn="ctr"/>
+            <a:endParaRPr lang="en-GB"/>
+          </a:p>
+        </p:txBody>
+      </p:sp>
+      <p:sp>
+        <p:nvSpPr>
+          <p:cNvPr id="37" name="Rechthoekige driehoek 36">
+            <a:extLst>
+              <a:ext uri="{FF2B5EF4-FFF2-40B4-BE49-F238E27FC236}">
+                <a16:creationId xmlns:a16="http://schemas.microsoft.com/office/drawing/2014/main" id="{E8A6F7A9-0256-B66F-3015-AD32113DE93D}"/>
+              </a:ext>
+            </a:extLst>
+          </p:cNvPr>
+          <p:cNvSpPr/>
+          <p:nvPr/>
+        </p:nvSpPr>
+        <p:spPr>
+          <a:xfrm rot="10680000">
+            <a:off x="6438062" y="2492435"/>
+            <a:ext cx="36000" cy="36000"/>
+          </a:xfrm>
+          <a:prstGeom prst="rtTriangle">
+            <a:avLst/>
+          </a:prstGeom>
+          <a:solidFill>
+            <a:srgbClr val="EA0C13"/>
+          </a:solidFill>
+          <a:ln>
+            <a:noFill/>
+          </a:ln>
+        </p:spPr>
+        <p:style>
+          <a:lnRef idx="2">
+            <a:schemeClr val="accent1">
+              <a:shade val="15000"/>
+            </a:schemeClr>
+          </a:lnRef>
+          <a:fillRef idx="1">
+            <a:schemeClr val="accent1"/>
+          </a:fillRef>
+          <a:effectRef idx="0">
+            <a:schemeClr val="accent1"/>
+          </a:effectRef>
+          <a:fontRef idx="minor">
+            <a:schemeClr val="lt1"/>
+          </a:fontRef>
+        </p:style>
+        <p:txBody>
+          <a:bodyPr rtlCol="0" anchor="ctr"/>
+          <a:lstStyle/>
+          <a:p>
+            <a:pPr algn="ctr"/>
+            <a:endParaRPr lang="en-GB"/>
+          </a:p>
+        </p:txBody>
+      </p:sp>
+      <p:pic>
+        <p:nvPicPr>
+          <p:cNvPr id="5" name="Afbeelding 4" descr="Afbeelding met zwart, duisternis&#10;&#10;Door AI gegenereerde inhoud is mogelijk onjuist.">
+            <a:extLst>
+              <a:ext uri="{FF2B5EF4-FFF2-40B4-BE49-F238E27FC236}">
+                <a16:creationId xmlns:a16="http://schemas.microsoft.com/office/drawing/2014/main" id="{97569308-E194-6DA1-53DD-1BBD0CDE7493}"/>
+              </a:ext>
+            </a:extLst>
+          </p:cNvPr>
+          <p:cNvPicPr>
+            <a:picLocks noChangeAspect="1"/>
+          </p:cNvPicPr>
+          <p:nvPr/>
+        </p:nvPicPr>
+        <p:blipFill>
+          <a:blip r:embed="rId4">
+            <a:extLst>
+              <a:ext uri="{28A0092B-C50C-407E-A947-70E740481C1C}">
+                <a14:useLocalDpi xmlns:a14="http://schemas.microsoft.com/office/drawing/2010/main" val="0"/>
+              </a:ext>
+            </a:extLst>
+          </a:blip>
+          <a:srcRect l="23291" t="23267" r="23403"/>
+          <a:stretch/>
+        </p:blipFill>
+        <p:spPr>
+          <a:xfrm>
+            <a:off x="4768543" y="1518219"/>
+            <a:ext cx="2654913" cy="3821561"/>
+          </a:xfrm>
+          <a:prstGeom prst="rect">
+            <a:avLst/>
+          </a:prstGeom>
+        </p:spPr>
+      </p:pic>
+    </p:spTree>
+    <p:extLst>
+      <p:ext uri="{BB962C8B-B14F-4D97-AF65-F5344CB8AC3E}">
+        <p14:creationId xmlns:p14="http://schemas.microsoft.com/office/powerpoint/2010/main" val="1189417116"/>
+      </p:ext>
+    </p:extLst>
+  </p:cSld>
+  <p:clrMapOvr>
+    <a:masterClrMapping/>
+  </p:clrMapOvr>
+</p:sld>
+</file>
+
+<file path=ppt/slides/slide4.xml><?xml version="1.0" encoding="utf-8"?>
+<p:sld xmlns:a="http://schemas.openxmlformats.org/drawingml/2006/main" xmlns:r="http://schemas.openxmlformats.org/officeDocument/2006/relationships" xmlns:p="http://schemas.openxmlformats.org/presentationml/2006/main">
+  <p:cSld>
+    <p:bg>
+      <p:bgPr>
+        <a:solidFill>
+          <a:schemeClr val="tx1"/>
+        </a:solidFill>
+        <a:effectLst/>
+      </p:bgPr>
+    </p:bg>
+    <p:spTree>
+      <p:nvGrpSpPr>
+        <p:cNvPr id="1" name="">
+          <a:extLst>
+            <a:ext uri="{FF2B5EF4-FFF2-40B4-BE49-F238E27FC236}">
+              <a16:creationId xmlns:a16="http://schemas.microsoft.com/office/drawing/2014/main" id="{42095B92-7381-E51D-1A0E-4263654AACB2}"/>
+            </a:ext>
+          </a:extLst>
+        </p:cNvPr>
+        <p:cNvGrpSpPr/>
+        <p:nvPr/>
+      </p:nvGrpSpPr>
+      <p:grpSpPr>
+        <a:xfrm>
+          <a:off x="0" y="0"/>
+          <a:ext cx="0" cy="0"/>
+          <a:chOff x="0" y="0"/>
+          <a:chExt cx="0" cy="0"/>
+        </a:xfrm>
+      </p:grpSpPr>
+      <p:sp>
+        <p:nvSpPr>
+          <p:cNvPr id="19" name="Tekstvak 18">
+            <a:extLst>
+              <a:ext uri="{FF2B5EF4-FFF2-40B4-BE49-F238E27FC236}">
+                <a16:creationId xmlns:a16="http://schemas.microsoft.com/office/drawing/2014/main" id="{D649DA88-3B3B-827D-E428-853B807D5B9A}"/>
+              </a:ext>
+            </a:extLst>
+          </p:cNvPr>
+          <p:cNvSpPr txBox="1"/>
+          <p:nvPr/>
+        </p:nvSpPr>
+        <p:spPr>
+          <a:xfrm>
+            <a:off x="613457" y="578734"/>
+            <a:ext cx="4210003" cy="369332"/>
+          </a:xfrm>
+          <a:prstGeom prst="rect">
+            <a:avLst/>
+          </a:prstGeom>
+          <a:noFill/>
+        </p:spPr>
+        <p:txBody>
+          <a:bodyPr wrap="square" rtlCol="0">
+            <a:spAutoFit/>
+          </a:bodyPr>
+          <a:lstStyle/>
+          <a:p>
+            <a:r>
+              <a:rPr lang="en-GB" b="1" dirty="0">
+                <a:solidFill>
+                  <a:schemeClr val="bg1"/>
+                </a:solidFill>
+              </a:rPr>
+              <a:t>Minimal icon – Dark mode</a:t>
             </a:r>
           </a:p>
         </p:txBody>
       </p:sp>
       <p:grpSp>
         <p:nvGrpSpPr>
-          <p:cNvPr id="38" name="Groep 37">
-            <a:extLst>
-              <a:ext uri="{FF2B5EF4-FFF2-40B4-BE49-F238E27FC236}">
-                <a16:creationId xmlns:a16="http://schemas.microsoft.com/office/drawing/2014/main" id="{E2D8B608-B03D-2150-1A88-0AD743EF8B71}"/>
+          <p:cNvPr id="6" name="Group 5">
+            <a:extLst>
+              <a:ext uri="{FF2B5EF4-FFF2-40B4-BE49-F238E27FC236}">
+                <a16:creationId xmlns:a16="http://schemas.microsoft.com/office/drawing/2014/main" id="{016B36FE-6DBD-91D7-D013-9C4360FFA92A}"/>
               </a:ext>
             </a:extLst>
           </p:cNvPr>
@@ -6340,10 +7172,10 @@
         </p:nvGrpSpPr>
         <p:grpSpPr>
           <a:xfrm>
-            <a:off x="4768543" y="1518219"/>
-            <a:ext cx="2654913" cy="3821561"/>
-            <a:chOff x="4768543" y="1518219"/>
-            <a:chExt cx="2654913" cy="3821561"/>
+            <a:off x="4779463" y="1518754"/>
+            <a:ext cx="2651990" cy="3820491"/>
+            <a:chOff x="4779463" y="1518754"/>
+            <a:chExt cx="2651990" cy="3820491"/>
           </a:xfrm>
         </p:grpSpPr>
         <p:sp>
@@ -6351,7 +7183,7 @@
             <p:cNvPr id="10" name="Vrije vorm: vorm 9">
               <a:extLst>
                 <a:ext uri="{FF2B5EF4-FFF2-40B4-BE49-F238E27FC236}">
-                  <a16:creationId xmlns:a16="http://schemas.microsoft.com/office/drawing/2014/main" id="{31096432-5763-DB49-DD5D-93FEC2460A94}"/>
+                  <a16:creationId xmlns:a16="http://schemas.microsoft.com/office/drawing/2014/main" id="{4172EF59-E0CA-7B92-10A7-0956A6F1BBD2}"/>
                 </a:ext>
               </a:extLst>
             </p:cNvPr>
@@ -6582,7 +7414,7 @@
             <p:cNvPr id="7" name="Graphic 6" descr="Huis met effen opvulling">
               <a:extLst>
                 <a:ext uri="{FF2B5EF4-FFF2-40B4-BE49-F238E27FC236}">
-                  <a16:creationId xmlns:a16="http://schemas.microsoft.com/office/drawing/2014/main" id="{C04A5282-7B5E-44C2-F4BA-BA4D5A09B62A}"/>
+                  <a16:creationId xmlns:a16="http://schemas.microsoft.com/office/drawing/2014/main" id="{0D59FE08-4B77-2281-326C-D7ACA8C90BD5}"/>
                 </a:ext>
               </a:extLst>
             </p:cNvPr>
@@ -6617,7 +7449,7 @@
             <p:cNvPr id="8" name="Rechthoek 7">
               <a:extLst>
                 <a:ext uri="{FF2B5EF4-FFF2-40B4-BE49-F238E27FC236}">
-                  <a16:creationId xmlns:a16="http://schemas.microsoft.com/office/drawing/2014/main" id="{EF5DC001-E5C5-3DA2-8027-076F8BFEBE6D}"/>
+                  <a16:creationId xmlns:a16="http://schemas.microsoft.com/office/drawing/2014/main" id="{87AFBA78-C950-7593-2164-87ED2494B530}"/>
                 </a:ext>
               </a:extLst>
             </p:cNvPr>
@@ -6668,7 +7500,7 @@
             <p:cNvPr id="23" name="Rechthoek 22">
               <a:extLst>
                 <a:ext uri="{FF2B5EF4-FFF2-40B4-BE49-F238E27FC236}">
-                  <a16:creationId xmlns:a16="http://schemas.microsoft.com/office/drawing/2014/main" id="{22009CBD-7430-F663-9765-F884FF673E0E}"/>
+                  <a16:creationId xmlns:a16="http://schemas.microsoft.com/office/drawing/2014/main" id="{26166802-B38F-C435-BC26-235E8CA4CF49}"/>
                 </a:ext>
               </a:extLst>
             </p:cNvPr>
@@ -6720,7 +7552,7 @@
             <p:cNvPr id="24" name="Rechthoek 23">
               <a:extLst>
                 <a:ext uri="{FF2B5EF4-FFF2-40B4-BE49-F238E27FC236}">
-                  <a16:creationId xmlns:a16="http://schemas.microsoft.com/office/drawing/2014/main" id="{9750DEC3-84A7-1604-F11D-E6868E3D9C71}"/>
+                  <a16:creationId xmlns:a16="http://schemas.microsoft.com/office/drawing/2014/main" id="{8C234261-1878-2D3B-A029-8C814FB0FEED}"/>
                 </a:ext>
               </a:extLst>
             </p:cNvPr>
@@ -6772,7 +7604,7 @@
             <p:cNvPr id="30" name="Rechthoek 29">
               <a:extLst>
                 <a:ext uri="{FF2B5EF4-FFF2-40B4-BE49-F238E27FC236}">
-                  <a16:creationId xmlns:a16="http://schemas.microsoft.com/office/drawing/2014/main" id="{F412B91D-4AE3-5E4D-D217-85C3C0E995FE}"/>
+                  <a16:creationId xmlns:a16="http://schemas.microsoft.com/office/drawing/2014/main" id="{C2E98599-8C8F-FFA3-C27A-A470E381E14E}"/>
                 </a:ext>
               </a:extLst>
             </p:cNvPr>
@@ -6824,7 +7656,7 @@
             <p:cNvPr id="31" name="Rechthoek 30">
               <a:extLst>
                 <a:ext uri="{FF2B5EF4-FFF2-40B4-BE49-F238E27FC236}">
-                  <a16:creationId xmlns:a16="http://schemas.microsoft.com/office/drawing/2014/main" id="{08E30AAE-41D7-CCC6-0579-174FC2FCBBBE}"/>
+                  <a16:creationId xmlns:a16="http://schemas.microsoft.com/office/drawing/2014/main" id="{260AA6FF-1CBB-16E6-9CEA-7BCC1B75E2E7}"/>
                 </a:ext>
               </a:extLst>
             </p:cNvPr>
@@ -6876,7 +7708,7 @@
             <p:cNvPr id="34" name="Rechthoekige driehoek 33">
               <a:extLst>
                 <a:ext uri="{FF2B5EF4-FFF2-40B4-BE49-F238E27FC236}">
-                  <a16:creationId xmlns:a16="http://schemas.microsoft.com/office/drawing/2014/main" id="{7D176FB3-3A1E-8482-E466-3223DB6AB7C2}"/>
+                  <a16:creationId xmlns:a16="http://schemas.microsoft.com/office/drawing/2014/main" id="{33CF338F-D62E-A9EE-8735-76767B8E532A}"/>
                 </a:ext>
               </a:extLst>
             </p:cNvPr>
@@ -6928,7 +7760,7 @@
             <p:cNvPr id="35" name="Rechthoekige driehoek 34">
               <a:extLst>
                 <a:ext uri="{FF2B5EF4-FFF2-40B4-BE49-F238E27FC236}">
-                  <a16:creationId xmlns:a16="http://schemas.microsoft.com/office/drawing/2014/main" id="{4793F759-CFB8-5D88-84D0-20F3173C5A55}"/>
+                  <a16:creationId xmlns:a16="http://schemas.microsoft.com/office/drawing/2014/main" id="{C7DCDE2C-4AC0-31F6-13E8-606C2D7578A2}"/>
                 </a:ext>
               </a:extLst>
             </p:cNvPr>
@@ -6980,7 +7812,7 @@
             <p:cNvPr id="36" name="Rechthoekige driehoek 35">
               <a:extLst>
                 <a:ext uri="{FF2B5EF4-FFF2-40B4-BE49-F238E27FC236}">
-                  <a16:creationId xmlns:a16="http://schemas.microsoft.com/office/drawing/2014/main" id="{AB1FDB77-CDE2-498F-6610-499AED680374}"/>
+                  <a16:creationId xmlns:a16="http://schemas.microsoft.com/office/drawing/2014/main" id="{61D229E0-A0BA-29F5-45CF-464E0DB18BCE}"/>
                 </a:ext>
               </a:extLst>
             </p:cNvPr>
@@ -7032,7 +7864,7 @@
             <p:cNvPr id="37" name="Rechthoekige driehoek 36">
               <a:extLst>
                 <a:ext uri="{FF2B5EF4-FFF2-40B4-BE49-F238E27FC236}">
-                  <a16:creationId xmlns:a16="http://schemas.microsoft.com/office/drawing/2014/main" id="{E8A6F7A9-0256-B66F-3015-AD32113DE93D}"/>
+                  <a16:creationId xmlns:a16="http://schemas.microsoft.com/office/drawing/2014/main" id="{8CB68302-8191-E212-690A-7A64BF21ECD7}"/>
                 </a:ext>
               </a:extLst>
             </p:cNvPr>
@@ -7081,10 +7913,10 @@
         </p:sp>
         <p:pic>
           <p:nvPicPr>
-            <p:cNvPr id="5" name="Afbeelding 4" descr="Afbeelding met zwart, duisternis&#10;&#10;Door AI gegenereerde inhoud is mogelijk onjuist.">
+            <p:cNvPr id="3" name="Picture 2" descr="A white light bulb with a black background&#10;&#10;AI-generated content may be incorrect.">
               <a:extLst>
                 <a:ext uri="{FF2B5EF4-FFF2-40B4-BE49-F238E27FC236}">
-                  <a16:creationId xmlns:a16="http://schemas.microsoft.com/office/drawing/2014/main" id="{97569308-E194-6DA1-53DD-1BBD0CDE7493}"/>
+                  <a16:creationId xmlns:a16="http://schemas.microsoft.com/office/drawing/2014/main" id="{CEE43C10-6544-BD31-DE60-0488BEAC9D95}"/>
                 </a:ext>
               </a:extLst>
             </p:cNvPr>
@@ -7101,13 +7933,14 @@
                 </a:ext>
               </a:extLst>
             </a:blip>
-            <a:srcRect l="23291" t="23267" r="23403"/>
-            <a:stretch/>
+            <a:stretch>
+              <a:fillRect/>
+            </a:stretch>
           </p:blipFill>
           <p:spPr>
             <a:xfrm>
-              <a:off x="4768543" y="1518219"/>
-              <a:ext cx="2654913" cy="3821561"/>
+              <a:off x="4779463" y="1518754"/>
+              <a:ext cx="2651990" cy="3820491"/>
             </a:xfrm>
             <a:prstGeom prst="rect">
               <a:avLst/>
@@ -7118,7 +7951,7 @@
     </p:spTree>
     <p:extLst>
       <p:ext uri="{BB962C8B-B14F-4D97-AF65-F5344CB8AC3E}">
-        <p14:creationId xmlns:p14="http://schemas.microsoft.com/office/powerpoint/2010/main" val="1189417116"/>
+        <p14:creationId xmlns:p14="http://schemas.microsoft.com/office/powerpoint/2010/main" val="4044252605"/>
       </p:ext>
     </p:extLst>
   </p:cSld>

</xml_diff>